<commit_message>
chore: remove empty git diff placeholder
Co-authored-by: terragon-labs[bot] <terragon-labs[bot]@users.noreply.github.com>
</commit_message>
<xml_diff>
--- a/slides-new/Agentic-AI-Agent-Talk.pptx
+++ b/slides-new/Agentic-AI-Agent-Talk.pptx
@@ -2637,7 +2637,7 @@
     <p:bg>
       <p:bgPr>
         <a:solidFill>
-          <a:srgbClr val="FCFCFC"/>
+          <a:srgbClr val="0F172A"/>
         </a:solidFill>
       </p:bgPr>
     </p:bg>
@@ -2663,8 +2663,8 @@
         </p:nvSpPr>
         <p:spPr>
           <a:xfrm>
-            <a:off x="685800" y="533400"/>
-            <a:ext cx="7927848" cy="231428"/>
+            <a:off x="647700" y="457200"/>
+            <a:ext cx="8005572" cy="239911"/>
           </a:xfrm>
           <a:prstGeom prst="rect">
             <a:avLst/>
@@ -2678,14 +2678,14 @@
           <a:p>
             <a:pPr algn="l" indent="0" marL="0">
               <a:lnSpc>
-                <a:spcPts val="1823"/>
+                <a:spcPts val="1890"/>
               </a:lnSpc>
               <a:buNone/>
             </a:pPr>
             <a:r>
               <a:rPr lang="en-US" sz="1350" dirty="0">
                 <a:solidFill>
-                  <a:srgbClr val="4A5A68"/>
+                  <a:srgbClr val="F97316"/>
                 </a:solidFill>
                 <a:latin typeface="Trebuchet MS" pitchFamily="34" charset="0"/>
                 <a:ea typeface="Trebuchet MS" pitchFamily="34" charset="-122"/>
@@ -2705,8 +2705,8 @@
         </p:nvSpPr>
         <p:spPr>
           <a:xfrm>
-            <a:off x="685800" y="821978"/>
-            <a:ext cx="7927848" cy="952500"/>
+            <a:off x="647700" y="773311"/>
+            <a:ext cx="8005572" cy="1028700"/>
           </a:xfrm>
           <a:prstGeom prst="rect">
             <a:avLst/>
@@ -2722,9 +2722,9 @@
               <a:buNone/>
             </a:pPr>
             <a:r>
-              <a:rPr lang="en-US" sz="3300" b="1" dirty="0">
-                <a:solidFill>
-                  <a:srgbClr val="B165FB"/>
+              <a:rPr lang="en-US" sz="3450" b="1" dirty="0">
+                <a:solidFill>
+                  <a:srgbClr val="38BDF8"/>
                 </a:solidFill>
                 <a:latin typeface="Trebuchet MS" pitchFamily="34" charset="0"/>
                 <a:ea typeface="Trebuchet MS" pitchFamily="34" charset="-122"/>
@@ -2732,7 +2732,7 @@
               </a:rPr>
               <a:t>Agentic AI for Reproducible Language Science</a:t>
             </a:r>
-            <a:endParaRPr lang="en-US" sz="3300" dirty="0"/>
+            <a:endParaRPr lang="en-US" sz="3450" dirty="0"/>
           </a:p>
         </p:txBody>
       </p:sp>
@@ -2744,8 +2744,8 @@
         </p:nvSpPr>
         <p:spPr>
           <a:xfrm>
-            <a:off x="685800" y="1831628"/>
-            <a:ext cx="7927848" cy="257175"/>
+            <a:off x="647700" y="1878211"/>
+            <a:ext cx="8005572" cy="266700"/>
           </a:xfrm>
           <a:prstGeom prst="rect">
             <a:avLst/>
@@ -2759,14 +2759,14 @@
           <a:p>
             <a:pPr algn="l" indent="0" marL="0">
               <a:lnSpc>
-                <a:spcPts val="2025"/>
+                <a:spcPts val="2100"/>
               </a:lnSpc>
               <a:buNone/>
             </a:pPr>
             <a:r>
               <a:rPr lang="en-US" sz="1500" dirty="0">
                 <a:solidFill>
-                  <a:srgbClr val="4A5A68"/>
+                  <a:srgbClr val="94A3B8"/>
                 </a:solidFill>
                 <a:latin typeface="Trebuchet MS" pitchFamily="34" charset="0"/>
                 <a:ea typeface="Trebuchet MS" pitchFamily="34" charset="-122"/>
@@ -2786,8 +2786,8 @@
         </p:nvSpPr>
         <p:spPr>
           <a:xfrm>
-            <a:off x="685800" y="2260253"/>
-            <a:ext cx="7772400" cy="2305050"/>
+            <a:off x="647700" y="2316361"/>
+            <a:ext cx="7848600" cy="2343150"/>
           </a:xfrm>
           <a:prstGeom prst="rect">
             <a:avLst/>
@@ -2796,12 +2796,12 @@
           <a:ln/>
         </p:spPr>
         <p:txBody>
-          <a:bodyPr wrap="square" lIns="123825" tIns="0" rIns="0" bIns="0" rtlCol="0" anchor="t"/>
+          <a:bodyPr wrap="square" lIns="133350" tIns="0" rIns="0" bIns="0" rtlCol="0" anchor="t"/>
           <a:lstStyle/>
           <a:p>
             <a:pPr algn="l" indent="0" marL="0">
               <a:lnSpc>
-                <a:spcPts val="2145"/>
+                <a:spcPts val="2228"/>
               </a:lnSpc>
               <a:buNone/>
             </a:pPr>
@@ -2817,8 +2817,8 @@
         </p:nvSpPr>
         <p:spPr>
           <a:xfrm>
-            <a:off x="1162050" y="2393603"/>
-            <a:ext cx="7267194" cy="238125"/>
+            <a:off x="1162050" y="2449711"/>
+            <a:ext cx="7286625" cy="247650"/>
           </a:xfrm>
           <a:prstGeom prst="rect">
             <a:avLst/>
@@ -2832,14 +2832,14 @@
           <a:p>
             <a:pPr algn="l" indent="0" marL="0">
               <a:lnSpc>
-                <a:spcPts val="1875"/>
+                <a:spcPts val="1950"/>
               </a:lnSpc>
               <a:buNone/>
             </a:pPr>
             <a:r>
               <a:rPr lang="en-US" sz="1500" dirty="0">
                 <a:solidFill>
-                  <a:srgbClr val="182D3C"/>
+                  <a:srgbClr val="E2E8F0"/>
                 </a:solidFill>
                 <a:latin typeface="Trebuchet MS" pitchFamily="34" charset="0"/>
                 <a:ea typeface="Trebuchet MS" pitchFamily="34" charset="-122"/>
@@ -2859,8 +2859,8 @@
         </p:nvSpPr>
         <p:spPr>
           <a:xfrm>
-            <a:off x="1162050" y="2993678"/>
-            <a:ext cx="7267194" cy="238125"/>
+            <a:off x="1162050" y="3059311"/>
+            <a:ext cx="7286625" cy="247650"/>
           </a:xfrm>
           <a:prstGeom prst="rect">
             <a:avLst/>
@@ -2874,14 +2874,14 @@
           <a:p>
             <a:pPr algn="l" indent="0" marL="0">
               <a:lnSpc>
-                <a:spcPts val="1875"/>
+                <a:spcPts val="1950"/>
               </a:lnSpc>
               <a:buNone/>
             </a:pPr>
             <a:r>
               <a:rPr lang="en-US" sz="1500" dirty="0">
                 <a:solidFill>
-                  <a:srgbClr val="182D3C"/>
+                  <a:srgbClr val="E2E8F0"/>
                 </a:solidFill>
                 <a:latin typeface="Trebuchet MS" pitchFamily="34" charset="0"/>
                 <a:ea typeface="Trebuchet MS" pitchFamily="34" charset="-122"/>
@@ -2901,8 +2901,8 @@
         </p:nvSpPr>
         <p:spPr>
           <a:xfrm>
-            <a:off x="1162050" y="3593753"/>
-            <a:ext cx="7267194" cy="238125"/>
+            <a:off x="1162050" y="3668911"/>
+            <a:ext cx="7286625" cy="247650"/>
           </a:xfrm>
           <a:prstGeom prst="rect">
             <a:avLst/>
@@ -2916,14 +2916,14 @@
           <a:p>
             <a:pPr algn="l" indent="0" marL="0">
               <a:lnSpc>
-                <a:spcPts val="1875"/>
+                <a:spcPts val="1950"/>
               </a:lnSpc>
               <a:buNone/>
             </a:pPr>
             <a:r>
               <a:rPr lang="en-US" sz="1500" dirty="0">
                 <a:solidFill>
-                  <a:srgbClr val="182D3C"/>
+                  <a:srgbClr val="E2E8F0"/>
                 </a:solidFill>
                 <a:latin typeface="Trebuchet MS" pitchFamily="34" charset="0"/>
                 <a:ea typeface="Trebuchet MS" pitchFamily="34" charset="-122"/>
@@ -2943,8 +2943,8 @@
         </p:nvSpPr>
         <p:spPr>
           <a:xfrm>
-            <a:off x="1162050" y="4193828"/>
-            <a:ext cx="7267194" cy="238125"/>
+            <a:off x="1162050" y="4278511"/>
+            <a:ext cx="7286625" cy="247650"/>
           </a:xfrm>
           <a:prstGeom prst="rect">
             <a:avLst/>
@@ -2958,14 +2958,14 @@
           <a:p>
             <a:pPr algn="l" indent="0" marL="0">
               <a:lnSpc>
-                <a:spcPts val="1875"/>
+                <a:spcPts val="1950"/>
               </a:lnSpc>
               <a:buNone/>
             </a:pPr>
             <a:r>
               <a:rPr lang="en-US" sz="1500" dirty="0">
                 <a:solidFill>
-                  <a:srgbClr val="182D3C"/>
+                  <a:srgbClr val="E2E8F0"/>
                 </a:solidFill>
                 <a:latin typeface="Trebuchet MS" pitchFamily="34" charset="0"/>
                 <a:ea typeface="Trebuchet MS" pitchFamily="34" charset="-122"/>
@@ -2991,7 +2991,7 @@
     <p:bg>
       <p:bgPr>
         <a:solidFill>
-          <a:srgbClr val="FCFCFC"/>
+          <a:srgbClr val="0F172A"/>
         </a:solidFill>
       </p:bgPr>
     </p:bg>
@@ -3017,8 +3017,8 @@
         </p:nvSpPr>
         <p:spPr>
           <a:xfrm>
-            <a:off x="685800" y="533400"/>
-            <a:ext cx="7927848" cy="231428"/>
+            <a:off x="647700" y="457200"/>
+            <a:ext cx="8005572" cy="239911"/>
           </a:xfrm>
           <a:prstGeom prst="rect">
             <a:avLst/>
@@ -3032,14 +3032,14 @@
           <a:p>
             <a:pPr algn="l" indent="0" marL="0">
               <a:lnSpc>
-                <a:spcPts val="1823"/>
+                <a:spcPts val="1890"/>
               </a:lnSpc>
               <a:buNone/>
             </a:pPr>
             <a:r>
               <a:rPr lang="en-US" sz="1350" dirty="0">
                 <a:solidFill>
-                  <a:srgbClr val="4A5A68"/>
+                  <a:srgbClr val="F97316"/>
                 </a:solidFill>
                 <a:latin typeface="Trebuchet MS" pitchFamily="34" charset="0"/>
                 <a:ea typeface="Trebuchet MS" pitchFamily="34" charset="-122"/>
@@ -3059,8 +3059,8 @@
         </p:nvSpPr>
         <p:spPr>
           <a:xfrm>
-            <a:off x="685800" y="821978"/>
-            <a:ext cx="7927848" cy="371475"/>
+            <a:off x="647700" y="773311"/>
+            <a:ext cx="8005572" cy="400050"/>
           </a:xfrm>
           <a:prstGeom prst="rect">
             <a:avLst/>
@@ -3076,9 +3076,9 @@
               <a:buNone/>
             </a:pPr>
             <a:r>
-              <a:rPr lang="en-US" sz="2550" b="1" dirty="0">
-                <a:solidFill>
-                  <a:srgbClr val="B165FB"/>
+              <a:rPr lang="en-US" sz="2700" b="1" dirty="0">
+                <a:solidFill>
+                  <a:srgbClr val="38BDF8"/>
                 </a:solidFill>
                 <a:latin typeface="Trebuchet MS" pitchFamily="34" charset="0"/>
                 <a:ea typeface="Trebuchet MS" pitchFamily="34" charset="-122"/>
@@ -3086,7 +3086,7 @@
               </a:rPr>
               <a:t>Why Reproducible Research?</a:t>
             </a:r>
-            <a:endParaRPr lang="en-US" sz="2550" dirty="0"/>
+            <a:endParaRPr lang="en-US" sz="2700" dirty="0"/>
           </a:p>
         </p:txBody>
       </p:sp>
@@ -3098,8 +3098,8 @@
         </p:nvSpPr>
         <p:spPr>
           <a:xfrm>
-            <a:off x="685800" y="1364903"/>
-            <a:ext cx="7772400" cy="1742777"/>
+            <a:off x="647700" y="1344811"/>
+            <a:ext cx="7848600" cy="1871067"/>
           </a:xfrm>
           <a:prstGeom prst="rect">
             <a:avLst/>
@@ -3108,12 +3108,12 @@
           <a:ln/>
         </p:spPr>
         <p:txBody>
-          <a:bodyPr wrap="square" lIns="123825" tIns="0" rIns="0" bIns="0" rtlCol="0" anchor="t"/>
-          <a:lstStyle/>
-          <a:p>
-            <a:pPr algn="l" marL="123825" indent="-123825">
-              <a:lnSpc>
-                <a:spcPts val="2145"/>
+          <a:bodyPr wrap="square" lIns="133350" tIns="0" rIns="0" bIns="0" rtlCol="0" anchor="t"/>
+          <a:lstStyle/>
+          <a:p>
+            <a:pPr algn="l" marL="133350" indent="-133350">
+              <a:lnSpc>
+                <a:spcPts val="2228"/>
               </a:lnSpc>
               <a:buSzPct val="100000"/>
               <a:buChar char="•"/>
@@ -3121,7 +3121,7 @@
             <a:r>
               <a:rPr lang="en-US" sz="1650" dirty="0">
                 <a:solidFill>
-                  <a:srgbClr val="182D3C"/>
+                  <a:srgbClr val="E2E8F0"/>
                 </a:solidFill>
                 <a:latin typeface="Trebuchet MS" pitchFamily="34" charset="0"/>
                 <a:ea typeface="Trebuchet MS" pitchFamily="34" charset="-122"/>
@@ -3132,9 +3132,9 @@
             <a:endParaRPr lang="en-US" sz="1650" dirty="0"/>
           </a:p>
           <a:p>
-            <a:pPr algn="l" marL="123825" indent="-123825">
-              <a:lnSpc>
-                <a:spcPts val="2145"/>
+            <a:pPr algn="l" marL="133350" indent="-133350">
+              <a:lnSpc>
+                <a:spcPts val="2228"/>
               </a:lnSpc>
               <a:buSzPct val="100000"/>
               <a:buChar char="•"/>
@@ -3142,7 +3142,7 @@
             <a:r>
               <a:rPr lang="en-US" sz="1650" dirty="0">
                 <a:solidFill>
-                  <a:srgbClr val="182D3C"/>
+                  <a:srgbClr val="E2E8F0"/>
                 </a:solidFill>
                 <a:latin typeface="Trebuchet MS" pitchFamily="34" charset="0"/>
                 <a:ea typeface="Trebuchet MS" pitchFamily="34" charset="-122"/>
@@ -3153,9 +3153,9 @@
             <a:endParaRPr lang="en-US" sz="1650" dirty="0"/>
           </a:p>
           <a:p>
-            <a:pPr algn="l" marL="123825" indent="-123825">
-              <a:lnSpc>
-                <a:spcPts val="2145"/>
+            <a:pPr algn="l" marL="133350" indent="-133350">
+              <a:lnSpc>
+                <a:spcPts val="2228"/>
               </a:lnSpc>
               <a:buSzPct val="100000"/>
               <a:buChar char="•"/>
@@ -3163,7 +3163,7 @@
             <a:r>
               <a:rPr lang="en-US" sz="1650" dirty="0">
                 <a:solidFill>
-                  <a:srgbClr val="182D3C"/>
+                  <a:srgbClr val="E2E8F0"/>
                 </a:solidFill>
                 <a:latin typeface="Trebuchet MS" pitchFamily="34" charset="0"/>
                 <a:ea typeface="Trebuchet MS" pitchFamily="34" charset="-122"/>
@@ -3174,9 +3174,9 @@
             <a:endParaRPr lang="en-US" sz="1650" dirty="0"/>
           </a:p>
           <a:p>
-            <a:pPr algn="l" marL="123825" indent="-123825">
-              <a:lnSpc>
-                <a:spcPts val="2145"/>
+            <a:pPr algn="l" marL="133350" indent="-133350">
+              <a:lnSpc>
+                <a:spcPts val="2228"/>
               </a:lnSpc>
               <a:buSzPct val="100000"/>
               <a:buChar char="•"/>
@@ -3184,7 +3184,7 @@
             <a:r>
               <a:rPr lang="en-US" sz="1650" dirty="0">
                 <a:solidFill>
-                  <a:srgbClr val="182D3C"/>
+                  <a:srgbClr val="E2E8F0"/>
                 </a:solidFill>
                 <a:latin typeface="Trebuchet MS" pitchFamily="34" charset="0"/>
                 <a:ea typeface="Trebuchet MS" pitchFamily="34" charset="-122"/>
@@ -3195,9 +3195,9 @@
             <a:endParaRPr lang="en-US" sz="1650" dirty="0"/>
           </a:p>
           <a:p>
-            <a:pPr algn="l" marL="123825" indent="-123825">
-              <a:lnSpc>
-                <a:spcPts val="2145"/>
+            <a:pPr algn="l" marL="133350" indent="-133350">
+              <a:lnSpc>
+                <a:spcPts val="2228"/>
               </a:lnSpc>
               <a:buSzPct val="100000"/>
               <a:buChar char="•"/>
@@ -3205,7 +3205,7 @@
             <a:r>
               <a:rPr lang="en-US" sz="1650" dirty="0">
                 <a:solidFill>
-                  <a:srgbClr val="182D3C"/>
+                  <a:srgbClr val="E2E8F0"/>
                 </a:solidFill>
                 <a:latin typeface="Trebuchet MS" pitchFamily="34" charset="0"/>
                 <a:ea typeface="Trebuchet MS" pitchFamily="34" charset="-122"/>
@@ -3231,7 +3231,7 @@
     <p:bg>
       <p:bgPr>
         <a:solidFill>
-          <a:srgbClr val="FCFCFC"/>
+          <a:srgbClr val="0F172A"/>
         </a:solidFill>
       </p:bgPr>
     </p:bg>
@@ -3257,8 +3257,8 @@
         </p:nvSpPr>
         <p:spPr>
           <a:xfrm>
-            <a:off x="685800" y="533400"/>
-            <a:ext cx="7927848" cy="231428"/>
+            <a:off x="647700" y="457200"/>
+            <a:ext cx="8005572" cy="239911"/>
           </a:xfrm>
           <a:prstGeom prst="rect">
             <a:avLst/>
@@ -3272,14 +3272,14 @@
           <a:p>
             <a:pPr algn="l" indent="0" marL="0">
               <a:lnSpc>
-                <a:spcPts val="1823"/>
+                <a:spcPts val="1890"/>
               </a:lnSpc>
               <a:buNone/>
             </a:pPr>
             <a:r>
               <a:rPr lang="en-US" sz="1350" dirty="0">
                 <a:solidFill>
-                  <a:srgbClr val="4A5A68"/>
+                  <a:srgbClr val="F97316"/>
                 </a:solidFill>
                 <a:latin typeface="Trebuchet MS" pitchFamily="34" charset="0"/>
                 <a:ea typeface="Trebuchet MS" pitchFamily="34" charset="-122"/>
@@ -3299,8 +3299,8 @@
         </p:nvSpPr>
         <p:spPr>
           <a:xfrm>
-            <a:off x="685800" y="821978"/>
-            <a:ext cx="7927848" cy="371475"/>
+            <a:off x="647700" y="773311"/>
+            <a:ext cx="8005572" cy="400050"/>
           </a:xfrm>
           <a:prstGeom prst="rect">
             <a:avLst/>
@@ -3316,9 +3316,9 @@
               <a:buNone/>
             </a:pPr>
             <a:r>
-              <a:rPr lang="en-US" sz="2550" b="1" dirty="0">
-                <a:solidFill>
-                  <a:srgbClr val="B165FB"/>
+              <a:rPr lang="en-US" sz="2700" b="1" dirty="0">
+                <a:solidFill>
+                  <a:srgbClr val="38BDF8"/>
                 </a:solidFill>
                 <a:latin typeface="Trebuchet MS" pitchFamily="34" charset="0"/>
                 <a:ea typeface="Trebuchet MS" pitchFamily="34" charset="-122"/>
@@ -3326,7 +3326,7 @@
               </a:rPr>
               <a:t>Agentic AI Loves Reproducibility</a:t>
             </a:r>
-            <a:endParaRPr lang="en-US" sz="2550" dirty="0"/>
+            <a:endParaRPr lang="en-US" sz="2700" dirty="0"/>
           </a:p>
         </p:txBody>
       </p:sp>
@@ -3338,8 +3338,8 @@
         </p:nvSpPr>
         <p:spPr>
           <a:xfrm>
-            <a:off x="685800" y="1364903"/>
-            <a:ext cx="7772400" cy="1007566"/>
+            <a:off x="647700" y="1344811"/>
+            <a:ext cx="7848600" cy="1076920"/>
           </a:xfrm>
           <a:prstGeom prst="rect">
             <a:avLst/>
@@ -3348,12 +3348,12 @@
           <a:ln/>
         </p:spPr>
         <p:txBody>
-          <a:bodyPr wrap="square" lIns="123825" tIns="0" rIns="0" bIns="0" rtlCol="0" anchor="t"/>
-          <a:lstStyle/>
-          <a:p>
-            <a:pPr algn="l" marL="123825" indent="-123825">
-              <a:lnSpc>
-                <a:spcPts val="2145"/>
+          <a:bodyPr wrap="square" lIns="133350" tIns="0" rIns="0" bIns="0" rtlCol="0" anchor="t"/>
+          <a:lstStyle/>
+          <a:p>
+            <a:pPr algn="l" marL="133350" indent="-133350">
+              <a:lnSpc>
+                <a:spcPts val="2228"/>
               </a:lnSpc>
               <a:buSzPct val="100000"/>
               <a:buChar char="•"/>
@@ -3361,7 +3361,7 @@
             <a:r>
               <a:rPr lang="en-US" sz="1650" dirty="0">
                 <a:solidFill>
-                  <a:srgbClr val="182D3C"/>
+                  <a:srgbClr val="E2E8F0"/>
                 </a:solidFill>
                 <a:latin typeface="Trebuchet MS" pitchFamily="34" charset="0"/>
                 <a:ea typeface="Trebuchet MS" pitchFamily="34" charset="-122"/>
@@ -3372,9 +3372,9 @@
             <a:endParaRPr lang="en-US" sz="1650" dirty="0"/>
           </a:p>
           <a:p>
-            <a:pPr algn="l" marL="123825" indent="-123825">
-              <a:lnSpc>
-                <a:spcPts val="2145"/>
+            <a:pPr algn="l" marL="133350" indent="-133350">
+              <a:lnSpc>
+                <a:spcPts val="2228"/>
               </a:lnSpc>
               <a:buSzPct val="100000"/>
               <a:buChar char="•"/>
@@ -3382,7 +3382,7 @@
             <a:r>
               <a:rPr lang="en-US" sz="1650" dirty="0">
                 <a:solidFill>
-                  <a:srgbClr val="182D3C"/>
+                  <a:srgbClr val="E2E8F0"/>
                 </a:solidFill>
                 <a:latin typeface="Trebuchet MS" pitchFamily="34" charset="0"/>
                 <a:ea typeface="Trebuchet MS" pitchFamily="34" charset="-122"/>
@@ -3393,9 +3393,9 @@
             <a:endParaRPr lang="en-US" sz="1650" dirty="0"/>
           </a:p>
           <a:p>
-            <a:pPr algn="l" marL="123825" indent="-123825">
-              <a:lnSpc>
-                <a:spcPts val="2145"/>
+            <a:pPr algn="l" marL="133350" indent="-133350">
+              <a:lnSpc>
+                <a:spcPts val="2228"/>
               </a:lnSpc>
               <a:buSzPct val="100000"/>
               <a:buChar char="•"/>
@@ -3403,7 +3403,7 @@
             <a:r>
               <a:rPr lang="en-US" sz="1650" dirty="0">
                 <a:solidFill>
-                  <a:srgbClr val="182D3C"/>
+                  <a:srgbClr val="E2E8F0"/>
                 </a:solidFill>
                 <a:latin typeface="Trebuchet MS" pitchFamily="34" charset="0"/>
                 <a:ea typeface="Trebuchet MS" pitchFamily="34" charset="-122"/>
@@ -3429,7 +3429,7 @@
     <p:bg>
       <p:bgPr>
         <a:solidFill>
-          <a:srgbClr val="FCFCFC"/>
+          <a:srgbClr val="0F172A"/>
         </a:solidFill>
       </p:bgPr>
     </p:bg>
@@ -3455,8 +3455,8 @@
         </p:nvSpPr>
         <p:spPr>
           <a:xfrm>
-            <a:off x="685800" y="533400"/>
-            <a:ext cx="7927848" cy="231428"/>
+            <a:off x="647700" y="457200"/>
+            <a:ext cx="8005572" cy="239911"/>
           </a:xfrm>
           <a:prstGeom prst="rect">
             <a:avLst/>
@@ -3470,14 +3470,14 @@
           <a:p>
             <a:pPr algn="l" indent="0" marL="0">
               <a:lnSpc>
-                <a:spcPts val="1823"/>
+                <a:spcPts val="1890"/>
               </a:lnSpc>
               <a:buNone/>
             </a:pPr>
             <a:r>
               <a:rPr lang="en-US" sz="1350" dirty="0">
                 <a:solidFill>
-                  <a:srgbClr val="4A5A68"/>
+                  <a:srgbClr val="F97316"/>
                 </a:solidFill>
                 <a:latin typeface="Trebuchet MS" pitchFamily="34" charset="0"/>
                 <a:ea typeface="Trebuchet MS" pitchFamily="34" charset="-122"/>
@@ -3497,8 +3497,8 @@
         </p:nvSpPr>
         <p:spPr>
           <a:xfrm>
-            <a:off x="685800" y="821978"/>
-            <a:ext cx="7927848" cy="371475"/>
+            <a:off x="647700" y="773311"/>
+            <a:ext cx="8005572" cy="400050"/>
           </a:xfrm>
           <a:prstGeom prst="rect">
             <a:avLst/>
@@ -3514,9 +3514,9 @@
               <a:buNone/>
             </a:pPr>
             <a:r>
-              <a:rPr lang="en-US" sz="2550" b="1" dirty="0">
-                <a:solidFill>
-                  <a:srgbClr val="B165FB"/>
+              <a:rPr lang="en-US" sz="2700" b="1" dirty="0">
+                <a:solidFill>
+                  <a:srgbClr val="38BDF8"/>
                 </a:solidFill>
                 <a:latin typeface="Trebuchet MS" pitchFamily="34" charset="0"/>
                 <a:ea typeface="Trebuchet MS" pitchFamily="34" charset="-122"/>
@@ -3524,7 +3524,7 @@
               </a:rPr>
               <a:t>How Code Structure Evolves</a:t>
             </a:r>
-            <a:endParaRPr lang="en-US" sz="2550" dirty="0"/>
+            <a:endParaRPr lang="en-US" sz="2700" dirty="0"/>
           </a:p>
         </p:txBody>
       </p:sp>
@@ -3536,8 +3536,8 @@
         </p:nvSpPr>
         <p:spPr>
           <a:xfrm>
-            <a:off x="685800" y="1364903"/>
-            <a:ext cx="7772400" cy="1279922"/>
+            <a:off x="647700" y="1344811"/>
+            <a:ext cx="7848600" cy="1359694"/>
           </a:xfrm>
           <a:prstGeom prst="rect">
             <a:avLst/>
@@ -3546,12 +3546,12 @@
           <a:ln/>
         </p:spPr>
         <p:txBody>
-          <a:bodyPr wrap="square" lIns="123825" tIns="0" rIns="0" bIns="0" rtlCol="0" anchor="t"/>
-          <a:lstStyle/>
-          <a:p>
-            <a:pPr algn="l" marL="123825" indent="-123825">
-              <a:lnSpc>
-                <a:spcPts val="2145"/>
+          <a:bodyPr wrap="square" lIns="133350" tIns="0" rIns="0" bIns="0" rtlCol="0" anchor="t"/>
+          <a:lstStyle/>
+          <a:p>
+            <a:pPr algn="l" marL="133350" indent="-133350">
+              <a:lnSpc>
+                <a:spcPts val="2228"/>
               </a:lnSpc>
               <a:buSzPct val="100000"/>
               <a:buChar char="•"/>
@@ -3559,7 +3559,7 @@
             <a:r>
               <a:rPr lang="en-US" sz="1650" b="1" dirty="0">
                 <a:solidFill>
-                  <a:srgbClr val="182D3C"/>
+                  <a:srgbClr val="E2E8F0"/>
                 </a:solidFill>
                 <a:latin typeface="Trebuchet MS" pitchFamily="34" charset="0"/>
                 <a:ea typeface="Trebuchet MS" pitchFamily="34" charset="-122"/>
@@ -3569,14 +3569,14 @@
             </a:r>
             <a:pPr algn="l" indent="0" marL="0">
               <a:lnSpc>
-                <a:spcPts val="2145"/>
+                <a:spcPts val="2228"/>
               </a:lnSpc>
               <a:buNone/>
             </a:pPr>
             <a:r>
               <a:rPr lang="en-US" sz="1650" dirty="0">
                 <a:solidFill>
-                  <a:srgbClr val="182D3C"/>
+                  <a:srgbClr val="E2E8F0"/>
                 </a:solidFill>
                 <a:latin typeface="Trebuchet MS" pitchFamily="34" charset="0"/>
                 <a:ea typeface="Trebuchet MS" pitchFamily="34" charset="-122"/>
@@ -3587,9 +3587,9 @@
             <a:endParaRPr lang="en-US" sz="1650" dirty="0"/>
           </a:p>
           <a:p>
-            <a:pPr algn="l" marL="123825" indent="-123825">
-              <a:lnSpc>
-                <a:spcPts val="2145"/>
+            <a:pPr algn="l" marL="133350" indent="-133350">
+              <a:lnSpc>
+                <a:spcPts val="2228"/>
               </a:lnSpc>
               <a:buSzPct val="100000"/>
               <a:buChar char="•"/>
@@ -3597,7 +3597,7 @@
             <a:r>
               <a:rPr lang="en-US" sz="1650" b="1" dirty="0">
                 <a:solidFill>
-                  <a:srgbClr val="182D3C"/>
+                  <a:srgbClr val="E2E8F0"/>
                 </a:solidFill>
                 <a:latin typeface="Trebuchet MS" pitchFamily="34" charset="0"/>
                 <a:ea typeface="Trebuchet MS" pitchFamily="34" charset="-122"/>
@@ -3607,14 +3607,14 @@
             </a:r>
             <a:pPr algn="l" indent="0" marL="0">
               <a:lnSpc>
-                <a:spcPts val="2145"/>
+                <a:spcPts val="2228"/>
               </a:lnSpc>
               <a:buNone/>
             </a:pPr>
             <a:r>
               <a:rPr lang="en-US" sz="1650" dirty="0">
                 <a:solidFill>
-                  <a:srgbClr val="182D3C"/>
+                  <a:srgbClr val="E2E8F0"/>
                 </a:solidFill>
                 <a:latin typeface="Trebuchet MS" pitchFamily="34" charset="0"/>
                 <a:ea typeface="Trebuchet MS" pitchFamily="34" charset="-122"/>
@@ -3625,9 +3625,9 @@
             <a:endParaRPr lang="en-US" sz="1650" dirty="0"/>
           </a:p>
           <a:p>
-            <a:pPr algn="l" marL="123825" indent="-123825">
-              <a:lnSpc>
-                <a:spcPts val="2145"/>
+            <a:pPr algn="l" marL="133350" indent="-133350">
+              <a:lnSpc>
+                <a:spcPts val="2228"/>
               </a:lnSpc>
               <a:buSzPct val="100000"/>
               <a:buChar char="•"/>
@@ -3635,7 +3635,7 @@
             <a:r>
               <a:rPr lang="en-US" sz="1650" b="1" dirty="0">
                 <a:solidFill>
-                  <a:srgbClr val="182D3C"/>
+                  <a:srgbClr val="E2E8F0"/>
                 </a:solidFill>
                 <a:latin typeface="Trebuchet MS" pitchFamily="34" charset="0"/>
                 <a:ea typeface="Trebuchet MS" pitchFamily="34" charset="-122"/>
@@ -3645,14 +3645,14 @@
             </a:r>
             <a:pPr algn="l" indent="0" marL="0">
               <a:lnSpc>
-                <a:spcPts val="2145"/>
+                <a:spcPts val="2228"/>
               </a:lnSpc>
               <a:buNone/>
             </a:pPr>
             <a:r>
               <a:rPr lang="en-US" sz="1650" dirty="0">
                 <a:solidFill>
-                  <a:srgbClr val="182D3C"/>
+                  <a:srgbClr val="E2E8F0"/>
                 </a:solidFill>
                 <a:latin typeface="Trebuchet MS" pitchFamily="34" charset="0"/>
                 <a:ea typeface="Trebuchet MS" pitchFamily="34" charset="-122"/>
@@ -3678,7 +3678,7 @@
     <p:bg>
       <p:bgPr>
         <a:solidFill>
-          <a:srgbClr val="FCFCFC"/>
+          <a:srgbClr val="0F172A"/>
         </a:solidFill>
       </p:bgPr>
     </p:bg>
@@ -3704,8 +3704,8 @@
         </p:nvSpPr>
         <p:spPr>
           <a:xfrm>
-            <a:off x="685800" y="533400"/>
-            <a:ext cx="7927848" cy="231428"/>
+            <a:off x="647700" y="457200"/>
+            <a:ext cx="8005572" cy="239911"/>
           </a:xfrm>
           <a:prstGeom prst="rect">
             <a:avLst/>
@@ -3719,14 +3719,14 @@
           <a:p>
             <a:pPr algn="l" indent="0" marL="0">
               <a:lnSpc>
-                <a:spcPts val="1823"/>
+                <a:spcPts val="1890"/>
               </a:lnSpc>
               <a:buNone/>
             </a:pPr>
             <a:r>
               <a:rPr lang="en-US" sz="1350" dirty="0">
                 <a:solidFill>
-                  <a:srgbClr val="4A5A68"/>
+                  <a:srgbClr val="F97316"/>
                 </a:solidFill>
                 <a:latin typeface="Trebuchet MS" pitchFamily="34" charset="0"/>
                 <a:ea typeface="Trebuchet MS" pitchFamily="34" charset="-122"/>
@@ -3746,8 +3746,8 @@
         </p:nvSpPr>
         <p:spPr>
           <a:xfrm>
-            <a:off x="685800" y="821978"/>
-            <a:ext cx="7927848" cy="371475"/>
+            <a:off x="647700" y="773311"/>
+            <a:ext cx="8005572" cy="400050"/>
           </a:xfrm>
           <a:prstGeom prst="rect">
             <a:avLst/>
@@ -3763,9 +3763,9 @@
               <a:buNone/>
             </a:pPr>
             <a:r>
-              <a:rPr lang="en-US" sz="2550" b="1" dirty="0">
-                <a:solidFill>
-                  <a:srgbClr val="B165FB"/>
+              <a:rPr lang="en-US" sz="2700" b="1" dirty="0">
+                <a:solidFill>
+                  <a:srgbClr val="38BDF8"/>
                 </a:solidFill>
                 <a:latin typeface="Trebuchet MS" pitchFamily="34" charset="0"/>
                 <a:ea typeface="Trebuchet MS" pitchFamily="34" charset="-122"/>
@@ -3773,7 +3773,7 @@
               </a:rPr>
               <a:t>Containers &amp; Predictability</a:t>
             </a:r>
-            <a:endParaRPr lang="en-US" sz="2550" dirty="0"/>
+            <a:endParaRPr lang="en-US" sz="2700" dirty="0"/>
           </a:p>
         </p:txBody>
       </p:sp>
@@ -3785,8 +3785,8 @@
         </p:nvSpPr>
         <p:spPr>
           <a:xfrm>
-            <a:off x="685800" y="1364903"/>
-            <a:ext cx="7772400" cy="1007566"/>
+            <a:off x="647700" y="1344811"/>
+            <a:ext cx="7848600" cy="1076920"/>
           </a:xfrm>
           <a:prstGeom prst="rect">
             <a:avLst/>
@@ -3795,12 +3795,12 @@
           <a:ln/>
         </p:spPr>
         <p:txBody>
-          <a:bodyPr wrap="square" lIns="123825" tIns="0" rIns="0" bIns="0" rtlCol="0" anchor="t"/>
-          <a:lstStyle/>
-          <a:p>
-            <a:pPr algn="l" marL="123825" indent="-123825">
-              <a:lnSpc>
-                <a:spcPts val="2145"/>
+          <a:bodyPr wrap="square" lIns="133350" tIns="0" rIns="0" bIns="0" rtlCol="0" anchor="t"/>
+          <a:lstStyle/>
+          <a:p>
+            <a:pPr algn="l" marL="133350" indent="-133350">
+              <a:lnSpc>
+                <a:spcPts val="2228"/>
               </a:lnSpc>
               <a:buSzPct val="100000"/>
               <a:buChar char="•"/>
@@ -3808,7 +3808,7 @@
             <a:r>
               <a:rPr lang="en-US" sz="1650" dirty="0">
                 <a:solidFill>
-                  <a:srgbClr val="182D3C"/>
+                  <a:srgbClr val="E2E8F0"/>
                 </a:solidFill>
                 <a:latin typeface="Trebuchet MS" pitchFamily="34" charset="0"/>
                 <a:ea typeface="Trebuchet MS" pitchFamily="34" charset="-122"/>
@@ -3819,9 +3819,9 @@
             <a:endParaRPr lang="en-US" sz="1650" dirty="0"/>
           </a:p>
           <a:p>
-            <a:pPr algn="l" marL="123825" indent="-123825">
-              <a:lnSpc>
-                <a:spcPts val="2145"/>
+            <a:pPr algn="l" marL="133350" indent="-133350">
+              <a:lnSpc>
+                <a:spcPts val="2228"/>
               </a:lnSpc>
               <a:buSzPct val="100000"/>
               <a:buChar char="•"/>
@@ -3829,7 +3829,7 @@
             <a:r>
               <a:rPr lang="en-US" sz="1650" dirty="0">
                 <a:solidFill>
-                  <a:srgbClr val="182D3C"/>
+                  <a:srgbClr val="E2E8F0"/>
                 </a:solidFill>
                 <a:latin typeface="Trebuchet MS" pitchFamily="34" charset="0"/>
                 <a:ea typeface="Trebuchet MS" pitchFamily="34" charset="-122"/>
@@ -3840,9 +3840,9 @@
             <a:endParaRPr lang="en-US" sz="1650" dirty="0"/>
           </a:p>
           <a:p>
-            <a:pPr algn="l" marL="123825" indent="-123825">
-              <a:lnSpc>
-                <a:spcPts val="2145"/>
+            <a:pPr algn="l" marL="133350" indent="-133350">
+              <a:lnSpc>
+                <a:spcPts val="2228"/>
               </a:lnSpc>
               <a:buSzPct val="100000"/>
               <a:buChar char="•"/>
@@ -3850,7 +3850,7 @@
             <a:r>
               <a:rPr lang="en-US" sz="1650" dirty="0">
                 <a:solidFill>
-                  <a:srgbClr val="182D3C"/>
+                  <a:srgbClr val="E2E8F0"/>
                 </a:solidFill>
                 <a:latin typeface="Trebuchet MS" pitchFamily="34" charset="0"/>
                 <a:ea typeface="Trebuchet MS" pitchFamily="34" charset="-122"/>
@@ -3876,7 +3876,7 @@
     <p:bg>
       <p:bgPr>
         <a:solidFill>
-          <a:srgbClr val="FCFCFC"/>
+          <a:srgbClr val="0F172A"/>
         </a:solidFill>
       </p:bgPr>
     </p:bg>
@@ -3902,8 +3902,8 @@
         </p:nvSpPr>
         <p:spPr>
           <a:xfrm>
-            <a:off x="685800" y="533400"/>
-            <a:ext cx="7927848" cy="231428"/>
+            <a:off x="647700" y="457200"/>
+            <a:ext cx="8005572" cy="239911"/>
           </a:xfrm>
           <a:prstGeom prst="rect">
             <a:avLst/>
@@ -3917,14 +3917,14 @@
           <a:p>
             <a:pPr algn="l" indent="0" marL="0">
               <a:lnSpc>
-                <a:spcPts val="1823"/>
+                <a:spcPts val="1890"/>
               </a:lnSpc>
               <a:buNone/>
             </a:pPr>
             <a:r>
               <a:rPr lang="en-US" sz="1350" dirty="0">
                 <a:solidFill>
-                  <a:srgbClr val="4A5A68"/>
+                  <a:srgbClr val="F97316"/>
                 </a:solidFill>
                 <a:latin typeface="Trebuchet MS" pitchFamily="34" charset="0"/>
                 <a:ea typeface="Trebuchet MS" pitchFamily="34" charset="-122"/>
@@ -3944,8 +3944,8 @@
         </p:nvSpPr>
         <p:spPr>
           <a:xfrm>
-            <a:off x="685800" y="821978"/>
-            <a:ext cx="7927848" cy="371475"/>
+            <a:off x="647700" y="773311"/>
+            <a:ext cx="8005572" cy="400050"/>
           </a:xfrm>
           <a:prstGeom prst="rect">
             <a:avLst/>
@@ -3961,9 +3961,9 @@
               <a:buNone/>
             </a:pPr>
             <a:r>
-              <a:rPr lang="en-US" sz="2550" b="1" dirty="0">
-                <a:solidFill>
-                  <a:srgbClr val="B165FB"/>
+              <a:rPr lang="en-US" sz="2700" b="1" dirty="0">
+                <a:solidFill>
+                  <a:srgbClr val="38BDF8"/>
                 </a:solidFill>
                 <a:latin typeface="Trebuchet MS" pitchFamily="34" charset="0"/>
                 <a:ea typeface="Trebuchet MS" pitchFamily="34" charset="-122"/>
@@ -3971,7 +3971,7 @@
               </a:rPr>
               <a:t>GitHub + Agents</a:t>
             </a:r>
-            <a:endParaRPr lang="en-US" sz="2550" dirty="0"/>
+            <a:endParaRPr lang="en-US" sz="2700" dirty="0"/>
           </a:p>
         </p:txBody>
       </p:sp>
@@ -3983,8 +3983,8 @@
         </p:nvSpPr>
         <p:spPr>
           <a:xfrm>
-            <a:off x="685800" y="1364903"/>
-            <a:ext cx="7772400" cy="1007566"/>
+            <a:off x="647700" y="1344811"/>
+            <a:ext cx="7848600" cy="1076920"/>
           </a:xfrm>
           <a:prstGeom prst="rect">
             <a:avLst/>
@@ -3993,12 +3993,12 @@
           <a:ln/>
         </p:spPr>
         <p:txBody>
-          <a:bodyPr wrap="square" lIns="123825" tIns="0" rIns="0" bIns="0" rtlCol="0" anchor="t"/>
-          <a:lstStyle/>
-          <a:p>
-            <a:pPr algn="l" marL="123825" indent="-123825">
-              <a:lnSpc>
-                <a:spcPts val="2145"/>
+          <a:bodyPr wrap="square" lIns="133350" tIns="0" rIns="0" bIns="0" rtlCol="0" anchor="t"/>
+          <a:lstStyle/>
+          <a:p>
+            <a:pPr algn="l" marL="133350" indent="-133350">
+              <a:lnSpc>
+                <a:spcPts val="2228"/>
               </a:lnSpc>
               <a:buSzPct val="100000"/>
               <a:buChar char="•"/>
@@ -4006,7 +4006,7 @@
             <a:r>
               <a:rPr lang="en-US" sz="1650" dirty="0">
                 <a:solidFill>
-                  <a:srgbClr val="182D3C"/>
+                  <a:srgbClr val="E2E8F0"/>
                 </a:solidFill>
                 <a:latin typeface="Trebuchet MS" pitchFamily="34" charset="0"/>
                 <a:ea typeface="Trebuchet MS" pitchFamily="34" charset="-122"/>
@@ -4017,9 +4017,9 @@
             <a:endParaRPr lang="en-US" sz="1650" dirty="0"/>
           </a:p>
           <a:p>
-            <a:pPr algn="l" marL="123825" indent="-123825">
-              <a:lnSpc>
-                <a:spcPts val="2145"/>
+            <a:pPr algn="l" marL="133350" indent="-133350">
+              <a:lnSpc>
+                <a:spcPts val="2228"/>
               </a:lnSpc>
               <a:buSzPct val="100000"/>
               <a:buChar char="•"/>
@@ -4027,7 +4027,7 @@
             <a:r>
               <a:rPr lang="en-US" sz="1650" dirty="0">
                 <a:solidFill>
-                  <a:srgbClr val="182D3C"/>
+                  <a:srgbClr val="E2E8F0"/>
                 </a:solidFill>
                 <a:latin typeface="Trebuchet MS" pitchFamily="34" charset="0"/>
                 <a:ea typeface="Trebuchet MS" pitchFamily="34" charset="-122"/>
@@ -4038,9 +4038,9 @@
             <a:endParaRPr lang="en-US" sz="1650" dirty="0"/>
           </a:p>
           <a:p>
-            <a:pPr algn="l" marL="123825" indent="-123825">
-              <a:lnSpc>
-                <a:spcPts val="2145"/>
+            <a:pPr algn="l" marL="133350" indent="-133350">
+              <a:lnSpc>
+                <a:spcPts val="2228"/>
               </a:lnSpc>
               <a:buSzPct val="100000"/>
               <a:buChar char="•"/>
@@ -4048,7 +4048,7 @@
             <a:r>
               <a:rPr lang="en-US" sz="1650" dirty="0">
                 <a:solidFill>
-                  <a:srgbClr val="182D3C"/>
+                  <a:srgbClr val="E2E8F0"/>
                 </a:solidFill>
                 <a:latin typeface="Trebuchet MS" pitchFamily="34" charset="0"/>
                 <a:ea typeface="Trebuchet MS" pitchFamily="34" charset="-122"/>
@@ -4074,7 +4074,7 @@
     <p:bg>
       <p:bgPr>
         <a:solidFill>
-          <a:srgbClr val="FCFCFC"/>
+          <a:srgbClr val="0F172A"/>
         </a:solidFill>
       </p:bgPr>
     </p:bg>
@@ -4100,8 +4100,8 @@
         </p:nvSpPr>
         <p:spPr>
           <a:xfrm>
-            <a:off x="685800" y="533400"/>
-            <a:ext cx="7927848" cy="231428"/>
+            <a:off x="647700" y="457200"/>
+            <a:ext cx="8005572" cy="239911"/>
           </a:xfrm>
           <a:prstGeom prst="rect">
             <a:avLst/>
@@ -4115,14 +4115,14 @@
           <a:p>
             <a:pPr algn="l" indent="0" marL="0">
               <a:lnSpc>
-                <a:spcPts val="1823"/>
+                <a:spcPts val="1890"/>
               </a:lnSpc>
               <a:buNone/>
             </a:pPr>
             <a:r>
               <a:rPr lang="en-US" sz="1350" dirty="0">
                 <a:solidFill>
-                  <a:srgbClr val="4A5A68"/>
+                  <a:srgbClr val="F97316"/>
                 </a:solidFill>
                 <a:latin typeface="Trebuchet MS" pitchFamily="34" charset="0"/>
                 <a:ea typeface="Trebuchet MS" pitchFamily="34" charset="-122"/>
@@ -4142,8 +4142,8 @@
         </p:nvSpPr>
         <p:spPr>
           <a:xfrm>
-            <a:off x="685800" y="821978"/>
-            <a:ext cx="7927848" cy="371475"/>
+            <a:off x="647700" y="773311"/>
+            <a:ext cx="8005572" cy="400050"/>
           </a:xfrm>
           <a:prstGeom prst="rect">
             <a:avLst/>
@@ -4159,9 +4159,9 @@
               <a:buNone/>
             </a:pPr>
             <a:r>
-              <a:rPr lang="en-US" sz="2550" b="1" dirty="0">
-                <a:solidFill>
-                  <a:srgbClr val="B165FB"/>
+              <a:rPr lang="en-US" sz="2700" b="1" dirty="0">
+                <a:solidFill>
+                  <a:srgbClr val="38BDF8"/>
                 </a:solidFill>
                 <a:latin typeface="Trebuchet MS" pitchFamily="34" charset="0"/>
                 <a:ea typeface="Trebuchet MS" pitchFamily="34" charset="-122"/>
@@ -4169,7 +4169,7 @@
               </a:rPr>
               <a:t>Inside agentic-r</a:t>
             </a:r>
-            <a:endParaRPr lang="en-US" sz="2550" dirty="0"/>
+            <a:endParaRPr lang="en-US" sz="2700" dirty="0"/>
           </a:p>
         </p:txBody>
       </p:sp>
@@ -4181,8 +4181,8 @@
         </p:nvSpPr>
         <p:spPr>
           <a:xfrm>
-            <a:off x="685800" y="1364903"/>
-            <a:ext cx="7772400" cy="1375172"/>
+            <a:off x="647700" y="1344811"/>
+            <a:ext cx="7848600" cy="1473994"/>
           </a:xfrm>
           <a:prstGeom prst="rect">
             <a:avLst/>
@@ -4191,37 +4191,37 @@
           <a:ln/>
         </p:spPr>
         <p:txBody>
-          <a:bodyPr wrap="square" lIns="123825" tIns="0" rIns="0" bIns="0" rtlCol="0" anchor="t"/>
-          <a:lstStyle/>
-          <a:p>
-            <a:pPr algn="l" marL="123825" indent="-123825">
-              <a:lnSpc>
-                <a:spcPts val="2145"/>
+          <a:bodyPr wrap="square" lIns="133350" tIns="0" rIns="0" bIns="0" rtlCol="0" anchor="t"/>
+          <a:lstStyle/>
+          <a:p>
+            <a:pPr algn="l" marL="133350" indent="-133350">
+              <a:lnSpc>
+                <a:spcPts val="2228"/>
               </a:lnSpc>
               <a:buSzPct val="100000"/>
               <a:buChar char="•"/>
             </a:pPr>
             <a:r>
+              <a:rPr lang="en-US" sz="1650" b="1" dirty="0">
+                <a:solidFill>
+                  <a:srgbClr val="38BDF8"/>
+                </a:solidFill>
+                <a:latin typeface="Trebuchet MS" pitchFamily="34" charset="0"/>
+                <a:ea typeface="Trebuchet MS" pitchFamily="34" charset="-122"/>
+                <a:cs typeface="Trebuchet MS" pitchFamily="34" charset="-120"/>
+              </a:rPr>
+              <a:t>AGENTS.md</a:t>
+            </a:r>
+            <a:pPr algn="l" indent="0" marL="0">
+              <a:lnSpc>
+                <a:spcPts val="2228"/>
+              </a:lnSpc>
+              <a:buNone/>
+            </a:pPr>
+            <a:r>
               <a:rPr lang="en-US" sz="1650" dirty="0">
                 <a:solidFill>
-                  <a:srgbClr val="40695B"/>
-                </a:solidFill>
-                <a:latin typeface="Trebuchet MS" pitchFamily="34" charset="0"/>
-                <a:ea typeface="Trebuchet MS" pitchFamily="34" charset="-122"/>
-                <a:cs typeface="Trebuchet MS" pitchFamily="34" charset="-120"/>
-              </a:rPr>
-              <a:t>AGENTS.md</a:t>
-            </a:r>
-            <a:pPr algn="l" indent="0" marL="0">
-              <a:lnSpc>
-                <a:spcPts val="2145"/>
-              </a:lnSpc>
-              <a:buNone/>
-            </a:pPr>
-            <a:r>
-              <a:rPr lang="en-US" sz="1650" dirty="0">
-                <a:solidFill>
-                  <a:srgbClr val="182D3C"/>
+                  <a:srgbClr val="E2E8F0"/>
                 </a:solidFill>
                 <a:latin typeface="Trebuchet MS" pitchFamily="34" charset="0"/>
                 <a:ea typeface="Trebuchet MS" pitchFamily="34" charset="-122"/>
@@ -4232,34 +4232,34 @@
             <a:endParaRPr lang="en-US" sz="1650" dirty="0"/>
           </a:p>
           <a:p>
-            <a:pPr algn="l" marL="123825" indent="-123825">
-              <a:lnSpc>
-                <a:spcPts val="2145"/>
+            <a:pPr algn="l" marL="133350" indent="-133350">
+              <a:lnSpc>
+                <a:spcPts val="2228"/>
               </a:lnSpc>
               <a:buSzPct val="100000"/>
               <a:buChar char="•"/>
             </a:pPr>
             <a:r>
+              <a:rPr lang="en-US" sz="1650" b="1" dirty="0">
+                <a:solidFill>
+                  <a:srgbClr val="38BDF8"/>
+                </a:solidFill>
+                <a:latin typeface="Trebuchet MS" pitchFamily="34" charset="0"/>
+                <a:ea typeface="Trebuchet MS" pitchFamily="34" charset="-122"/>
+                <a:cs typeface="Trebuchet MS" pitchFamily="34" charset="-120"/>
+              </a:rPr>
+              <a:t>dev/run-in-env.sh</a:t>
+            </a:r>
+            <a:pPr algn="l" indent="0" marL="0">
+              <a:lnSpc>
+                <a:spcPts val="2228"/>
+              </a:lnSpc>
+              <a:buNone/>
+            </a:pPr>
+            <a:r>
               <a:rPr lang="en-US" sz="1650" dirty="0">
                 <a:solidFill>
-                  <a:srgbClr val="40695B"/>
-                </a:solidFill>
-                <a:latin typeface="Trebuchet MS" pitchFamily="34" charset="0"/>
-                <a:ea typeface="Trebuchet MS" pitchFamily="34" charset="-122"/>
-                <a:cs typeface="Trebuchet MS" pitchFamily="34" charset="-120"/>
-              </a:rPr>
-              <a:t>dev/run-in-env.sh</a:t>
-            </a:r>
-            <a:pPr algn="l" indent="0" marL="0">
-              <a:lnSpc>
-                <a:spcPts val="2145"/>
-              </a:lnSpc>
-              <a:buNone/>
-            </a:pPr>
-            <a:r>
-              <a:rPr lang="en-US" sz="1650" dirty="0">
-                <a:solidFill>
-                  <a:srgbClr val="182D3C"/>
+                  <a:srgbClr val="E2E8F0"/>
                 </a:solidFill>
                 <a:latin typeface="Trebuchet MS" pitchFamily="34" charset="0"/>
                 <a:ea typeface="Trebuchet MS" pitchFamily="34" charset="-122"/>
@@ -4270,34 +4270,34 @@
             <a:endParaRPr lang="en-US" sz="1650" dirty="0"/>
           </a:p>
           <a:p>
-            <a:pPr algn="l" marL="123825" indent="-123825">
-              <a:lnSpc>
-                <a:spcPts val="2145"/>
+            <a:pPr algn="l" marL="133350" indent="-133350">
+              <a:lnSpc>
+                <a:spcPts val="2228"/>
               </a:lnSpc>
               <a:buSzPct val="100000"/>
               <a:buChar char="•"/>
             </a:pPr>
             <a:r>
+              <a:rPr lang="en-US" sz="1650" b="1" dirty="0">
+                <a:solidFill>
+                  <a:srgbClr val="38BDF8"/>
+                </a:solidFill>
+                <a:latin typeface="Trebuchet MS" pitchFamily="34" charset="0"/>
+                <a:ea typeface="Trebuchet MS" pitchFamily="34" charset="-122"/>
+                <a:cs typeface="Trebuchet MS" pitchFamily="34" charset="-120"/>
+              </a:rPr>
+              <a:t>environment.yml</a:t>
+            </a:r>
+            <a:pPr algn="l" indent="0" marL="0">
+              <a:lnSpc>
+                <a:spcPts val="2228"/>
+              </a:lnSpc>
+              <a:buNone/>
+            </a:pPr>
+            <a:r>
               <a:rPr lang="en-US" sz="1650" dirty="0">
                 <a:solidFill>
-                  <a:srgbClr val="40695B"/>
-                </a:solidFill>
-                <a:latin typeface="Trebuchet MS" pitchFamily="34" charset="0"/>
-                <a:ea typeface="Trebuchet MS" pitchFamily="34" charset="-122"/>
-                <a:cs typeface="Trebuchet MS" pitchFamily="34" charset="-120"/>
-              </a:rPr>
-              <a:t>environment.yml</a:t>
-            </a:r>
-            <a:pPr algn="l" indent="0" marL="0">
-              <a:lnSpc>
-                <a:spcPts val="2145"/>
-              </a:lnSpc>
-              <a:buNone/>
-            </a:pPr>
-            <a:r>
-              <a:rPr lang="en-US" sz="1650" dirty="0">
-                <a:solidFill>
-                  <a:srgbClr val="182D3C"/>
+                  <a:srgbClr val="E2E8F0"/>
                 </a:solidFill>
                 <a:latin typeface="Trebuchet MS" pitchFamily="34" charset="0"/>
                 <a:ea typeface="Trebuchet MS" pitchFamily="34" charset="-122"/>
@@ -4308,34 +4308,34 @@
             <a:endParaRPr lang="en-US" sz="1650" dirty="0"/>
           </a:p>
           <a:p>
-            <a:pPr algn="l" marL="123825" indent="-123825">
-              <a:lnSpc>
-                <a:spcPts val="2145"/>
+            <a:pPr algn="l" marL="133350" indent="-133350">
+              <a:lnSpc>
+                <a:spcPts val="2228"/>
               </a:lnSpc>
               <a:buSzPct val="100000"/>
               <a:buChar char="•"/>
             </a:pPr>
             <a:r>
+              <a:rPr lang="en-US" sz="1650" b="1" dirty="0">
+                <a:solidFill>
+                  <a:srgbClr val="38BDF8"/>
+                </a:solidFill>
+                <a:latin typeface="Trebuchet MS" pitchFamily="34" charset="0"/>
+                <a:ea typeface="Trebuchet MS" pitchFamily="34" charset="-122"/>
+                <a:cs typeface="Trebuchet MS" pitchFamily="34" charset="-120"/>
+              </a:rPr>
+              <a:t>Makefile</a:t>
+            </a:r>
+            <a:pPr algn="l" indent="0" marL="0">
+              <a:lnSpc>
+                <a:spcPts val="2228"/>
+              </a:lnSpc>
+              <a:buNone/>
+            </a:pPr>
+            <a:r>
               <a:rPr lang="en-US" sz="1650" dirty="0">
                 <a:solidFill>
-                  <a:srgbClr val="40695B"/>
-                </a:solidFill>
-                <a:latin typeface="Trebuchet MS" pitchFamily="34" charset="0"/>
-                <a:ea typeface="Trebuchet MS" pitchFamily="34" charset="-122"/>
-                <a:cs typeface="Trebuchet MS" pitchFamily="34" charset="-120"/>
-              </a:rPr>
-              <a:t>Makefile</a:t>
-            </a:r>
-            <a:pPr algn="l" indent="0" marL="0">
-              <a:lnSpc>
-                <a:spcPts val="2145"/>
-              </a:lnSpc>
-              <a:buNone/>
-            </a:pPr>
-            <a:r>
-              <a:rPr lang="en-US" sz="1650" dirty="0">
-                <a:solidFill>
-                  <a:srgbClr val="182D3C"/>
+                  <a:srgbClr val="E2E8F0"/>
                 </a:solidFill>
                 <a:latin typeface="Trebuchet MS" pitchFamily="34" charset="0"/>
                 <a:ea typeface="Trebuchet MS" pitchFamily="34" charset="-122"/>
@@ -4361,7 +4361,7 @@
     <p:bg>
       <p:bgPr>
         <a:solidFill>
-          <a:srgbClr val="FCFCFC"/>
+          <a:srgbClr val="0F172A"/>
         </a:solidFill>
       </p:bgPr>
     </p:bg>
@@ -4387,8 +4387,8 @@
         </p:nvSpPr>
         <p:spPr>
           <a:xfrm>
-            <a:off x="685800" y="533400"/>
-            <a:ext cx="7927848" cy="231428"/>
+            <a:off x="647700" y="457200"/>
+            <a:ext cx="8005572" cy="239911"/>
           </a:xfrm>
           <a:prstGeom prst="rect">
             <a:avLst/>
@@ -4402,14 +4402,14 @@
           <a:p>
             <a:pPr algn="l" indent="0" marL="0">
               <a:lnSpc>
-                <a:spcPts val="1823"/>
+                <a:spcPts val="1890"/>
               </a:lnSpc>
               <a:buNone/>
             </a:pPr>
             <a:r>
               <a:rPr lang="en-US" sz="1350" dirty="0">
                 <a:solidFill>
-                  <a:srgbClr val="4A5A68"/>
+                  <a:srgbClr val="F97316"/>
                 </a:solidFill>
                 <a:latin typeface="Trebuchet MS" pitchFamily="34" charset="0"/>
                 <a:ea typeface="Trebuchet MS" pitchFamily="34" charset="-122"/>
@@ -4429,8 +4429,8 @@
         </p:nvSpPr>
         <p:spPr>
           <a:xfrm>
-            <a:off x="685800" y="821978"/>
-            <a:ext cx="7927848" cy="371475"/>
+            <a:off x="647700" y="773311"/>
+            <a:ext cx="8005572" cy="400050"/>
           </a:xfrm>
           <a:prstGeom prst="rect">
             <a:avLst/>
@@ -4446,9 +4446,9 @@
               <a:buNone/>
             </a:pPr>
             <a:r>
-              <a:rPr lang="en-US" sz="2550" b="1" dirty="0">
-                <a:solidFill>
-                  <a:srgbClr val="B165FB"/>
+              <a:rPr lang="en-US" sz="2700" b="1" dirty="0">
+                <a:solidFill>
+                  <a:srgbClr val="38BDF8"/>
                 </a:solidFill>
                 <a:latin typeface="Trebuchet MS" pitchFamily="34" charset="0"/>
                 <a:ea typeface="Trebuchet MS" pitchFamily="34" charset="-122"/>
@@ -4456,7 +4456,7 @@
               </a:rPr>
               <a:t>Pipeline Overview</a:t>
             </a:r>
-            <a:endParaRPr lang="en-US" sz="2550" dirty="0"/>
+            <a:endParaRPr lang="en-US" sz="2700" dirty="0"/>
           </a:p>
         </p:txBody>
       </p:sp>
@@ -4468,8 +4468,8 @@
         </p:nvSpPr>
         <p:spPr>
           <a:xfrm>
-            <a:off x="685800" y="1364903"/>
-            <a:ext cx="7772400" cy="1375172"/>
+            <a:off x="647700" y="1344811"/>
+            <a:ext cx="7848600" cy="1473994"/>
           </a:xfrm>
           <a:prstGeom prst="rect">
             <a:avLst/>
@@ -4478,12 +4478,12 @@
           <a:ln/>
         </p:spPr>
         <p:txBody>
-          <a:bodyPr wrap="square" lIns="123825" tIns="0" rIns="0" bIns="0" rtlCol="0" anchor="t"/>
-          <a:lstStyle/>
-          <a:p>
-            <a:pPr algn="l" marL="123825" indent="-123825">
-              <a:lnSpc>
-                <a:spcPts val="2145"/>
+          <a:bodyPr wrap="square" lIns="133350" tIns="0" rIns="0" bIns="0" rtlCol="0" anchor="t"/>
+          <a:lstStyle/>
+          <a:p>
+            <a:pPr algn="l" marL="133350" indent="-133350">
+              <a:lnSpc>
+                <a:spcPts val="2228"/>
               </a:lnSpc>
               <a:buSzPct val="100000"/>
               <a:buChar char="•"/>
@@ -4491,7 +4491,7 @@
             <a:r>
               <a:rPr lang="en-US" sz="1650" dirty="0">
                 <a:solidFill>
-                  <a:srgbClr val="182D3C"/>
+                  <a:srgbClr val="E2E8F0"/>
                 </a:solidFill>
                 <a:latin typeface="Trebuchet MS" pitchFamily="34" charset="0"/>
                 <a:ea typeface="Trebuchet MS" pitchFamily="34" charset="-122"/>
@@ -4501,48 +4501,48 @@
             </a:r>
             <a:pPr algn="l" indent="0" marL="0">
               <a:lnSpc>
-                <a:spcPts val="2145"/>
+                <a:spcPts val="2228"/>
               </a:lnSpc>
               <a:buNone/>
             </a:pPr>
             <a:r>
+              <a:rPr lang="en-US" sz="1650" b="1" dirty="0">
+                <a:solidFill>
+                  <a:srgbClr val="38BDF8"/>
+                </a:solidFill>
+                <a:latin typeface="Trebuchet MS" pitchFamily="34" charset="0"/>
+                <a:ea typeface="Trebuchet MS" pitchFamily="34" charset="-122"/>
+                <a:cs typeface="Trebuchet MS" pitchFamily="34" charset="-120"/>
+              </a:rPr>
+              <a:t>01_prepare.R</a:t>
+            </a:r>
+            <a:pPr algn="l" indent="0" marL="0">
+              <a:lnSpc>
+                <a:spcPts val="2228"/>
+              </a:lnSpc>
+              <a:buNone/>
+            </a:pPr>
+            <a:r>
               <a:rPr lang="en-US" sz="1650" dirty="0">
                 <a:solidFill>
-                  <a:srgbClr val="40695B"/>
-                </a:solidFill>
-                <a:latin typeface="Trebuchet MS" pitchFamily="34" charset="0"/>
-                <a:ea typeface="Trebuchet MS" pitchFamily="34" charset="-122"/>
-                <a:cs typeface="Trebuchet MS" pitchFamily="34" charset="-120"/>
-              </a:rPr>
-              <a:t>01_prepare.R</a:t>
+                  <a:srgbClr val="E2E8F0"/>
+                </a:solidFill>
+                <a:latin typeface="Trebuchet MS" pitchFamily="34" charset="0"/>
+                <a:ea typeface="Trebuchet MS" pitchFamily="34" charset="-122"/>
+                <a:cs typeface="Trebuchet MS" pitchFamily="34" charset="-120"/>
+              </a:rPr>
+              <a:t> then </a:t>
             </a:r>
             <a:pPr algn="l" indent="0" marL="0">
               <a:lnSpc>
-                <a:spcPts val="2145"/>
+                <a:spcPts val="2228"/>
               </a:lnSpc>
               <a:buNone/>
             </a:pPr>
             <a:r>
-              <a:rPr lang="en-US" sz="1650" dirty="0">
-                <a:solidFill>
-                  <a:srgbClr val="182D3C"/>
-                </a:solidFill>
-                <a:latin typeface="Trebuchet MS" pitchFamily="34" charset="0"/>
-                <a:ea typeface="Trebuchet MS" pitchFamily="34" charset="-122"/>
-                <a:cs typeface="Trebuchet MS" pitchFamily="34" charset="-120"/>
-              </a:rPr>
-              <a:t> then </a:t>
-            </a:r>
-            <a:pPr algn="l" indent="0" marL="0">
-              <a:lnSpc>
-                <a:spcPts val="2145"/>
-              </a:lnSpc>
-              <a:buNone/>
-            </a:pPr>
-            <a:r>
-              <a:rPr lang="en-US" sz="1650" dirty="0">
-                <a:solidFill>
-                  <a:srgbClr val="40695B"/>
+              <a:rPr lang="en-US" sz="1650" b="1" dirty="0">
+                <a:solidFill>
+                  <a:srgbClr val="38BDF8"/>
                 </a:solidFill>
                 <a:latin typeface="Trebuchet MS" pitchFamily="34" charset="0"/>
                 <a:ea typeface="Trebuchet MS" pitchFamily="34" charset="-122"/>
@@ -4553,9 +4553,9 @@
             <a:endParaRPr lang="en-US" sz="1650" dirty="0"/>
           </a:p>
           <a:p>
-            <a:pPr algn="l" marL="123825" indent="-123825">
-              <a:lnSpc>
-                <a:spcPts val="2145"/>
+            <a:pPr algn="l" marL="133350" indent="-133350">
+              <a:lnSpc>
+                <a:spcPts val="2228"/>
               </a:lnSpc>
               <a:buSzPct val="100000"/>
               <a:buChar char="•"/>
@@ -4563,7 +4563,7 @@
             <a:r>
               <a:rPr lang="en-US" sz="1650" dirty="0">
                 <a:solidFill>
-                  <a:srgbClr val="182D3C"/>
+                  <a:srgbClr val="E2E8F0"/>
                 </a:solidFill>
                 <a:latin typeface="Trebuchet MS" pitchFamily="34" charset="0"/>
                 <a:ea typeface="Trebuchet MS" pitchFamily="34" charset="-122"/>
@@ -4573,14 +4573,14 @@
             </a:r>
             <a:pPr algn="l" indent="0" marL="0">
               <a:lnSpc>
-                <a:spcPts val="2145"/>
+                <a:spcPts val="2228"/>
               </a:lnSpc>
               <a:buNone/>
             </a:pPr>
             <a:r>
-              <a:rPr lang="en-US" sz="1650" dirty="0">
-                <a:solidFill>
-                  <a:srgbClr val="40695B"/>
+              <a:rPr lang="en-US" sz="1650" b="1" dirty="0">
+                <a:solidFill>
+                  <a:srgbClr val="38BDF8"/>
                 </a:solidFill>
                 <a:latin typeface="Trebuchet MS" pitchFamily="34" charset="0"/>
                 <a:ea typeface="Trebuchet MS" pitchFamily="34" charset="-122"/>
@@ -4591,9 +4591,9 @@
             <a:endParaRPr lang="en-US" sz="1650" dirty="0"/>
           </a:p>
           <a:p>
-            <a:pPr algn="l" marL="123825" indent="-123825">
-              <a:lnSpc>
-                <a:spcPts val="2145"/>
+            <a:pPr algn="l" marL="133350" indent="-133350">
+              <a:lnSpc>
+                <a:spcPts val="2228"/>
               </a:lnSpc>
               <a:buSzPct val="100000"/>
               <a:buChar char="•"/>
@@ -4601,7 +4601,7 @@
             <a:r>
               <a:rPr lang="en-US" sz="1650" dirty="0">
                 <a:solidFill>
-                  <a:srgbClr val="182D3C"/>
+                  <a:srgbClr val="E2E8F0"/>
                 </a:solidFill>
                 <a:latin typeface="Trebuchet MS" pitchFamily="34" charset="0"/>
                 <a:ea typeface="Trebuchet MS" pitchFamily="34" charset="-122"/>
@@ -4612,9 +4612,9 @@
             <a:endParaRPr lang="en-US" sz="1650" dirty="0"/>
           </a:p>
           <a:p>
-            <a:pPr algn="l" marL="123825" indent="-123825">
-              <a:lnSpc>
-                <a:spcPts val="2145"/>
+            <a:pPr algn="l" marL="133350" indent="-133350">
+              <a:lnSpc>
+                <a:spcPts val="2228"/>
               </a:lnSpc>
               <a:buSzPct val="100000"/>
               <a:buChar char="•"/>
@@ -4622,7 +4622,7 @@
             <a:r>
               <a:rPr lang="en-US" sz="1650" dirty="0">
                 <a:solidFill>
-                  <a:srgbClr val="182D3C"/>
+                  <a:srgbClr val="E2E8F0"/>
                 </a:solidFill>
                 <a:latin typeface="Trebuchet MS" pitchFamily="34" charset="0"/>
                 <a:ea typeface="Trebuchet MS" pitchFamily="34" charset="-122"/>
@@ -4648,7 +4648,7 @@
     <p:bg>
       <p:bgPr>
         <a:solidFill>
-          <a:srgbClr val="FCFCFC"/>
+          <a:srgbClr val="0F172A"/>
         </a:solidFill>
       </p:bgPr>
     </p:bg>
@@ -4674,8 +4674,8 @@
         </p:nvSpPr>
         <p:spPr>
           <a:xfrm>
-            <a:off x="685800" y="533400"/>
-            <a:ext cx="7927848" cy="231428"/>
+            <a:off x="647700" y="457200"/>
+            <a:ext cx="8005572" cy="239911"/>
           </a:xfrm>
           <a:prstGeom prst="rect">
             <a:avLst/>
@@ -4689,14 +4689,14 @@
           <a:p>
             <a:pPr algn="l" indent="0" marL="0">
               <a:lnSpc>
-                <a:spcPts val="1823"/>
+                <a:spcPts val="1890"/>
               </a:lnSpc>
               <a:buNone/>
             </a:pPr>
             <a:r>
               <a:rPr lang="en-US" sz="1350" dirty="0">
                 <a:solidFill>
-                  <a:srgbClr val="4A5A68"/>
+                  <a:srgbClr val="F97316"/>
                 </a:solidFill>
                 <a:latin typeface="Trebuchet MS" pitchFamily="34" charset="0"/>
                 <a:ea typeface="Trebuchet MS" pitchFamily="34" charset="-122"/>
@@ -4716,8 +4716,8 @@
         </p:nvSpPr>
         <p:spPr>
           <a:xfrm>
-            <a:off x="685800" y="821978"/>
-            <a:ext cx="7927848" cy="371475"/>
+            <a:off x="647700" y="773311"/>
+            <a:ext cx="8005572" cy="400050"/>
           </a:xfrm>
           <a:prstGeom prst="rect">
             <a:avLst/>
@@ -4733,9 +4733,9 @@
               <a:buNone/>
             </a:pPr>
             <a:r>
-              <a:rPr lang="en-US" sz="2550" b="1" dirty="0">
-                <a:solidFill>
-                  <a:srgbClr val="B165FB"/>
+              <a:rPr lang="en-US" sz="2700" b="1" dirty="0">
+                <a:solidFill>
+                  <a:srgbClr val="38BDF8"/>
                 </a:solidFill>
                 <a:latin typeface="Trebuchet MS" pitchFamily="34" charset="0"/>
                 <a:ea typeface="Trebuchet MS" pitchFamily="34" charset="-122"/>
@@ -4743,7 +4743,7 @@
               </a:rPr>
               <a:t>Lexical Decision in Chinese</a:t>
             </a:r>
-            <a:endParaRPr lang="en-US" sz="2550" dirty="0"/>
+            <a:endParaRPr lang="en-US" sz="2700" dirty="0"/>
           </a:p>
         </p:txBody>
       </p:sp>
@@ -4755,8 +4755,8 @@
         </p:nvSpPr>
         <p:spPr>
           <a:xfrm>
-            <a:off x="685800" y="1364903"/>
-            <a:ext cx="7772400" cy="912316"/>
+            <a:off x="647700" y="1344811"/>
+            <a:ext cx="7848600" cy="962620"/>
           </a:xfrm>
           <a:prstGeom prst="rect">
             <a:avLst/>
@@ -4765,12 +4765,12 @@
           <a:ln/>
         </p:spPr>
         <p:txBody>
-          <a:bodyPr wrap="square" lIns="123825" tIns="0" rIns="0" bIns="0" rtlCol="0" anchor="t"/>
-          <a:lstStyle/>
-          <a:p>
-            <a:pPr algn="l" marL="123825" indent="-123825">
-              <a:lnSpc>
-                <a:spcPts val="2145"/>
+          <a:bodyPr wrap="square" lIns="133350" tIns="0" rIns="0" bIns="0" rtlCol="0" anchor="t"/>
+          <a:lstStyle/>
+          <a:p>
+            <a:pPr algn="l" marL="133350" indent="-133350">
+              <a:lnSpc>
+                <a:spcPts val="2228"/>
               </a:lnSpc>
               <a:buSzPct val="100000"/>
               <a:buChar char="•"/>
@@ -4778,7 +4778,7 @@
             <a:r>
               <a:rPr lang="en-US" sz="1650" dirty="0">
                 <a:solidFill>
-                  <a:srgbClr val="182D3C"/>
+                  <a:srgbClr val="E2E8F0"/>
                 </a:solidFill>
                 <a:latin typeface="Trebuchet MS" pitchFamily="34" charset="0"/>
                 <a:ea typeface="Trebuchet MS" pitchFamily="34" charset="-122"/>
@@ -4788,14 +4788,14 @@
             </a:r>
             <a:pPr algn="l" indent="0" marL="0">
               <a:lnSpc>
-                <a:spcPts val="2145"/>
+                <a:spcPts val="2228"/>
               </a:lnSpc>
               <a:buNone/>
             </a:pPr>
             <a:r>
               <a:rPr lang="en-US" sz="1650" i="1" dirty="0">
                 <a:solidFill>
-                  <a:srgbClr val="182D3C"/>
+                  <a:srgbClr val="E2E8F0"/>
                 </a:solidFill>
                 <a:latin typeface="Trebuchet MS" pitchFamily="34" charset="0"/>
                 <a:ea typeface="Trebuchet MS" pitchFamily="34" charset="-122"/>
@@ -4805,14 +4805,14 @@
             </a:r>
             <a:pPr algn="l" indent="0" marL="0">
               <a:lnSpc>
-                <a:spcPts val="2145"/>
+                <a:spcPts val="2228"/>
               </a:lnSpc>
               <a:buNone/>
             </a:pPr>
             <a:r>
               <a:rPr lang="en-US" sz="1650" dirty="0">
                 <a:solidFill>
-                  <a:srgbClr val="182D3C"/>
+                  <a:srgbClr val="E2E8F0"/>
                 </a:solidFill>
                 <a:latin typeface="Trebuchet MS" pitchFamily="34" charset="0"/>
                 <a:ea typeface="Trebuchet MS" pitchFamily="34" charset="-122"/>
@@ -4823,9 +4823,9 @@
             <a:endParaRPr lang="en-US" sz="1650" dirty="0"/>
           </a:p>
           <a:p>
-            <a:pPr algn="l" marL="123825" indent="-123825">
-              <a:lnSpc>
-                <a:spcPts val="2145"/>
+            <a:pPr algn="l" marL="133350" indent="-133350">
+              <a:lnSpc>
+                <a:spcPts val="2228"/>
               </a:lnSpc>
               <a:buSzPct val="100000"/>
               <a:buChar char="•"/>
@@ -4833,7 +4833,7 @@
             <a:r>
               <a:rPr lang="en-US" sz="1650" dirty="0">
                 <a:solidFill>
-                  <a:srgbClr val="182D3C"/>
+                  <a:srgbClr val="E2E8F0"/>
                 </a:solidFill>
                 <a:latin typeface="Trebuchet MS" pitchFamily="34" charset="0"/>
                 <a:ea typeface="Trebuchet MS" pitchFamily="34" charset="-122"/>
@@ -4843,14 +4843,14 @@
             </a:r>
             <a:pPr algn="l" indent="0" marL="0">
               <a:lnSpc>
-                <a:spcPts val="2145"/>
+                <a:spcPts val="2228"/>
               </a:lnSpc>
               <a:buNone/>
             </a:pPr>
             <a:r>
               <a:rPr lang="en-US" sz="1650" i="1" dirty="0">
                 <a:solidFill>
-                  <a:srgbClr val="182D3C"/>
+                  <a:srgbClr val="E2E8F0"/>
                 </a:solidFill>
                 <a:latin typeface="Trebuchet MS" pitchFamily="34" charset="0"/>
                 <a:ea typeface="Trebuchet MS" pitchFamily="34" charset="-122"/>
@@ -4860,14 +4860,14 @@
             </a:r>
             <a:pPr algn="l" indent="0" marL="0">
               <a:lnSpc>
-                <a:spcPts val="2145"/>
+                <a:spcPts val="2228"/>
               </a:lnSpc>
               <a:buNone/>
             </a:pPr>
             <a:r>
               <a:rPr lang="en-US" sz="1650" dirty="0">
                 <a:solidFill>
-                  <a:srgbClr val="182D3C"/>
+                  <a:srgbClr val="E2E8F0"/>
                 </a:solidFill>
                 <a:latin typeface="Trebuchet MS" pitchFamily="34" charset="0"/>
                 <a:ea typeface="Trebuchet MS" pitchFamily="34" charset="-122"/>
@@ -4887,18 +4887,25 @@
         </p:nvSpPr>
         <p:spPr>
           <a:xfrm>
-            <a:off x="685800" y="2448669"/>
-            <a:ext cx="7772400" cy="625673"/>
+            <a:off x="647700" y="2478881"/>
+            <a:ext cx="7848600" cy="674340"/>
           </a:xfrm>
           <a:prstGeom prst="roundRect">
             <a:avLst>
-              <a:gd name="adj" fmla="val 24358"/>
+              <a:gd name="adj" fmla="val 25425"/>
             </a:avLst>
           </a:prstGeom>
           <a:solidFill>
-            <a:srgbClr val="FBEFFF"/>
+            <a:srgbClr val="1B2A44"/>
           </a:solidFill>
           <a:ln/>
+          <a:effectLst>
+            <a:outerShdw sx="100000" sy="100000" kx="0" ky="0" algn="bl" rotWithShape="0" blurRad="171450" dist="76200" dir="5400000">
+              <a:srgbClr val="050c1a">
+                <a:alpha val="30000"/>
+              </a:srgbClr>
+            </a:outerShdw>
+          </a:effectLst>
         </p:spPr>
         <p:txBody>
           <a:bodyPr wrap="square" rtlCol="0" anchor="ctr"/>
@@ -4919,8 +4926,8 @@
         </p:nvSpPr>
         <p:spPr>
           <a:xfrm>
-            <a:off x="876300" y="2620119"/>
-            <a:ext cx="7539228" cy="282773"/>
+            <a:off x="876300" y="2669381"/>
+            <a:ext cx="7539228" cy="293340"/>
           </a:xfrm>
           <a:prstGeom prst="rect">
             <a:avLst/>
@@ -4934,14 +4941,14 @@
           <a:p>
             <a:pPr algn="l" indent="0" marL="0">
               <a:lnSpc>
-                <a:spcPts val="2228"/>
+                <a:spcPts val="2310"/>
               </a:lnSpc>
               <a:buNone/>
             </a:pPr>
             <a:r>
               <a:rPr lang="en-US" sz="1650" dirty="0">
                 <a:solidFill>
-                  <a:srgbClr val="182D3C"/>
+                  <a:srgbClr val="E2E8F0"/>
                 </a:solidFill>
                 <a:latin typeface="Trebuchet MS" pitchFamily="34" charset="0"/>
                 <a:ea typeface="Trebuchet MS" pitchFamily="34" charset="-122"/>
@@ -4951,31 +4958,31 @@
             </a:r>
             <a:pPr algn="l" indent="0" marL="0">
               <a:lnSpc>
-                <a:spcPts val="2228"/>
+                <a:spcPts val="2310"/>
               </a:lnSpc>
               <a:buNone/>
             </a:pPr>
             <a:r>
+              <a:rPr lang="en-US" sz="1650" b="1" dirty="0">
+                <a:solidFill>
+                  <a:srgbClr val="38BDF8"/>
+                </a:solidFill>
+                <a:latin typeface="Trebuchet MS" pitchFamily="34" charset="0"/>
+                <a:ea typeface="Trebuchet MS" pitchFamily="34" charset="-122"/>
+                <a:cs typeface="Trebuchet MS" pitchFamily="34" charset="-120"/>
+              </a:rPr>
+              <a:t>results/metrics.yml</a:t>
+            </a:r>
+            <a:pPr algn="l" indent="0" marL="0">
+              <a:lnSpc>
+                <a:spcPts val="2310"/>
+              </a:lnSpc>
+              <a:buNone/>
+            </a:pPr>
+            <a:r>
               <a:rPr lang="en-US" sz="1650" dirty="0">
                 <a:solidFill>
-                  <a:srgbClr val="40695B"/>
-                </a:solidFill>
-                <a:latin typeface="Trebuchet MS" pitchFamily="34" charset="0"/>
-                <a:ea typeface="Trebuchet MS" pitchFamily="34" charset="-122"/>
-                <a:cs typeface="Trebuchet MS" pitchFamily="34" charset="-120"/>
-              </a:rPr>
-              <a:t>results/metrics.yml</a:t>
-            </a:r>
-            <a:pPr algn="l" indent="0" marL="0">
-              <a:lnSpc>
-                <a:spcPts val="2228"/>
-              </a:lnSpc>
-              <a:buNone/>
-            </a:pPr>
-            <a:r>
-              <a:rPr lang="en-US" sz="1650" dirty="0">
-                <a:solidFill>
-                  <a:srgbClr val="182D3C"/>
+                  <a:srgbClr val="E2E8F0"/>
                 </a:solidFill>
                 <a:latin typeface="Trebuchet MS" pitchFamily="34" charset="0"/>
                 <a:ea typeface="Trebuchet MS" pitchFamily="34" charset="-122"/>
@@ -5001,7 +5008,7 @@
     <p:bg>
       <p:bgPr>
         <a:solidFill>
-          <a:srgbClr val="FCFCFC"/>
+          <a:srgbClr val="0F172A"/>
         </a:solidFill>
       </p:bgPr>
     </p:bg>
@@ -5027,8 +5034,8 @@
         </p:nvSpPr>
         <p:spPr>
           <a:xfrm>
-            <a:off x="685800" y="533400"/>
-            <a:ext cx="7927848" cy="231428"/>
+            <a:off x="647700" y="457200"/>
+            <a:ext cx="8005572" cy="239911"/>
           </a:xfrm>
           <a:prstGeom prst="rect">
             <a:avLst/>
@@ -5042,14 +5049,14 @@
           <a:p>
             <a:pPr algn="l" indent="0" marL="0">
               <a:lnSpc>
-                <a:spcPts val="1823"/>
+                <a:spcPts val="1890"/>
               </a:lnSpc>
               <a:buNone/>
             </a:pPr>
             <a:r>
               <a:rPr lang="en-US" sz="1350" dirty="0">
                 <a:solidFill>
-                  <a:srgbClr val="4A5A68"/>
+                  <a:srgbClr val="F97316"/>
                 </a:solidFill>
                 <a:latin typeface="Trebuchet MS" pitchFamily="34" charset="0"/>
                 <a:ea typeface="Trebuchet MS" pitchFamily="34" charset="-122"/>
@@ -5069,8 +5076,8 @@
         </p:nvSpPr>
         <p:spPr>
           <a:xfrm>
-            <a:off x="685800" y="821978"/>
-            <a:ext cx="7927848" cy="371475"/>
+            <a:off x="647700" y="773311"/>
+            <a:ext cx="8005572" cy="400050"/>
           </a:xfrm>
           <a:prstGeom prst="rect">
             <a:avLst/>
@@ -5086,9 +5093,9 @@
               <a:buNone/>
             </a:pPr>
             <a:r>
-              <a:rPr lang="en-US" sz="2550" b="1" dirty="0">
-                <a:solidFill>
-                  <a:srgbClr val="B165FB"/>
+              <a:rPr lang="en-US" sz="2700" b="1" dirty="0">
+                <a:solidFill>
+                  <a:srgbClr val="38BDF8"/>
                 </a:solidFill>
                 <a:latin typeface="Trebuchet MS" pitchFamily="34" charset="0"/>
                 <a:ea typeface="Trebuchet MS" pitchFamily="34" charset="-122"/>
@@ -5096,7 +5103,7 @@
               </a:rPr>
               <a:t>Builder Pattern</a:t>
             </a:r>
-            <a:endParaRPr lang="en-US" sz="2550" dirty="0"/>
+            <a:endParaRPr lang="en-US" sz="2700" dirty="0"/>
           </a:p>
         </p:txBody>
       </p:sp>
@@ -5108,8 +5115,8 @@
         </p:nvSpPr>
         <p:spPr>
           <a:xfrm>
-            <a:off x="685800" y="1364903"/>
-            <a:ext cx="7772400" cy="1375172"/>
+            <a:off x="647700" y="1344811"/>
+            <a:ext cx="7848600" cy="1473994"/>
           </a:xfrm>
           <a:prstGeom prst="rect">
             <a:avLst/>
@@ -5118,12 +5125,12 @@
           <a:ln/>
         </p:spPr>
         <p:txBody>
-          <a:bodyPr wrap="square" lIns="123825" tIns="0" rIns="0" bIns="0" rtlCol="0" anchor="t"/>
-          <a:lstStyle/>
-          <a:p>
-            <a:pPr algn="l" marL="123825" indent="-123825">
-              <a:lnSpc>
-                <a:spcPts val="2145"/>
+          <a:bodyPr wrap="square" lIns="133350" tIns="0" rIns="0" bIns="0" rtlCol="0" anchor="t"/>
+          <a:lstStyle/>
+          <a:p>
+            <a:pPr algn="l" marL="133350" indent="-133350">
+              <a:lnSpc>
+                <a:spcPts val="2228"/>
               </a:lnSpc>
               <a:buSzPct val="100000"/>
               <a:buChar char="•"/>
@@ -5131,7 +5138,7 @@
             <a:r>
               <a:rPr lang="en-US" sz="1650" dirty="0">
                 <a:solidFill>
-                  <a:srgbClr val="182D3C"/>
+                  <a:srgbClr val="E2E8F0"/>
                 </a:solidFill>
                 <a:latin typeface="Trebuchet MS" pitchFamily="34" charset="0"/>
                 <a:ea typeface="Trebuchet MS" pitchFamily="34" charset="-122"/>
@@ -5142,9 +5149,9 @@
             <a:endParaRPr lang="en-US" sz="1650" dirty="0"/>
           </a:p>
           <a:p>
-            <a:pPr algn="l" marL="123825" indent="-123825">
-              <a:lnSpc>
-                <a:spcPts val="2145"/>
+            <a:pPr algn="l" marL="133350" indent="-133350">
+              <a:lnSpc>
+                <a:spcPts val="2228"/>
               </a:lnSpc>
               <a:buSzPct val="100000"/>
               <a:buChar char="•"/>
@@ -5152,7 +5159,7 @@
             <a:r>
               <a:rPr lang="en-US" sz="1650" dirty="0">
                 <a:solidFill>
-                  <a:srgbClr val="182D3C"/>
+                  <a:srgbClr val="E2E8F0"/>
                 </a:solidFill>
                 <a:latin typeface="Trebuchet MS" pitchFamily="34" charset="0"/>
                 <a:ea typeface="Trebuchet MS" pitchFamily="34" charset="-122"/>
@@ -5163,9 +5170,9 @@
             <a:endParaRPr lang="en-US" sz="1650" dirty="0"/>
           </a:p>
           <a:p>
-            <a:pPr algn="l" marL="123825" indent="-123825">
-              <a:lnSpc>
-                <a:spcPts val="2145"/>
+            <a:pPr algn="l" marL="133350" indent="-133350">
+              <a:lnSpc>
+                <a:spcPts val="2228"/>
               </a:lnSpc>
               <a:buSzPct val="100000"/>
               <a:buChar char="•"/>
@@ -5173,7 +5180,7 @@
             <a:r>
               <a:rPr lang="en-US" sz="1650" dirty="0">
                 <a:solidFill>
-                  <a:srgbClr val="182D3C"/>
+                  <a:srgbClr val="E2E8F0"/>
                 </a:solidFill>
                 <a:latin typeface="Trebuchet MS" pitchFamily="34" charset="0"/>
                 <a:ea typeface="Trebuchet MS" pitchFamily="34" charset="-122"/>
@@ -5184,9 +5191,9 @@
             <a:endParaRPr lang="en-US" sz="1650" dirty="0"/>
           </a:p>
           <a:p>
-            <a:pPr algn="l" marL="123825" indent="-123825">
-              <a:lnSpc>
-                <a:spcPts val="2145"/>
+            <a:pPr algn="l" marL="133350" indent="-133350">
+              <a:lnSpc>
+                <a:spcPts val="2228"/>
               </a:lnSpc>
               <a:buSzPct val="100000"/>
               <a:buChar char="•"/>
@@ -5194,7 +5201,7 @@
             <a:r>
               <a:rPr lang="en-US" sz="1650" dirty="0">
                 <a:solidFill>
-                  <a:srgbClr val="182D3C"/>
+                  <a:srgbClr val="E2E8F0"/>
                 </a:solidFill>
                 <a:latin typeface="Trebuchet MS" pitchFamily="34" charset="0"/>
                 <a:ea typeface="Trebuchet MS" pitchFamily="34" charset="-122"/>
@@ -5220,7 +5227,7 @@
     <p:bg>
       <p:bgPr>
         <a:solidFill>
-          <a:srgbClr val="FCFCFC"/>
+          <a:srgbClr val="0F172A"/>
         </a:solidFill>
       </p:bgPr>
     </p:bg>
@@ -5246,8 +5253,8 @@
         </p:nvSpPr>
         <p:spPr>
           <a:xfrm>
-            <a:off x="685800" y="533400"/>
-            <a:ext cx="7927848" cy="231428"/>
+            <a:off x="647700" y="457200"/>
+            <a:ext cx="8005572" cy="239911"/>
           </a:xfrm>
           <a:prstGeom prst="rect">
             <a:avLst/>
@@ -5261,14 +5268,14 @@
           <a:p>
             <a:pPr algn="l" indent="0" marL="0">
               <a:lnSpc>
-                <a:spcPts val="1823"/>
+                <a:spcPts val="1890"/>
               </a:lnSpc>
               <a:buNone/>
             </a:pPr>
             <a:r>
               <a:rPr lang="en-US" sz="1350" dirty="0">
                 <a:solidFill>
-                  <a:srgbClr val="4A5A68"/>
+                  <a:srgbClr val="F97316"/>
                 </a:solidFill>
                 <a:latin typeface="Trebuchet MS" pitchFamily="34" charset="0"/>
                 <a:ea typeface="Trebuchet MS" pitchFamily="34" charset="-122"/>
@@ -5288,8 +5295,8 @@
         </p:nvSpPr>
         <p:spPr>
           <a:xfrm>
-            <a:off x="685800" y="821978"/>
-            <a:ext cx="7927848" cy="371475"/>
+            <a:off x="647700" y="773311"/>
+            <a:ext cx="8005572" cy="400050"/>
           </a:xfrm>
           <a:prstGeom prst="rect">
             <a:avLst/>
@@ -5305,9 +5312,9 @@
               <a:buNone/>
             </a:pPr>
             <a:r>
-              <a:rPr lang="en-US" sz="2550" b="1" dirty="0">
-                <a:solidFill>
-                  <a:srgbClr val="B165FB"/>
+              <a:rPr lang="en-US" sz="2700" b="1" dirty="0">
+                <a:solidFill>
+                  <a:srgbClr val="38BDF8"/>
                 </a:solidFill>
                 <a:latin typeface="Trebuchet MS" pitchFamily="34" charset="0"/>
                 <a:ea typeface="Trebuchet MS" pitchFamily="34" charset="-122"/>
@@ -5315,7 +5322,7 @@
               </a:rPr>
               <a:t>Pull Request Review</a:t>
             </a:r>
-            <a:endParaRPr lang="en-US" sz="2550" dirty="0"/>
+            <a:endParaRPr lang="en-US" sz="2700" dirty="0"/>
           </a:p>
         </p:txBody>
       </p:sp>
@@ -5327,8 +5334,8 @@
         </p:nvSpPr>
         <p:spPr>
           <a:xfrm>
-            <a:off x="685800" y="1364903"/>
-            <a:ext cx="7772400" cy="1007566"/>
+            <a:off x="647700" y="1344811"/>
+            <a:ext cx="7848600" cy="1076920"/>
           </a:xfrm>
           <a:prstGeom prst="rect">
             <a:avLst/>
@@ -5337,12 +5344,12 @@
           <a:ln/>
         </p:spPr>
         <p:txBody>
-          <a:bodyPr wrap="square" lIns="123825" tIns="0" rIns="0" bIns="0" rtlCol="0" anchor="t"/>
-          <a:lstStyle/>
-          <a:p>
-            <a:pPr algn="l" marL="123825" indent="-123825">
-              <a:lnSpc>
-                <a:spcPts val="2145"/>
+          <a:bodyPr wrap="square" lIns="133350" tIns="0" rIns="0" bIns="0" rtlCol="0" anchor="t"/>
+          <a:lstStyle/>
+          <a:p>
+            <a:pPr algn="l" marL="133350" indent="-133350">
+              <a:lnSpc>
+                <a:spcPts val="2228"/>
               </a:lnSpc>
               <a:buSzPct val="100000"/>
               <a:buChar char="•"/>
@@ -5350,7 +5357,7 @@
             <a:r>
               <a:rPr lang="en-US" sz="1650" dirty="0">
                 <a:solidFill>
-                  <a:srgbClr val="182D3C"/>
+                  <a:srgbClr val="E2E8F0"/>
                 </a:solidFill>
                 <a:latin typeface="Trebuchet MS" pitchFamily="34" charset="0"/>
                 <a:ea typeface="Trebuchet MS" pitchFamily="34" charset="-122"/>
@@ -5361,9 +5368,9 @@
             <a:endParaRPr lang="en-US" sz="1650" dirty="0"/>
           </a:p>
           <a:p>
-            <a:pPr algn="l" marL="123825" indent="-123825">
-              <a:lnSpc>
-                <a:spcPts val="2145"/>
+            <a:pPr algn="l" marL="133350" indent="-133350">
+              <a:lnSpc>
+                <a:spcPts val="2228"/>
               </a:lnSpc>
               <a:buSzPct val="100000"/>
               <a:buChar char="•"/>
@@ -5371,7 +5378,7 @@
             <a:r>
               <a:rPr lang="en-US" sz="1650" dirty="0">
                 <a:solidFill>
-                  <a:srgbClr val="182D3C"/>
+                  <a:srgbClr val="E2E8F0"/>
                 </a:solidFill>
                 <a:latin typeface="Trebuchet MS" pitchFamily="34" charset="0"/>
                 <a:ea typeface="Trebuchet MS" pitchFamily="34" charset="-122"/>
@@ -5382,9 +5389,9 @@
             <a:endParaRPr lang="en-US" sz="1650" dirty="0"/>
           </a:p>
           <a:p>
-            <a:pPr algn="l" marL="123825" indent="-123825">
-              <a:lnSpc>
-                <a:spcPts val="2145"/>
+            <a:pPr algn="l" marL="133350" indent="-133350">
+              <a:lnSpc>
+                <a:spcPts val="2228"/>
               </a:lnSpc>
               <a:buSzPct val="100000"/>
               <a:buChar char="•"/>
@@ -5392,7 +5399,7 @@
             <a:r>
               <a:rPr lang="en-US" sz="1650" dirty="0">
                 <a:solidFill>
-                  <a:srgbClr val="182D3C"/>
+                  <a:srgbClr val="E2E8F0"/>
                 </a:solidFill>
                 <a:latin typeface="Trebuchet MS" pitchFamily="34" charset="0"/>
                 <a:ea typeface="Trebuchet MS" pitchFamily="34" charset="-122"/>
@@ -5418,7 +5425,7 @@
     <p:bg>
       <p:bgPr>
         <a:solidFill>
-          <a:srgbClr val="FCFCFC"/>
+          <a:srgbClr val="0F172A"/>
         </a:solidFill>
       </p:bgPr>
     </p:bg>
@@ -5444,8 +5451,8 @@
         </p:nvSpPr>
         <p:spPr>
           <a:xfrm>
-            <a:off x="685800" y="533400"/>
-            <a:ext cx="7927848" cy="231428"/>
+            <a:off x="647700" y="457200"/>
+            <a:ext cx="8005572" cy="239911"/>
           </a:xfrm>
           <a:prstGeom prst="rect">
             <a:avLst/>
@@ -5459,14 +5466,14 @@
           <a:p>
             <a:pPr algn="l" indent="0" marL="0">
               <a:lnSpc>
-                <a:spcPts val="1823"/>
+                <a:spcPts val="1890"/>
               </a:lnSpc>
               <a:buNone/>
             </a:pPr>
             <a:r>
               <a:rPr lang="en-US" sz="1350" dirty="0">
                 <a:solidFill>
-                  <a:srgbClr val="4A5A68"/>
+                  <a:srgbClr val="F97316"/>
                 </a:solidFill>
                 <a:latin typeface="Trebuchet MS" pitchFamily="34" charset="0"/>
                 <a:ea typeface="Trebuchet MS" pitchFamily="34" charset="-122"/>
@@ -5486,8 +5493,8 @@
         </p:nvSpPr>
         <p:spPr>
           <a:xfrm>
-            <a:off x="685800" y="821978"/>
-            <a:ext cx="7927848" cy="371475"/>
+            <a:off x="647700" y="773311"/>
+            <a:ext cx="8005572" cy="400050"/>
           </a:xfrm>
           <a:prstGeom prst="rect">
             <a:avLst/>
@@ -5503,9 +5510,9 @@
               <a:buNone/>
             </a:pPr>
             <a:r>
-              <a:rPr lang="en-US" sz="2550" b="1" dirty="0">
-                <a:solidFill>
-                  <a:srgbClr val="B165FB"/>
+              <a:rPr lang="en-US" sz="2700" b="1" dirty="0">
+                <a:solidFill>
+                  <a:srgbClr val="38BDF8"/>
                 </a:solidFill>
                 <a:latin typeface="Trebuchet MS" pitchFamily="34" charset="0"/>
                 <a:ea typeface="Trebuchet MS" pitchFamily="34" charset="-122"/>
@@ -5513,7 +5520,7 @@
               </a:rPr>
               <a:t>Agenda</a:t>
             </a:r>
-            <a:endParaRPr lang="en-US" sz="2550" dirty="0"/>
+            <a:endParaRPr lang="en-US" sz="2700" dirty="0"/>
           </a:p>
         </p:txBody>
       </p:sp>
@@ -5525,8 +5532,8 @@
         </p:nvSpPr>
         <p:spPr>
           <a:xfrm>
-            <a:off x="685800" y="1364903"/>
-            <a:ext cx="7772400" cy="1375172"/>
+            <a:off x="647700" y="1344811"/>
+            <a:ext cx="7848600" cy="1473994"/>
           </a:xfrm>
           <a:prstGeom prst="rect">
             <a:avLst/>
@@ -5535,12 +5542,12 @@
           <a:ln/>
         </p:spPr>
         <p:txBody>
-          <a:bodyPr wrap="square" lIns="123825" tIns="0" rIns="0" bIns="0" rtlCol="0" anchor="t"/>
-          <a:lstStyle/>
-          <a:p>
-            <a:pPr algn="l" marL="123825" indent="-123825">
-              <a:lnSpc>
-                <a:spcPts val="2145"/>
+          <a:bodyPr wrap="square" lIns="133350" tIns="0" rIns="0" bIns="0" rtlCol="0" anchor="t"/>
+          <a:lstStyle/>
+          <a:p>
+            <a:pPr algn="l" marL="133350" indent="-133350">
+              <a:lnSpc>
+                <a:spcPts val="2228"/>
               </a:lnSpc>
               <a:buSzPct val="100000"/>
               <a:buChar char="•"/>
@@ -5548,7 +5555,7 @@
             <a:r>
               <a:rPr lang="en-US" sz="1650" dirty="0">
                 <a:solidFill>
-                  <a:srgbClr val="182D3C"/>
+                  <a:srgbClr val="E2E8F0"/>
                 </a:solidFill>
                 <a:latin typeface="Trebuchet MS" pitchFamily="34" charset="0"/>
                 <a:ea typeface="Trebuchet MS" pitchFamily="34" charset="-122"/>
@@ -5559,9 +5566,9 @@
             <a:endParaRPr lang="en-US" sz="1650" dirty="0"/>
           </a:p>
           <a:p>
-            <a:pPr algn="l" marL="123825" indent="-123825">
-              <a:lnSpc>
-                <a:spcPts val="2145"/>
+            <a:pPr algn="l" marL="133350" indent="-133350">
+              <a:lnSpc>
+                <a:spcPts val="2228"/>
               </a:lnSpc>
               <a:buSzPct val="100000"/>
               <a:buChar char="•"/>
@@ -5569,7 +5576,7 @@
             <a:r>
               <a:rPr lang="en-US" sz="1650" dirty="0">
                 <a:solidFill>
-                  <a:srgbClr val="182D3C"/>
+                  <a:srgbClr val="E2E8F0"/>
                 </a:solidFill>
                 <a:latin typeface="Trebuchet MS" pitchFamily="34" charset="0"/>
                 <a:ea typeface="Trebuchet MS" pitchFamily="34" charset="-122"/>
@@ -5580,9 +5587,9 @@
             <a:endParaRPr lang="en-US" sz="1650" dirty="0"/>
           </a:p>
           <a:p>
-            <a:pPr algn="l" marL="123825" indent="-123825">
-              <a:lnSpc>
-                <a:spcPts val="2145"/>
+            <a:pPr algn="l" marL="133350" indent="-133350">
+              <a:lnSpc>
+                <a:spcPts val="2228"/>
               </a:lnSpc>
               <a:buSzPct val="100000"/>
               <a:buChar char="•"/>
@@ -5590,7 +5597,7 @@
             <a:r>
               <a:rPr lang="en-US" sz="1650" dirty="0">
                 <a:solidFill>
-                  <a:srgbClr val="182D3C"/>
+                  <a:srgbClr val="E2E8F0"/>
                 </a:solidFill>
                 <a:latin typeface="Trebuchet MS" pitchFamily="34" charset="0"/>
                 <a:ea typeface="Trebuchet MS" pitchFamily="34" charset="-122"/>
@@ -5601,9 +5608,9 @@
             <a:endParaRPr lang="en-US" sz="1650" dirty="0"/>
           </a:p>
           <a:p>
-            <a:pPr algn="l" marL="123825" indent="-123825">
-              <a:lnSpc>
-                <a:spcPts val="2145"/>
+            <a:pPr algn="l" marL="133350" indent="-133350">
+              <a:lnSpc>
+                <a:spcPts val="2228"/>
               </a:lnSpc>
               <a:buSzPct val="100000"/>
               <a:buChar char="•"/>
@@ -5611,7 +5618,7 @@
             <a:r>
               <a:rPr lang="en-US" sz="1650" dirty="0">
                 <a:solidFill>
-                  <a:srgbClr val="182D3C"/>
+                  <a:srgbClr val="E2E8F0"/>
                 </a:solidFill>
                 <a:latin typeface="Trebuchet MS" pitchFamily="34" charset="0"/>
                 <a:ea typeface="Trebuchet MS" pitchFamily="34" charset="-122"/>
@@ -5637,7 +5644,7 @@
     <p:bg>
       <p:bgPr>
         <a:solidFill>
-          <a:srgbClr val="FCFCFC"/>
+          <a:srgbClr val="0F172A"/>
         </a:solidFill>
       </p:bgPr>
     </p:bg>
@@ -5663,8 +5670,8 @@
         </p:nvSpPr>
         <p:spPr>
           <a:xfrm>
-            <a:off x="685800" y="533400"/>
-            <a:ext cx="7927848" cy="231428"/>
+            <a:off x="647700" y="457200"/>
+            <a:ext cx="8005572" cy="239911"/>
           </a:xfrm>
           <a:prstGeom prst="rect">
             <a:avLst/>
@@ -5678,14 +5685,14 @@
           <a:p>
             <a:pPr algn="l" indent="0" marL="0">
               <a:lnSpc>
-                <a:spcPts val="1823"/>
+                <a:spcPts val="1890"/>
               </a:lnSpc>
               <a:buNone/>
             </a:pPr>
             <a:r>
               <a:rPr lang="en-US" sz="1350" dirty="0">
                 <a:solidFill>
-                  <a:srgbClr val="4A5A68"/>
+                  <a:srgbClr val="F97316"/>
                 </a:solidFill>
                 <a:latin typeface="Trebuchet MS" pitchFamily="34" charset="0"/>
                 <a:ea typeface="Trebuchet MS" pitchFamily="34" charset="-122"/>
@@ -5705,8 +5712,8 @@
         </p:nvSpPr>
         <p:spPr>
           <a:xfrm>
-            <a:off x="685800" y="821978"/>
-            <a:ext cx="7927848" cy="371475"/>
+            <a:off x="647700" y="773311"/>
+            <a:ext cx="8005572" cy="400050"/>
           </a:xfrm>
           <a:prstGeom prst="rect">
             <a:avLst/>
@@ -5722,9 +5729,9 @@
               <a:buNone/>
             </a:pPr>
             <a:r>
-              <a:rPr lang="en-US" sz="2550" b="1" dirty="0">
-                <a:solidFill>
-                  <a:srgbClr val="B165FB"/>
+              <a:rPr lang="en-US" sz="2700" b="1" dirty="0">
+                <a:solidFill>
+                  <a:srgbClr val="38BDF8"/>
                 </a:solidFill>
                 <a:latin typeface="Trebuchet MS" pitchFamily="34" charset="0"/>
                 <a:ea typeface="Trebuchet MS" pitchFamily="34" charset="-122"/>
@@ -5732,7 +5739,7 @@
               </a:rPr>
               <a:t>Agent Patterns to Copy</a:t>
             </a:r>
-            <a:endParaRPr lang="en-US" sz="2550" dirty="0"/>
+            <a:endParaRPr lang="en-US" sz="2700" dirty="0"/>
           </a:p>
         </p:txBody>
       </p:sp>
@@ -5744,8 +5751,8 @@
         </p:nvSpPr>
         <p:spPr>
           <a:xfrm>
-            <a:off x="685800" y="1364903"/>
-            <a:ext cx="7772400" cy="1375172"/>
+            <a:off x="647700" y="1344811"/>
+            <a:ext cx="7848600" cy="1473994"/>
           </a:xfrm>
           <a:prstGeom prst="rect">
             <a:avLst/>
@@ -5754,12 +5761,12 @@
           <a:ln/>
         </p:spPr>
         <p:txBody>
-          <a:bodyPr wrap="square" lIns="123825" tIns="0" rIns="0" bIns="0" rtlCol="0" anchor="t"/>
-          <a:lstStyle/>
-          <a:p>
-            <a:pPr algn="l" marL="123825" indent="-123825">
-              <a:lnSpc>
-                <a:spcPts val="2145"/>
+          <a:bodyPr wrap="square" lIns="133350" tIns="0" rIns="0" bIns="0" rtlCol="0" anchor="t"/>
+          <a:lstStyle/>
+          <a:p>
+            <a:pPr algn="l" marL="133350" indent="-133350">
+              <a:lnSpc>
+                <a:spcPts val="2228"/>
               </a:lnSpc>
               <a:buSzPct val="100000"/>
               <a:buChar char="•"/>
@@ -5767,7 +5774,7 @@
             <a:r>
               <a:rPr lang="en-US" sz="1650" b="1" dirty="0">
                 <a:solidFill>
-                  <a:srgbClr val="182D3C"/>
+                  <a:srgbClr val="E2E8F0"/>
                 </a:solidFill>
                 <a:latin typeface="Trebuchet MS" pitchFamily="34" charset="0"/>
                 <a:ea typeface="Trebuchet MS" pitchFamily="34" charset="-122"/>
@@ -5777,14 +5784,14 @@
             </a:r>
             <a:pPr algn="l" indent="0" marL="0">
               <a:lnSpc>
-                <a:spcPts val="2145"/>
+                <a:spcPts val="2228"/>
               </a:lnSpc>
               <a:buNone/>
             </a:pPr>
             <a:r>
               <a:rPr lang="en-US" sz="1650" dirty="0">
                 <a:solidFill>
-                  <a:srgbClr val="182D3C"/>
+                  <a:srgbClr val="E2E8F0"/>
                 </a:solidFill>
                 <a:latin typeface="Trebuchet MS" pitchFamily="34" charset="0"/>
                 <a:ea typeface="Trebuchet MS" pitchFamily="34" charset="-122"/>
@@ -5795,9 +5802,9 @@
             <a:endParaRPr lang="en-US" sz="1650" dirty="0"/>
           </a:p>
           <a:p>
-            <a:pPr algn="l" marL="123825" indent="-123825">
-              <a:lnSpc>
-                <a:spcPts val="2145"/>
+            <a:pPr algn="l" marL="133350" indent="-133350">
+              <a:lnSpc>
+                <a:spcPts val="2228"/>
               </a:lnSpc>
               <a:buSzPct val="100000"/>
               <a:buChar char="•"/>
@@ -5805,7 +5812,7 @@
             <a:r>
               <a:rPr lang="en-US" sz="1650" b="1" dirty="0">
                 <a:solidFill>
-                  <a:srgbClr val="182D3C"/>
+                  <a:srgbClr val="E2E8F0"/>
                 </a:solidFill>
                 <a:latin typeface="Trebuchet MS" pitchFamily="34" charset="0"/>
                 <a:ea typeface="Trebuchet MS" pitchFamily="34" charset="-122"/>
@@ -5815,14 +5822,14 @@
             </a:r>
             <a:pPr algn="l" indent="0" marL="0">
               <a:lnSpc>
-                <a:spcPts val="2145"/>
+                <a:spcPts val="2228"/>
               </a:lnSpc>
               <a:buNone/>
             </a:pPr>
             <a:r>
               <a:rPr lang="en-US" sz="1650" dirty="0">
                 <a:solidFill>
-                  <a:srgbClr val="182D3C"/>
+                  <a:srgbClr val="E2E8F0"/>
                 </a:solidFill>
                 <a:latin typeface="Trebuchet MS" pitchFamily="34" charset="0"/>
                 <a:ea typeface="Trebuchet MS" pitchFamily="34" charset="-122"/>
@@ -5833,9 +5840,9 @@
             <a:endParaRPr lang="en-US" sz="1650" dirty="0"/>
           </a:p>
           <a:p>
-            <a:pPr algn="l" marL="123825" indent="-123825">
-              <a:lnSpc>
-                <a:spcPts val="2145"/>
+            <a:pPr algn="l" marL="133350" indent="-133350">
+              <a:lnSpc>
+                <a:spcPts val="2228"/>
               </a:lnSpc>
               <a:buSzPct val="100000"/>
               <a:buChar char="•"/>
@@ -5843,7 +5850,7 @@
             <a:r>
               <a:rPr lang="en-US" sz="1650" b="1" dirty="0">
                 <a:solidFill>
-                  <a:srgbClr val="182D3C"/>
+                  <a:srgbClr val="E2E8F0"/>
                 </a:solidFill>
                 <a:latin typeface="Trebuchet MS" pitchFamily="34" charset="0"/>
                 <a:ea typeface="Trebuchet MS" pitchFamily="34" charset="-122"/>
@@ -5853,14 +5860,14 @@
             </a:r>
             <a:pPr algn="l" indent="0" marL="0">
               <a:lnSpc>
-                <a:spcPts val="2145"/>
+                <a:spcPts val="2228"/>
               </a:lnSpc>
               <a:buNone/>
             </a:pPr>
             <a:r>
               <a:rPr lang="en-US" sz="1650" dirty="0">
                 <a:solidFill>
-                  <a:srgbClr val="182D3C"/>
+                  <a:srgbClr val="E2E8F0"/>
                 </a:solidFill>
                 <a:latin typeface="Trebuchet MS" pitchFamily="34" charset="0"/>
                 <a:ea typeface="Trebuchet MS" pitchFamily="34" charset="-122"/>
@@ -5871,9 +5878,9 @@
             <a:endParaRPr lang="en-US" sz="1650" dirty="0"/>
           </a:p>
           <a:p>
-            <a:pPr algn="l" marL="123825" indent="-123825">
-              <a:lnSpc>
-                <a:spcPts val="2145"/>
+            <a:pPr algn="l" marL="133350" indent="-133350">
+              <a:lnSpc>
+                <a:spcPts val="2228"/>
               </a:lnSpc>
               <a:buSzPct val="100000"/>
               <a:buChar char="•"/>
@@ -5881,7 +5888,7 @@
             <a:r>
               <a:rPr lang="en-US" sz="1650" b="1" dirty="0">
                 <a:solidFill>
-                  <a:srgbClr val="182D3C"/>
+                  <a:srgbClr val="E2E8F0"/>
                 </a:solidFill>
                 <a:latin typeface="Trebuchet MS" pitchFamily="34" charset="0"/>
                 <a:ea typeface="Trebuchet MS" pitchFamily="34" charset="-122"/>
@@ -5891,14 +5898,14 @@
             </a:r>
             <a:pPr algn="l" indent="0" marL="0">
               <a:lnSpc>
-                <a:spcPts val="2145"/>
+                <a:spcPts val="2228"/>
               </a:lnSpc>
               <a:buNone/>
             </a:pPr>
             <a:r>
               <a:rPr lang="en-US" sz="1650" dirty="0">
                 <a:solidFill>
-                  <a:srgbClr val="182D3C"/>
+                  <a:srgbClr val="E2E8F0"/>
                 </a:solidFill>
                 <a:latin typeface="Trebuchet MS" pitchFamily="34" charset="0"/>
                 <a:ea typeface="Trebuchet MS" pitchFamily="34" charset="-122"/>
@@ -5924,7 +5931,7 @@
     <p:bg>
       <p:bgPr>
         <a:solidFill>
-          <a:srgbClr val="FCFCFC"/>
+          <a:srgbClr val="0F172A"/>
         </a:solidFill>
       </p:bgPr>
     </p:bg>
@@ -5950,8 +5957,8 @@
         </p:nvSpPr>
         <p:spPr>
           <a:xfrm>
-            <a:off x="685800" y="533400"/>
-            <a:ext cx="7927848" cy="231428"/>
+            <a:off x="647700" y="457200"/>
+            <a:ext cx="8005572" cy="239911"/>
           </a:xfrm>
           <a:prstGeom prst="rect">
             <a:avLst/>
@@ -5965,14 +5972,14 @@
           <a:p>
             <a:pPr algn="l" indent="0" marL="0">
               <a:lnSpc>
-                <a:spcPts val="1823"/>
+                <a:spcPts val="1890"/>
               </a:lnSpc>
               <a:buNone/>
             </a:pPr>
             <a:r>
               <a:rPr lang="en-US" sz="1350" dirty="0">
                 <a:solidFill>
-                  <a:srgbClr val="4A5A68"/>
+                  <a:srgbClr val="F97316"/>
                 </a:solidFill>
                 <a:latin typeface="Trebuchet MS" pitchFamily="34" charset="0"/>
                 <a:ea typeface="Trebuchet MS" pitchFamily="34" charset="-122"/>
@@ -5992,8 +5999,8 @@
         </p:nvSpPr>
         <p:spPr>
           <a:xfrm>
-            <a:off x="685800" y="821978"/>
-            <a:ext cx="7927848" cy="371475"/>
+            <a:off x="647700" y="773311"/>
+            <a:ext cx="8005572" cy="400050"/>
           </a:xfrm>
           <a:prstGeom prst="rect">
             <a:avLst/>
@@ -6009,9 +6016,9 @@
               <a:buNone/>
             </a:pPr>
             <a:r>
-              <a:rPr lang="en-US" sz="2550" b="1" dirty="0">
-                <a:solidFill>
-                  <a:srgbClr val="B165FB"/>
+              <a:rPr lang="en-US" sz="2700" b="1" dirty="0">
+                <a:solidFill>
+                  <a:srgbClr val="38BDF8"/>
                 </a:solidFill>
                 <a:latin typeface="Trebuchet MS" pitchFamily="34" charset="0"/>
                 <a:ea typeface="Trebuchet MS" pitchFamily="34" charset="-122"/>
@@ -6019,7 +6026,7 @@
               </a:rPr>
               <a:t>Where to Start</a:t>
             </a:r>
-            <a:endParaRPr lang="en-US" sz="2550" dirty="0"/>
+            <a:endParaRPr lang="en-US" sz="2700" dirty="0"/>
           </a:p>
         </p:txBody>
       </p:sp>
@@ -6031,8 +6038,8 @@
         </p:nvSpPr>
         <p:spPr>
           <a:xfrm>
-            <a:off x="685800" y="1364903"/>
-            <a:ext cx="7772400" cy="1007566"/>
+            <a:off x="647700" y="1344811"/>
+            <a:ext cx="7848600" cy="1076920"/>
           </a:xfrm>
           <a:prstGeom prst="rect">
             <a:avLst/>
@@ -6041,12 +6048,12 @@
           <a:ln/>
         </p:spPr>
         <p:txBody>
-          <a:bodyPr wrap="square" lIns="123825" tIns="0" rIns="0" bIns="0" rtlCol="0" anchor="t"/>
-          <a:lstStyle/>
-          <a:p>
-            <a:pPr algn="l" marL="123825" indent="-123825">
-              <a:lnSpc>
-                <a:spcPts val="2145"/>
+          <a:bodyPr wrap="square" lIns="133350" tIns="0" rIns="0" bIns="0" rtlCol="0" anchor="t"/>
+          <a:lstStyle/>
+          <a:p>
+            <a:pPr algn="l" marL="133350" indent="-133350">
+              <a:lnSpc>
+                <a:spcPts val="2228"/>
               </a:lnSpc>
               <a:buSzPct val="100000"/>
               <a:buChar char="•"/>
@@ -6054,7 +6061,7 @@
             <a:r>
               <a:rPr lang="en-US" sz="1650" dirty="0">
                 <a:solidFill>
-                  <a:srgbClr val="182D3C"/>
+                  <a:srgbClr val="E2E8F0"/>
                 </a:solidFill>
                 <a:latin typeface="Trebuchet MS" pitchFamily="34" charset="0"/>
                 <a:ea typeface="Trebuchet MS" pitchFamily="34" charset="-122"/>
@@ -6065,9 +6072,9 @@
             <a:endParaRPr lang="en-US" sz="1650" dirty="0"/>
           </a:p>
           <a:p>
-            <a:pPr algn="l" marL="123825" indent="-123825">
-              <a:lnSpc>
-                <a:spcPts val="2145"/>
+            <a:pPr algn="l" marL="133350" indent="-133350">
+              <a:lnSpc>
+                <a:spcPts val="2228"/>
               </a:lnSpc>
               <a:buSzPct val="100000"/>
               <a:buChar char="•"/>
@@ -6075,7 +6082,7 @@
             <a:r>
               <a:rPr lang="en-US" sz="1650" dirty="0">
                 <a:solidFill>
-                  <a:srgbClr val="182D3C"/>
+                  <a:srgbClr val="E2E8F0"/>
                 </a:solidFill>
                 <a:latin typeface="Trebuchet MS" pitchFamily="34" charset="0"/>
                 <a:ea typeface="Trebuchet MS" pitchFamily="34" charset="-122"/>
@@ -6086,9 +6093,9 @@
             <a:endParaRPr lang="en-US" sz="1650" dirty="0"/>
           </a:p>
           <a:p>
-            <a:pPr algn="l" marL="123825" indent="-123825">
-              <a:lnSpc>
-                <a:spcPts val="2145"/>
+            <a:pPr algn="l" marL="133350" indent="-133350">
+              <a:lnSpc>
+                <a:spcPts val="2228"/>
               </a:lnSpc>
               <a:buSzPct val="100000"/>
               <a:buChar char="•"/>
@@ -6096,7 +6103,7 @@
             <a:r>
               <a:rPr lang="en-US" sz="1650" dirty="0">
                 <a:solidFill>
-                  <a:srgbClr val="182D3C"/>
+                  <a:srgbClr val="E2E8F0"/>
                 </a:solidFill>
                 <a:latin typeface="Trebuchet MS" pitchFamily="34" charset="0"/>
                 <a:ea typeface="Trebuchet MS" pitchFamily="34" charset="-122"/>
@@ -6122,7 +6129,7 @@
     <p:bg>
       <p:bgPr>
         <a:solidFill>
-          <a:srgbClr val="FCFCFC"/>
+          <a:srgbClr val="0F172A"/>
         </a:solidFill>
       </p:bgPr>
     </p:bg>
@@ -6148,8 +6155,8 @@
         </p:nvSpPr>
         <p:spPr>
           <a:xfrm>
-            <a:off x="685800" y="533400"/>
-            <a:ext cx="7927848" cy="231428"/>
+            <a:off x="647700" y="457200"/>
+            <a:ext cx="8005572" cy="239911"/>
           </a:xfrm>
           <a:prstGeom prst="rect">
             <a:avLst/>
@@ -6163,14 +6170,14 @@
           <a:p>
             <a:pPr algn="l" indent="0" marL="0">
               <a:lnSpc>
-                <a:spcPts val="1823"/>
+                <a:spcPts val="1890"/>
               </a:lnSpc>
               <a:buNone/>
             </a:pPr>
             <a:r>
               <a:rPr lang="en-US" sz="1350" dirty="0">
                 <a:solidFill>
-                  <a:srgbClr val="4A5A68"/>
+                  <a:srgbClr val="F97316"/>
                 </a:solidFill>
                 <a:latin typeface="Trebuchet MS" pitchFamily="34" charset="0"/>
                 <a:ea typeface="Trebuchet MS" pitchFamily="34" charset="-122"/>
@@ -6190,8 +6197,8 @@
         </p:nvSpPr>
         <p:spPr>
           <a:xfrm>
-            <a:off x="685800" y="821978"/>
-            <a:ext cx="7927848" cy="371475"/>
+            <a:off x="647700" y="773311"/>
+            <a:ext cx="8005572" cy="400050"/>
           </a:xfrm>
           <a:prstGeom prst="rect">
             <a:avLst/>
@@ -6207,9 +6214,9 @@
               <a:buNone/>
             </a:pPr>
             <a:r>
-              <a:rPr lang="en-US" sz="2550" b="1" dirty="0">
-                <a:solidFill>
-                  <a:srgbClr val="B165FB"/>
+              <a:rPr lang="en-US" sz="2700" b="1" dirty="0">
+                <a:solidFill>
+                  <a:srgbClr val="38BDF8"/>
                 </a:solidFill>
                 <a:latin typeface="Trebuchet MS" pitchFamily="34" charset="0"/>
                 <a:ea typeface="Trebuchet MS" pitchFamily="34" charset="-122"/>
@@ -6217,7 +6224,7 @@
               </a:rPr>
               <a:t>Pre-requisites</a:t>
             </a:r>
-            <a:endParaRPr lang="en-US" sz="2550" dirty="0"/>
+            <a:endParaRPr lang="en-US" sz="2700" dirty="0"/>
           </a:p>
         </p:txBody>
       </p:sp>
@@ -6229,8 +6236,8 @@
         </p:nvSpPr>
         <p:spPr>
           <a:xfrm>
-            <a:off x="685800" y="1364903"/>
-            <a:ext cx="7772400" cy="1007566"/>
+            <a:off x="647700" y="1344811"/>
+            <a:ext cx="7848600" cy="1076920"/>
           </a:xfrm>
           <a:prstGeom prst="rect">
             <a:avLst/>
@@ -6239,12 +6246,12 @@
           <a:ln/>
         </p:spPr>
         <p:txBody>
-          <a:bodyPr wrap="square" lIns="123825" tIns="0" rIns="0" bIns="0" rtlCol="0" anchor="t"/>
-          <a:lstStyle/>
-          <a:p>
-            <a:pPr algn="l" marL="123825" indent="-123825">
-              <a:lnSpc>
-                <a:spcPts val="2145"/>
+          <a:bodyPr wrap="square" lIns="133350" tIns="0" rIns="0" bIns="0" rtlCol="0" anchor="t"/>
+          <a:lstStyle/>
+          <a:p>
+            <a:pPr algn="l" marL="133350" indent="-133350">
+              <a:lnSpc>
+                <a:spcPts val="2228"/>
               </a:lnSpc>
               <a:buSzPct val="100000"/>
               <a:buChar char="•"/>
@@ -6252,7 +6259,7 @@
             <a:r>
               <a:rPr lang="en-US" sz="1650" dirty="0">
                 <a:solidFill>
-                  <a:srgbClr val="182D3C"/>
+                  <a:srgbClr val="E2E8F0"/>
                 </a:solidFill>
                 <a:latin typeface="Trebuchet MS" pitchFamily="34" charset="0"/>
                 <a:ea typeface="Trebuchet MS" pitchFamily="34" charset="-122"/>
@@ -6263,9 +6270,9 @@
             <a:endParaRPr lang="en-US" sz="1650" dirty="0"/>
           </a:p>
           <a:p>
-            <a:pPr algn="l" marL="123825" indent="-123825">
-              <a:lnSpc>
-                <a:spcPts val="2145"/>
+            <a:pPr algn="l" marL="133350" indent="-133350">
+              <a:lnSpc>
+                <a:spcPts val="2228"/>
               </a:lnSpc>
               <a:buSzPct val="100000"/>
               <a:buChar char="•"/>
@@ -6273,7 +6280,7 @@
             <a:r>
               <a:rPr lang="en-US" sz="1650" dirty="0">
                 <a:solidFill>
-                  <a:srgbClr val="182D3C"/>
+                  <a:srgbClr val="E2E8F0"/>
                 </a:solidFill>
                 <a:latin typeface="Trebuchet MS" pitchFamily="34" charset="0"/>
                 <a:ea typeface="Trebuchet MS" pitchFamily="34" charset="-122"/>
@@ -6284,9 +6291,9 @@
             <a:endParaRPr lang="en-US" sz="1650" dirty="0"/>
           </a:p>
           <a:p>
-            <a:pPr algn="l" marL="123825" indent="-123825">
-              <a:lnSpc>
-                <a:spcPts val="2145"/>
+            <a:pPr algn="l" marL="133350" indent="-133350">
+              <a:lnSpc>
+                <a:spcPts val="2228"/>
               </a:lnSpc>
               <a:buSzPct val="100000"/>
               <a:buChar char="•"/>
@@ -6294,7 +6301,7 @@
             <a:r>
               <a:rPr lang="en-US" sz="1650" dirty="0">
                 <a:solidFill>
-                  <a:srgbClr val="182D3C"/>
+                  <a:srgbClr val="E2E8F0"/>
                 </a:solidFill>
                 <a:latin typeface="Trebuchet MS" pitchFamily="34" charset="0"/>
                 <a:ea typeface="Trebuchet MS" pitchFamily="34" charset="-122"/>
@@ -6304,31 +6311,31 @@
             </a:r>
             <a:pPr algn="l" indent="0" marL="0">
               <a:lnSpc>
-                <a:spcPts val="2145"/>
+                <a:spcPts val="2228"/>
               </a:lnSpc>
               <a:buNone/>
             </a:pPr>
             <a:r>
+              <a:rPr lang="en-US" sz="1650" b="1" dirty="0">
+                <a:solidFill>
+                  <a:srgbClr val="38BDF8"/>
+                </a:solidFill>
+                <a:latin typeface="Trebuchet MS" pitchFamily="34" charset="0"/>
+                <a:ea typeface="Trebuchet MS" pitchFamily="34" charset="-122"/>
+                <a:cs typeface="Trebuchet MS" pitchFamily="34" charset="-120"/>
+              </a:rPr>
+              <a:t>探索未至之境</a:t>
+            </a:r>
+            <a:pPr algn="l" indent="0" marL="0">
+              <a:lnSpc>
+                <a:spcPts val="2228"/>
+              </a:lnSpc>
+              <a:buNone/>
+            </a:pPr>
+            <a:r>
               <a:rPr lang="en-US" sz="1650" dirty="0">
                 <a:solidFill>
-                  <a:srgbClr val="40695B"/>
-                </a:solidFill>
-                <a:latin typeface="Trebuchet MS" pitchFamily="34" charset="0"/>
-                <a:ea typeface="Trebuchet MS" pitchFamily="34" charset="-122"/>
-                <a:cs typeface="Trebuchet MS" pitchFamily="34" charset="-120"/>
-              </a:rPr>
-              <a:t>探索未至之境</a:t>
-            </a:r>
-            <a:pPr algn="l" indent="0" marL="0">
-              <a:lnSpc>
-                <a:spcPts val="2145"/>
-              </a:lnSpc>
-              <a:buNone/>
-            </a:pPr>
-            <a:r>
-              <a:rPr lang="en-US" sz="1650" dirty="0">
-                <a:solidFill>
-                  <a:srgbClr val="182D3C"/>
+                  <a:srgbClr val="E2E8F0"/>
                 </a:solidFill>
                 <a:latin typeface="Trebuchet MS" pitchFamily="34" charset="0"/>
                 <a:ea typeface="Trebuchet MS" pitchFamily="34" charset="-122"/>
@@ -6354,7 +6361,7 @@
     <p:bg>
       <p:bgPr>
         <a:solidFill>
-          <a:srgbClr val="FCFCFC"/>
+          <a:srgbClr val="0F172A"/>
         </a:solidFill>
       </p:bgPr>
     </p:bg>
@@ -6380,8 +6387,8 @@
         </p:nvSpPr>
         <p:spPr>
           <a:xfrm>
-            <a:off x="685800" y="533400"/>
-            <a:ext cx="7927848" cy="231428"/>
+            <a:off x="647700" y="457200"/>
+            <a:ext cx="8005572" cy="239911"/>
           </a:xfrm>
           <a:prstGeom prst="rect">
             <a:avLst/>
@@ -6395,14 +6402,14 @@
           <a:p>
             <a:pPr algn="l" indent="0" marL="0">
               <a:lnSpc>
-                <a:spcPts val="1823"/>
+                <a:spcPts val="1890"/>
               </a:lnSpc>
               <a:buNone/>
             </a:pPr>
             <a:r>
               <a:rPr lang="en-US" sz="1350" dirty="0">
                 <a:solidFill>
-                  <a:srgbClr val="4A5A68"/>
+                  <a:srgbClr val="F97316"/>
                 </a:solidFill>
                 <a:latin typeface="Trebuchet MS" pitchFamily="34" charset="0"/>
                 <a:ea typeface="Trebuchet MS" pitchFamily="34" charset="-122"/>
@@ -6422,8 +6429,8 @@
         </p:nvSpPr>
         <p:spPr>
           <a:xfrm>
-            <a:off x="685800" y="821978"/>
-            <a:ext cx="7927848" cy="371475"/>
+            <a:off x="647700" y="773311"/>
+            <a:ext cx="8005572" cy="400050"/>
           </a:xfrm>
           <a:prstGeom prst="rect">
             <a:avLst/>
@@ -6439,9 +6446,9 @@
               <a:buNone/>
             </a:pPr>
             <a:r>
-              <a:rPr lang="en-US" sz="2550" b="1" dirty="0">
-                <a:solidFill>
-                  <a:srgbClr val="B165FB"/>
+              <a:rPr lang="en-US" sz="2700" b="1" dirty="0">
+                <a:solidFill>
+                  <a:srgbClr val="38BDF8"/>
                 </a:solidFill>
                 <a:latin typeface="Trebuchet MS" pitchFamily="34" charset="0"/>
                 <a:ea typeface="Trebuchet MS" pitchFamily="34" charset="-122"/>
@@ -6449,7 +6456,7 @@
               </a:rPr>
               <a:t>Why Agents Now</a:t>
             </a:r>
-            <a:endParaRPr lang="en-US" sz="2550" dirty="0"/>
+            <a:endParaRPr lang="en-US" sz="2700" dirty="0"/>
           </a:p>
         </p:txBody>
       </p:sp>
@@ -6461,8 +6468,8 @@
         </p:nvSpPr>
         <p:spPr>
           <a:xfrm>
-            <a:off x="685800" y="1364903"/>
-            <a:ext cx="7772400" cy="1375172"/>
+            <a:off x="647700" y="1344811"/>
+            <a:ext cx="7848600" cy="1473994"/>
           </a:xfrm>
           <a:prstGeom prst="rect">
             <a:avLst/>
@@ -6471,12 +6478,12 @@
           <a:ln/>
         </p:spPr>
         <p:txBody>
-          <a:bodyPr wrap="square" lIns="123825" tIns="0" rIns="0" bIns="0" rtlCol="0" anchor="t"/>
-          <a:lstStyle/>
-          <a:p>
-            <a:pPr algn="l" marL="123825" indent="-123825">
-              <a:lnSpc>
-                <a:spcPts val="2145"/>
+          <a:bodyPr wrap="square" lIns="133350" tIns="0" rIns="0" bIns="0" rtlCol="0" anchor="t"/>
+          <a:lstStyle/>
+          <a:p>
+            <a:pPr algn="l" marL="133350" indent="-133350">
+              <a:lnSpc>
+                <a:spcPts val="2228"/>
               </a:lnSpc>
               <a:buSzPct val="100000"/>
               <a:buChar char="•"/>
@@ -6484,7 +6491,7 @@
             <a:r>
               <a:rPr lang="en-US" sz="1650" dirty="0">
                 <a:solidFill>
-                  <a:srgbClr val="182D3C"/>
+                  <a:srgbClr val="E2E8F0"/>
                 </a:solidFill>
                 <a:latin typeface="Trebuchet MS" pitchFamily="34" charset="0"/>
                 <a:ea typeface="Trebuchet MS" pitchFamily="34" charset="-122"/>
@@ -6495,9 +6502,9 @@
             <a:endParaRPr lang="en-US" sz="1650" dirty="0"/>
           </a:p>
           <a:p>
-            <a:pPr algn="l" marL="123825" indent="-123825">
-              <a:lnSpc>
-                <a:spcPts val="2145"/>
+            <a:pPr algn="l" marL="133350" indent="-133350">
+              <a:lnSpc>
+                <a:spcPts val="2228"/>
               </a:lnSpc>
               <a:buSzPct val="100000"/>
               <a:buChar char="•"/>
@@ -6505,7 +6512,7 @@
             <a:r>
               <a:rPr lang="en-US" sz="1650" dirty="0">
                 <a:solidFill>
-                  <a:srgbClr val="182D3C"/>
+                  <a:srgbClr val="E2E8F0"/>
                 </a:solidFill>
                 <a:latin typeface="Trebuchet MS" pitchFamily="34" charset="0"/>
                 <a:ea typeface="Trebuchet MS" pitchFamily="34" charset="-122"/>
@@ -6516,9 +6523,9 @@
             <a:endParaRPr lang="en-US" sz="1650" dirty="0"/>
           </a:p>
           <a:p>
-            <a:pPr algn="l" marL="123825" indent="-123825">
-              <a:lnSpc>
-                <a:spcPts val="2145"/>
+            <a:pPr algn="l" marL="133350" indent="-133350">
+              <a:lnSpc>
+                <a:spcPts val="2228"/>
               </a:lnSpc>
               <a:buSzPct val="100000"/>
               <a:buChar char="•"/>
@@ -6526,7 +6533,7 @@
             <a:r>
               <a:rPr lang="en-US" sz="1650" dirty="0">
                 <a:solidFill>
-                  <a:srgbClr val="182D3C"/>
+                  <a:srgbClr val="E2E8F0"/>
                 </a:solidFill>
                 <a:latin typeface="Trebuchet MS" pitchFamily="34" charset="0"/>
                 <a:ea typeface="Trebuchet MS" pitchFamily="34" charset="-122"/>
@@ -6537,9 +6544,9 @@
             <a:endParaRPr lang="en-US" sz="1650" dirty="0"/>
           </a:p>
           <a:p>
-            <a:pPr algn="l" marL="123825" indent="-123825">
-              <a:lnSpc>
-                <a:spcPts val="2145"/>
+            <a:pPr algn="l" marL="133350" indent="-133350">
+              <a:lnSpc>
+                <a:spcPts val="2228"/>
               </a:lnSpc>
               <a:buSzPct val="100000"/>
               <a:buChar char="•"/>
@@ -6547,7 +6554,7 @@
             <a:r>
               <a:rPr lang="en-US" sz="1650" dirty="0">
                 <a:solidFill>
-                  <a:srgbClr val="182D3C"/>
+                  <a:srgbClr val="E2E8F0"/>
                 </a:solidFill>
                 <a:latin typeface="Trebuchet MS" pitchFamily="34" charset="0"/>
                 <a:ea typeface="Trebuchet MS" pitchFamily="34" charset="-122"/>
@@ -6567,18 +6574,25 @@
         </p:nvSpPr>
         <p:spPr>
           <a:xfrm>
-            <a:off x="685800" y="2911525"/>
-            <a:ext cx="7772400" cy="959941"/>
+            <a:off x="647700" y="2990255"/>
+            <a:ext cx="7848600" cy="982861"/>
           </a:xfrm>
           <a:prstGeom prst="roundRect">
             <a:avLst>
-              <a:gd name="adj" fmla="val 13891"/>
+              <a:gd name="adj" fmla="val 15506"/>
             </a:avLst>
           </a:prstGeom>
           <a:solidFill>
-            <a:srgbClr val="E9F5F0"/>
+            <a:srgbClr val="111F3B"/>
           </a:solidFill>
           <a:ln/>
+          <a:effectLst>
+            <a:outerShdw sx="100000" sy="100000" kx="0" ky="0" algn="bl" rotWithShape="0" blurRad="171450" dist="76200" dir="5400000">
+              <a:srgbClr val="050c1a">
+                <a:alpha val="35000"/>
+              </a:srgbClr>
+            </a:outerShdw>
+          </a:effectLst>
         </p:spPr>
         <p:txBody>
           <a:bodyPr wrap="square" rtlCol="0" anchor="ctr"/>
@@ -6599,8 +6613,8 @@
         </p:nvSpPr>
         <p:spPr>
           <a:xfrm>
-            <a:off x="714375" y="2911525"/>
-            <a:ext cx="0" cy="959941"/>
+            <a:off x="676275" y="2990255"/>
+            <a:ext cx="0" cy="982861"/>
           </a:xfrm>
           <a:prstGeom prst="line">
             <a:avLst/>
@@ -6608,7 +6622,7 @@
           <a:noFill/>
           <a:ln w="57150">
             <a:solidFill>
-              <a:srgbClr val="40695B"/>
+              <a:srgbClr val="F97316"/>
             </a:solidFill>
             <a:prstDash val="solid"/>
           </a:ln>
@@ -6622,8 +6636,8 @@
         </p:nvSpPr>
         <p:spPr>
           <a:xfrm>
-            <a:off x="933450" y="3082975"/>
-            <a:ext cx="7480935" cy="617041"/>
+            <a:off x="933450" y="3161705"/>
+            <a:ext cx="7480935" cy="639961"/>
           </a:xfrm>
           <a:prstGeom prst="rect">
             <a:avLst/>
@@ -6637,14 +6651,14 @@
           <a:p>
             <a:pPr algn="l" indent="0" marL="0">
               <a:lnSpc>
-                <a:spcPts val="2430"/>
+                <a:spcPts val="2520"/>
               </a:lnSpc>
               <a:buNone/>
             </a:pPr>
             <a:r>
               <a:rPr lang="en-US" sz="1800" b="1" dirty="0">
                 <a:solidFill>
-                  <a:srgbClr val="40695B"/>
+                  <a:srgbClr val="F97316"/>
                 </a:solidFill>
                 <a:latin typeface="Trebuchet MS" pitchFamily="34" charset="0"/>
                 <a:ea typeface="Trebuchet MS" pitchFamily="34" charset="-122"/>
@@ -6670,7 +6684,7 @@
     <p:bg>
       <p:bgPr>
         <a:solidFill>
-          <a:srgbClr val="FCFCFC"/>
+          <a:srgbClr val="0F172A"/>
         </a:solidFill>
       </p:bgPr>
     </p:bg>
@@ -6696,8 +6710,8 @@
         </p:nvSpPr>
         <p:spPr>
           <a:xfrm>
-            <a:off x="685800" y="533400"/>
-            <a:ext cx="7927848" cy="231428"/>
+            <a:off x="647700" y="457200"/>
+            <a:ext cx="8005572" cy="239911"/>
           </a:xfrm>
           <a:prstGeom prst="rect">
             <a:avLst/>
@@ -6711,14 +6725,14 @@
           <a:p>
             <a:pPr algn="l" indent="0" marL="0">
               <a:lnSpc>
-                <a:spcPts val="1823"/>
+                <a:spcPts val="1890"/>
               </a:lnSpc>
               <a:buNone/>
             </a:pPr>
             <a:r>
               <a:rPr lang="en-US" sz="1350" dirty="0">
                 <a:solidFill>
-                  <a:srgbClr val="4A5A68"/>
+                  <a:srgbClr val="F97316"/>
                 </a:solidFill>
                 <a:latin typeface="Trebuchet MS" pitchFamily="34" charset="0"/>
                 <a:ea typeface="Trebuchet MS" pitchFamily="34" charset="-122"/>
@@ -6738,8 +6752,8 @@
         </p:nvSpPr>
         <p:spPr>
           <a:xfrm>
-            <a:off x="685800" y="821978"/>
-            <a:ext cx="7927848" cy="371475"/>
+            <a:off x="647700" y="773311"/>
+            <a:ext cx="8005572" cy="400050"/>
           </a:xfrm>
           <a:prstGeom prst="rect">
             <a:avLst/>
@@ -6755,9 +6769,9 @@
               <a:buNone/>
             </a:pPr>
             <a:r>
-              <a:rPr lang="en-US" sz="2550" b="1" dirty="0">
-                <a:solidFill>
-                  <a:srgbClr val="B165FB"/>
+              <a:rPr lang="en-US" sz="2700" b="1" dirty="0">
+                <a:solidFill>
+                  <a:srgbClr val="38BDF8"/>
                 </a:solidFill>
                 <a:latin typeface="Trebuchet MS" pitchFamily="34" charset="0"/>
                 <a:ea typeface="Trebuchet MS" pitchFamily="34" charset="-122"/>
@@ -6765,7 +6779,7 @@
               </a:rPr>
               <a:t>What Is an Agent?</a:t>
             </a:r>
-            <a:endParaRPr lang="en-US" sz="2550" dirty="0"/>
+            <a:endParaRPr lang="en-US" sz="2700" dirty="0"/>
           </a:p>
         </p:txBody>
       </p:sp>
@@ -6777,8 +6791,8 @@
         </p:nvSpPr>
         <p:spPr>
           <a:xfrm>
-            <a:off x="685800" y="1364903"/>
-            <a:ext cx="7772400" cy="1375172"/>
+            <a:off x="647700" y="1344811"/>
+            <a:ext cx="7848600" cy="1473994"/>
           </a:xfrm>
           <a:prstGeom prst="rect">
             <a:avLst/>
@@ -6787,12 +6801,12 @@
           <a:ln/>
         </p:spPr>
         <p:txBody>
-          <a:bodyPr wrap="square" lIns="123825" tIns="0" rIns="0" bIns="0" rtlCol="0" anchor="t"/>
-          <a:lstStyle/>
-          <a:p>
-            <a:pPr algn="l" marL="123825" indent="-123825">
-              <a:lnSpc>
-                <a:spcPts val="2145"/>
+          <a:bodyPr wrap="square" lIns="133350" tIns="0" rIns="0" bIns="0" rtlCol="0" anchor="t"/>
+          <a:lstStyle/>
+          <a:p>
+            <a:pPr algn="l" marL="133350" indent="-133350">
+              <a:lnSpc>
+                <a:spcPts val="2228"/>
               </a:lnSpc>
               <a:buSzPct val="100000"/>
               <a:buChar char="•"/>
@@ -6800,7 +6814,7 @@
             <a:r>
               <a:rPr lang="en-US" sz="1650" dirty="0">
                 <a:solidFill>
-                  <a:srgbClr val="182D3C"/>
+                  <a:srgbClr val="E2E8F0"/>
                 </a:solidFill>
                 <a:latin typeface="Trebuchet MS" pitchFamily="34" charset="0"/>
                 <a:ea typeface="Trebuchet MS" pitchFamily="34" charset="-122"/>
@@ -6811,9 +6825,9 @@
             <a:endParaRPr lang="en-US" sz="1650" dirty="0"/>
           </a:p>
           <a:p>
-            <a:pPr algn="l" marL="123825" indent="-123825">
-              <a:lnSpc>
-                <a:spcPts val="2145"/>
+            <a:pPr algn="l" marL="133350" indent="-133350">
+              <a:lnSpc>
+                <a:spcPts val="2228"/>
               </a:lnSpc>
               <a:buSzPct val="100000"/>
               <a:buChar char="•"/>
@@ -6821,7 +6835,7 @@
             <a:r>
               <a:rPr lang="en-US" sz="1650" dirty="0">
                 <a:solidFill>
-                  <a:srgbClr val="182D3C"/>
+                  <a:srgbClr val="E2E8F0"/>
                 </a:solidFill>
                 <a:latin typeface="Trebuchet MS" pitchFamily="34" charset="0"/>
                 <a:ea typeface="Trebuchet MS" pitchFamily="34" charset="-122"/>
@@ -6832,9 +6846,9 @@
             <a:endParaRPr lang="en-US" sz="1650" dirty="0"/>
           </a:p>
           <a:p>
-            <a:pPr algn="l" marL="123825" indent="-123825">
-              <a:lnSpc>
-                <a:spcPts val="2145"/>
+            <a:pPr algn="l" marL="133350" indent="-133350">
+              <a:lnSpc>
+                <a:spcPts val="2228"/>
               </a:lnSpc>
               <a:buSzPct val="100000"/>
               <a:buChar char="•"/>
@@ -6842,7 +6856,7 @@
             <a:r>
               <a:rPr lang="en-US" sz="1650" dirty="0">
                 <a:solidFill>
-                  <a:srgbClr val="182D3C"/>
+                  <a:srgbClr val="E2E8F0"/>
                 </a:solidFill>
                 <a:latin typeface="Trebuchet MS" pitchFamily="34" charset="0"/>
                 <a:ea typeface="Trebuchet MS" pitchFamily="34" charset="-122"/>
@@ -6853,9 +6867,9 @@
             <a:endParaRPr lang="en-US" sz="1650" dirty="0"/>
           </a:p>
           <a:p>
-            <a:pPr algn="l" marL="123825" indent="-123825">
-              <a:lnSpc>
-                <a:spcPts val="2145"/>
+            <a:pPr algn="l" marL="133350" indent="-133350">
+              <a:lnSpc>
+                <a:spcPts val="2228"/>
               </a:lnSpc>
               <a:buSzPct val="100000"/>
               <a:buChar char="•"/>
@@ -6863,7 +6877,7 @@
             <a:r>
               <a:rPr lang="en-US" sz="1650" dirty="0">
                 <a:solidFill>
-                  <a:srgbClr val="182D3C"/>
+                  <a:srgbClr val="E2E8F0"/>
                 </a:solidFill>
                 <a:latin typeface="Trebuchet MS" pitchFamily="34" charset="0"/>
                 <a:ea typeface="Trebuchet MS" pitchFamily="34" charset="-122"/>
@@ -6889,7 +6903,7 @@
     <p:bg>
       <p:bgPr>
         <a:solidFill>
-          <a:srgbClr val="FCFCFC"/>
+          <a:srgbClr val="0F172A"/>
         </a:solidFill>
       </p:bgPr>
     </p:bg>
@@ -6915,8 +6929,8 @@
         </p:nvSpPr>
         <p:spPr>
           <a:xfrm>
-            <a:off x="685800" y="533400"/>
-            <a:ext cx="7927848" cy="231428"/>
+            <a:off x="647700" y="457200"/>
+            <a:ext cx="8005572" cy="239911"/>
           </a:xfrm>
           <a:prstGeom prst="rect">
             <a:avLst/>
@@ -6930,14 +6944,14 @@
           <a:p>
             <a:pPr algn="l" indent="0" marL="0">
               <a:lnSpc>
-                <a:spcPts val="1823"/>
+                <a:spcPts val="1890"/>
               </a:lnSpc>
               <a:buNone/>
             </a:pPr>
             <a:r>
               <a:rPr lang="en-US" sz="1350" dirty="0">
                 <a:solidFill>
-                  <a:srgbClr val="4A5A68"/>
+                  <a:srgbClr val="F97316"/>
                 </a:solidFill>
                 <a:latin typeface="Trebuchet MS" pitchFamily="34" charset="0"/>
                 <a:ea typeface="Trebuchet MS" pitchFamily="34" charset="-122"/>
@@ -6957,8 +6971,8 @@
         </p:nvSpPr>
         <p:spPr>
           <a:xfrm>
-            <a:off x="685800" y="821978"/>
-            <a:ext cx="7927848" cy="371475"/>
+            <a:off x="647700" y="773311"/>
+            <a:ext cx="8005572" cy="400050"/>
           </a:xfrm>
           <a:prstGeom prst="rect">
             <a:avLst/>
@@ -6974,9 +6988,9 @@
               <a:buNone/>
             </a:pPr>
             <a:r>
-              <a:rPr lang="en-US" sz="2550" b="1" dirty="0">
-                <a:solidFill>
-                  <a:srgbClr val="B165FB"/>
+              <a:rPr lang="en-US" sz="2700" b="1" dirty="0">
+                <a:solidFill>
+                  <a:srgbClr val="38BDF8"/>
                 </a:solidFill>
                 <a:latin typeface="Trebuchet MS" pitchFamily="34" charset="0"/>
                 <a:ea typeface="Trebuchet MS" pitchFamily="34" charset="-122"/>
@@ -6984,7 +6998,7 @@
               </a:rPr>
               <a:t>What Does It Cost?</a:t>
             </a:r>
-            <a:endParaRPr lang="en-US" sz="2550" dirty="0"/>
+            <a:endParaRPr lang="en-US" sz="2700" dirty="0"/>
           </a:p>
         </p:txBody>
       </p:sp>
@@ -6996,8 +7010,8 @@
         </p:nvSpPr>
         <p:spPr>
           <a:xfrm>
-            <a:off x="685800" y="1364903"/>
-            <a:ext cx="7772400" cy="1375172"/>
+            <a:off x="647700" y="1344811"/>
+            <a:ext cx="7848600" cy="1473994"/>
           </a:xfrm>
           <a:prstGeom prst="rect">
             <a:avLst/>
@@ -7006,12 +7020,12 @@
           <a:ln/>
         </p:spPr>
         <p:txBody>
-          <a:bodyPr wrap="square" lIns="123825" tIns="0" rIns="0" bIns="0" rtlCol="0" anchor="t"/>
-          <a:lstStyle/>
-          <a:p>
-            <a:pPr algn="l" marL="123825" indent="-123825">
-              <a:lnSpc>
-                <a:spcPts val="2145"/>
+          <a:bodyPr wrap="square" lIns="133350" tIns="0" rIns="0" bIns="0" rtlCol="0" anchor="t"/>
+          <a:lstStyle/>
+          <a:p>
+            <a:pPr algn="l" marL="133350" indent="-133350">
+              <a:lnSpc>
+                <a:spcPts val="2228"/>
               </a:lnSpc>
               <a:buSzPct val="100000"/>
               <a:buChar char="•"/>
@@ -7019,7 +7033,7 @@
             <a:r>
               <a:rPr lang="en-US" sz="1650" dirty="0">
                 <a:solidFill>
-                  <a:srgbClr val="182D3C"/>
+                  <a:srgbClr val="E2E8F0"/>
                 </a:solidFill>
                 <a:latin typeface="Trebuchet MS" pitchFamily="34" charset="0"/>
                 <a:ea typeface="Trebuchet MS" pitchFamily="34" charset="-122"/>
@@ -7030,9 +7044,9 @@
             <a:endParaRPr lang="en-US" sz="1650" dirty="0"/>
           </a:p>
           <a:p>
-            <a:pPr algn="l" marL="123825" indent="-123825">
-              <a:lnSpc>
-                <a:spcPts val="2145"/>
+            <a:pPr algn="l" marL="133350" indent="-133350">
+              <a:lnSpc>
+                <a:spcPts val="2228"/>
               </a:lnSpc>
               <a:buSzPct val="100000"/>
               <a:buChar char="•"/>
@@ -7040,7 +7054,7 @@
             <a:r>
               <a:rPr lang="en-US" sz="1650" dirty="0">
                 <a:solidFill>
-                  <a:srgbClr val="182D3C"/>
+                  <a:srgbClr val="E2E8F0"/>
                 </a:solidFill>
                 <a:latin typeface="Trebuchet MS" pitchFamily="34" charset="0"/>
                 <a:ea typeface="Trebuchet MS" pitchFamily="34" charset="-122"/>
@@ -7051,9 +7065,9 @@
             <a:endParaRPr lang="en-US" sz="1650" dirty="0"/>
           </a:p>
           <a:p>
-            <a:pPr algn="l" marL="123825" indent="-123825">
-              <a:lnSpc>
-                <a:spcPts val="2145"/>
+            <a:pPr algn="l" marL="133350" indent="-133350">
+              <a:lnSpc>
+                <a:spcPts val="2228"/>
               </a:lnSpc>
               <a:buSzPct val="100000"/>
               <a:buChar char="•"/>
@@ -7061,7 +7075,7 @@
             <a:r>
               <a:rPr lang="en-US" sz="1650" dirty="0">
                 <a:solidFill>
-                  <a:srgbClr val="182D3C"/>
+                  <a:srgbClr val="E2E8F0"/>
                 </a:solidFill>
                 <a:latin typeface="Trebuchet MS" pitchFamily="34" charset="0"/>
                 <a:ea typeface="Trebuchet MS" pitchFamily="34" charset="-122"/>
@@ -7072,9 +7086,9 @@
             <a:endParaRPr lang="en-US" sz="1650" dirty="0"/>
           </a:p>
           <a:p>
-            <a:pPr algn="l" marL="123825" indent="-123825">
-              <a:lnSpc>
-                <a:spcPts val="2145"/>
+            <a:pPr algn="l" marL="133350" indent="-133350">
+              <a:lnSpc>
+                <a:spcPts val="2228"/>
               </a:lnSpc>
               <a:buSzPct val="100000"/>
               <a:buChar char="•"/>
@@ -7082,7 +7096,7 @@
             <a:r>
               <a:rPr lang="en-US" sz="1650" dirty="0">
                 <a:solidFill>
-                  <a:srgbClr val="182D3C"/>
+                  <a:srgbClr val="E2E8F0"/>
                 </a:solidFill>
                 <a:latin typeface="Trebuchet MS" pitchFamily="34" charset="0"/>
                 <a:ea typeface="Trebuchet MS" pitchFamily="34" charset="-122"/>
@@ -7108,7 +7122,7 @@
     <p:bg>
       <p:bgPr>
         <a:solidFill>
-          <a:srgbClr val="FCFCFC"/>
+          <a:srgbClr val="0F172A"/>
         </a:solidFill>
       </p:bgPr>
     </p:bg>
@@ -7134,8 +7148,8 @@
         </p:nvSpPr>
         <p:spPr>
           <a:xfrm>
-            <a:off x="685800" y="533400"/>
-            <a:ext cx="7927848" cy="231428"/>
+            <a:off x="647700" y="457200"/>
+            <a:ext cx="8005572" cy="239911"/>
           </a:xfrm>
           <a:prstGeom prst="rect">
             <a:avLst/>
@@ -7149,14 +7163,14 @@
           <a:p>
             <a:pPr algn="l" indent="0" marL="0">
               <a:lnSpc>
-                <a:spcPts val="1823"/>
+                <a:spcPts val="1890"/>
               </a:lnSpc>
               <a:buNone/>
             </a:pPr>
             <a:r>
               <a:rPr lang="en-US" sz="1350" dirty="0">
                 <a:solidFill>
-                  <a:srgbClr val="4A5A68"/>
+                  <a:srgbClr val="F97316"/>
                 </a:solidFill>
                 <a:latin typeface="Trebuchet MS" pitchFamily="34" charset="0"/>
                 <a:ea typeface="Trebuchet MS" pitchFamily="34" charset="-122"/>
@@ -7176,8 +7190,8 @@
         </p:nvSpPr>
         <p:spPr>
           <a:xfrm>
-            <a:off x="685800" y="821978"/>
-            <a:ext cx="7927848" cy="371475"/>
+            <a:off x="647700" y="773311"/>
+            <a:ext cx="8005572" cy="400050"/>
           </a:xfrm>
           <a:prstGeom prst="rect">
             <a:avLst/>
@@ -7193,9 +7207,9 @@
               <a:buNone/>
             </a:pPr>
             <a:r>
-              <a:rPr lang="en-US" sz="2550" b="1" dirty="0">
-                <a:solidFill>
-                  <a:srgbClr val="B165FB"/>
+              <a:rPr lang="en-US" sz="2700" b="1" dirty="0">
+                <a:solidFill>
+                  <a:srgbClr val="38BDF8"/>
                 </a:solidFill>
                 <a:latin typeface="Trebuchet MS" pitchFamily="34" charset="0"/>
                 <a:ea typeface="Trebuchet MS" pitchFamily="34" charset="-122"/>
@@ -7203,7 +7217,7 @@
               </a:rPr>
               <a:t>Example Agent Platforms</a:t>
             </a:r>
-            <a:endParaRPr lang="en-US" sz="2550" dirty="0"/>
+            <a:endParaRPr lang="en-US" sz="2700" dirty="0"/>
           </a:p>
         </p:txBody>
       </p:sp>
@@ -7215,8 +7229,8 @@
         </p:nvSpPr>
         <p:spPr>
           <a:xfrm>
-            <a:off x="685800" y="1364903"/>
-            <a:ext cx="7772400" cy="1279922"/>
+            <a:off x="647700" y="1344811"/>
+            <a:ext cx="7848600" cy="1359694"/>
           </a:xfrm>
           <a:prstGeom prst="rect">
             <a:avLst/>
@@ -7225,12 +7239,12 @@
           <a:ln/>
         </p:spPr>
         <p:txBody>
-          <a:bodyPr wrap="square" lIns="123825" tIns="0" rIns="0" bIns="0" rtlCol="0" anchor="t"/>
-          <a:lstStyle/>
-          <a:p>
-            <a:pPr algn="l" marL="123825" indent="-123825">
-              <a:lnSpc>
-                <a:spcPts val="2145"/>
+          <a:bodyPr wrap="square" lIns="133350" tIns="0" rIns="0" bIns="0" rtlCol="0" anchor="t"/>
+          <a:lstStyle/>
+          <a:p>
+            <a:pPr algn="l" marL="133350" indent="-133350">
+              <a:lnSpc>
+                <a:spcPts val="2228"/>
               </a:lnSpc>
               <a:buSzPct val="100000"/>
               <a:buChar char="•"/>
@@ -7238,7 +7252,7 @@
             <a:r>
               <a:rPr lang="en-US" sz="1650" b="1" dirty="0">
                 <a:solidFill>
-                  <a:srgbClr val="182D3C"/>
+                  <a:srgbClr val="E2E8F0"/>
                 </a:solidFill>
                 <a:latin typeface="Trebuchet MS" pitchFamily="34" charset="0"/>
                 <a:ea typeface="Trebuchet MS" pitchFamily="34" charset="-122"/>
@@ -7248,14 +7262,14 @@
             </a:r>
             <a:pPr algn="l" indent="0" marL="0">
               <a:lnSpc>
-                <a:spcPts val="2145"/>
+                <a:spcPts val="2228"/>
               </a:lnSpc>
               <a:buNone/>
             </a:pPr>
             <a:r>
               <a:rPr lang="en-US" sz="1650" dirty="0">
                 <a:solidFill>
-                  <a:srgbClr val="182D3C"/>
+                  <a:srgbClr val="E2E8F0"/>
                 </a:solidFill>
                 <a:latin typeface="Trebuchet MS" pitchFamily="34" charset="0"/>
                 <a:ea typeface="Trebuchet MS" pitchFamily="34" charset="-122"/>
@@ -7266,9 +7280,9 @@
             <a:endParaRPr lang="en-US" sz="1650" dirty="0"/>
           </a:p>
           <a:p>
-            <a:pPr algn="l" marL="123825" indent="-123825">
-              <a:lnSpc>
-                <a:spcPts val="2145"/>
+            <a:pPr algn="l" marL="133350" indent="-133350">
+              <a:lnSpc>
+                <a:spcPts val="2228"/>
               </a:lnSpc>
               <a:buSzPct val="100000"/>
               <a:buChar char="•"/>
@@ -7276,7 +7290,7 @@
             <a:r>
               <a:rPr lang="en-US" sz="1650" b="1" dirty="0">
                 <a:solidFill>
-                  <a:srgbClr val="182D3C"/>
+                  <a:srgbClr val="E2E8F0"/>
                 </a:solidFill>
                 <a:latin typeface="Trebuchet MS" pitchFamily="34" charset="0"/>
                 <a:ea typeface="Trebuchet MS" pitchFamily="34" charset="-122"/>
@@ -7286,14 +7300,14 @@
             </a:r>
             <a:pPr algn="l" indent="0" marL="0">
               <a:lnSpc>
-                <a:spcPts val="2145"/>
+                <a:spcPts val="2228"/>
               </a:lnSpc>
               <a:buNone/>
             </a:pPr>
             <a:r>
               <a:rPr lang="en-US" sz="1650" dirty="0">
                 <a:solidFill>
-                  <a:srgbClr val="182D3C"/>
+                  <a:srgbClr val="E2E8F0"/>
                 </a:solidFill>
                 <a:latin typeface="Trebuchet MS" pitchFamily="34" charset="0"/>
                 <a:ea typeface="Trebuchet MS" pitchFamily="34" charset="-122"/>
@@ -7304,9 +7318,9 @@
             <a:endParaRPr lang="en-US" sz="1650" dirty="0"/>
           </a:p>
           <a:p>
-            <a:pPr algn="l" marL="123825" indent="-123825">
-              <a:lnSpc>
-                <a:spcPts val="2145"/>
+            <a:pPr algn="l" marL="133350" indent="-133350">
+              <a:lnSpc>
+                <a:spcPts val="2228"/>
               </a:lnSpc>
               <a:buSzPct val="100000"/>
               <a:buChar char="•"/>
@@ -7314,7 +7328,7 @@
             <a:r>
               <a:rPr lang="en-US" sz="1650" b="1" dirty="0">
                 <a:solidFill>
-                  <a:srgbClr val="182D3C"/>
+                  <a:srgbClr val="E2E8F0"/>
                 </a:solidFill>
                 <a:latin typeface="Trebuchet MS" pitchFamily="34" charset="0"/>
                 <a:ea typeface="Trebuchet MS" pitchFamily="34" charset="-122"/>
@@ -7324,14 +7338,14 @@
             </a:r>
             <a:pPr algn="l" indent="0" marL="0">
               <a:lnSpc>
-                <a:spcPts val="2145"/>
+                <a:spcPts val="2228"/>
               </a:lnSpc>
               <a:buNone/>
             </a:pPr>
             <a:r>
               <a:rPr lang="en-US" sz="1650" dirty="0">
                 <a:solidFill>
-                  <a:srgbClr val="182D3C"/>
+                  <a:srgbClr val="E2E8F0"/>
                 </a:solidFill>
                 <a:latin typeface="Trebuchet MS" pitchFamily="34" charset="0"/>
                 <a:ea typeface="Trebuchet MS" pitchFamily="34" charset="-122"/>
@@ -7357,7 +7371,7 @@
     <p:bg>
       <p:bgPr>
         <a:solidFill>
-          <a:srgbClr val="FCFCFC"/>
+          <a:srgbClr val="0F172A"/>
         </a:solidFill>
       </p:bgPr>
     </p:bg>
@@ -7383,8 +7397,8 @@
         </p:nvSpPr>
         <p:spPr>
           <a:xfrm>
-            <a:off x="685800" y="533400"/>
-            <a:ext cx="7927848" cy="231428"/>
+            <a:off x="647700" y="457200"/>
+            <a:ext cx="8005572" cy="239911"/>
           </a:xfrm>
           <a:prstGeom prst="rect">
             <a:avLst/>
@@ -7398,14 +7412,14 @@
           <a:p>
             <a:pPr algn="l" indent="0" marL="0">
               <a:lnSpc>
-                <a:spcPts val="1823"/>
+                <a:spcPts val="1890"/>
               </a:lnSpc>
               <a:buNone/>
             </a:pPr>
             <a:r>
               <a:rPr lang="en-US" sz="1350" dirty="0">
                 <a:solidFill>
-                  <a:srgbClr val="4A5A68"/>
+                  <a:srgbClr val="F97316"/>
                 </a:solidFill>
                 <a:latin typeface="Trebuchet MS" pitchFamily="34" charset="0"/>
                 <a:ea typeface="Trebuchet MS" pitchFamily="34" charset="-122"/>
@@ -7425,8 +7439,8 @@
         </p:nvSpPr>
         <p:spPr>
           <a:xfrm>
-            <a:off x="685800" y="821978"/>
-            <a:ext cx="7927848" cy="371475"/>
+            <a:off x="647700" y="773311"/>
+            <a:ext cx="8005572" cy="400050"/>
           </a:xfrm>
           <a:prstGeom prst="rect">
             <a:avLst/>
@@ -7442,9 +7456,9 @@
               <a:buNone/>
             </a:pPr>
             <a:r>
-              <a:rPr lang="en-US" sz="2550" b="1" dirty="0">
-                <a:solidFill>
-                  <a:srgbClr val="B165FB"/>
+              <a:rPr lang="en-US" sz="2700" b="1" dirty="0">
+                <a:solidFill>
+                  <a:srgbClr val="38BDF8"/>
                 </a:solidFill>
                 <a:latin typeface="Trebuchet MS" pitchFamily="34" charset="0"/>
                 <a:ea typeface="Trebuchet MS" pitchFamily="34" charset="-122"/>
@@ -7452,7 +7466,7 @@
               </a:rPr>
               <a:t>Promise and Perils</a:t>
             </a:r>
-            <a:endParaRPr lang="en-US" sz="2550" dirty="0"/>
+            <a:endParaRPr lang="en-US" sz="2700" dirty="0"/>
           </a:p>
         </p:txBody>
       </p:sp>
@@ -7464,18 +7478,25 @@
         </p:nvSpPr>
         <p:spPr>
           <a:xfrm>
-            <a:off x="685800" y="1441103"/>
-            <a:ext cx="3714750" cy="3051572"/>
+            <a:off x="647700" y="1440061"/>
+            <a:ext cx="3771900" cy="3283744"/>
           </a:xfrm>
           <a:prstGeom prst="roundRect">
             <a:avLst>
-              <a:gd name="adj" fmla="val 4994"/>
+              <a:gd name="adj" fmla="val 5221"/>
             </a:avLst>
           </a:prstGeom>
           <a:solidFill>
-            <a:srgbClr val="F2EBFD"/>
+            <a:srgbClr val="1B2A44"/>
           </a:solidFill>
           <a:ln/>
+          <a:effectLst>
+            <a:outerShdw sx="100000" sy="100000" kx="0" ky="0" algn="bl" rotWithShape="0" blurRad="228600" dist="95250" dir="5400000">
+              <a:srgbClr val="050c1a">
+                <a:alpha val="25000"/>
+              </a:srgbClr>
+            </a:outerShdw>
+          </a:effectLst>
         </p:spPr>
         <p:txBody>
           <a:bodyPr wrap="square" rtlCol="0" anchor="ctr"/>
@@ -7496,8 +7517,8 @@
         </p:nvSpPr>
         <p:spPr>
           <a:xfrm>
-            <a:off x="876300" y="1612553"/>
-            <a:ext cx="3400425" cy="266700"/>
+            <a:off x="876300" y="1649611"/>
+            <a:ext cx="3380994" cy="266700"/>
           </a:xfrm>
           <a:prstGeom prst="rect">
             <a:avLst/>
@@ -7515,7 +7536,7 @@
             <a:r>
               <a:rPr lang="en-US" sz="1800" b="1" dirty="0">
                 <a:solidFill>
-                  <a:srgbClr val="40695B"/>
+                  <a:srgbClr val="38BDF8"/>
                 </a:solidFill>
                 <a:latin typeface="Trebuchet MS" pitchFamily="34" charset="0"/>
                 <a:ea typeface="Trebuchet MS" pitchFamily="34" charset="-122"/>
@@ -7535,8 +7556,8 @@
         </p:nvSpPr>
         <p:spPr>
           <a:xfrm>
-            <a:off x="876300" y="2012603"/>
-            <a:ext cx="3333750" cy="1712416"/>
+            <a:off x="876300" y="2068711"/>
+            <a:ext cx="3314700" cy="1810345"/>
           </a:xfrm>
           <a:prstGeom prst="rect">
             <a:avLst/>
@@ -7545,12 +7566,12 @@
           <a:ln/>
         </p:spPr>
         <p:txBody>
-          <a:bodyPr wrap="square" lIns="123825" tIns="0" rIns="0" bIns="0" rtlCol="0" anchor="t"/>
-          <a:lstStyle/>
-          <a:p>
-            <a:pPr algn="l" marL="123825" indent="-123825">
-              <a:lnSpc>
-                <a:spcPts val="2048"/>
+          <a:bodyPr wrap="square" lIns="133350" tIns="0" rIns="0" bIns="0" rtlCol="0" anchor="t"/>
+          <a:lstStyle/>
+          <a:p>
+            <a:pPr algn="l" marL="133350" indent="-133350">
+              <a:lnSpc>
+                <a:spcPts val="2126"/>
               </a:lnSpc>
               <a:buSzPct val="100000"/>
               <a:buChar char="•"/>
@@ -7558,7 +7579,7 @@
             <a:r>
               <a:rPr lang="en-US" sz="1575" dirty="0">
                 <a:solidFill>
-                  <a:srgbClr val="182D3C"/>
+                  <a:srgbClr val="E2E8F0"/>
                 </a:solidFill>
                 <a:latin typeface="Trebuchet MS" pitchFamily="34" charset="0"/>
                 <a:ea typeface="Trebuchet MS" pitchFamily="34" charset="-122"/>
@@ -7569,9 +7590,9 @@
             <a:endParaRPr lang="en-US" sz="1575" dirty="0"/>
           </a:p>
           <a:p>
-            <a:pPr algn="l" marL="123825" indent="-123825">
-              <a:lnSpc>
-                <a:spcPts val="2048"/>
+            <a:pPr algn="l" marL="133350" indent="-133350">
+              <a:lnSpc>
+                <a:spcPts val="2126"/>
               </a:lnSpc>
               <a:buSzPct val="100000"/>
               <a:buChar char="•"/>
@@ -7579,7 +7600,7 @@
             <a:r>
               <a:rPr lang="en-US" sz="1575" dirty="0">
                 <a:solidFill>
-                  <a:srgbClr val="182D3C"/>
+                  <a:srgbClr val="E2E8F0"/>
                 </a:solidFill>
                 <a:latin typeface="Trebuchet MS" pitchFamily="34" charset="0"/>
                 <a:ea typeface="Trebuchet MS" pitchFamily="34" charset="-122"/>
@@ -7590,9 +7611,9 @@
             <a:endParaRPr lang="en-US" sz="1575" dirty="0"/>
           </a:p>
           <a:p>
-            <a:pPr algn="l" marL="123825" indent="-123825">
-              <a:lnSpc>
-                <a:spcPts val="2048"/>
+            <a:pPr algn="l" marL="133350" indent="-133350">
+              <a:lnSpc>
+                <a:spcPts val="2126"/>
               </a:lnSpc>
               <a:buSzPct val="100000"/>
               <a:buChar char="•"/>
@@ -7600,7 +7621,7 @@
             <a:r>
               <a:rPr lang="en-US" sz="1575" dirty="0">
                 <a:solidFill>
-                  <a:srgbClr val="182D3C"/>
+                  <a:srgbClr val="E2E8F0"/>
                 </a:solidFill>
                 <a:latin typeface="Trebuchet MS" pitchFamily="34" charset="0"/>
                 <a:ea typeface="Trebuchet MS" pitchFamily="34" charset="-122"/>
@@ -7620,18 +7641,25 @@
         </p:nvSpPr>
         <p:spPr>
           <a:xfrm>
-            <a:off x="4743450" y="1441103"/>
-            <a:ext cx="3714750" cy="3051572"/>
+            <a:off x="4724400" y="1440061"/>
+            <a:ext cx="3771900" cy="3283744"/>
           </a:xfrm>
           <a:prstGeom prst="roundRect">
             <a:avLst>
-              <a:gd name="adj" fmla="val 4994"/>
+              <a:gd name="adj" fmla="val 5221"/>
             </a:avLst>
           </a:prstGeom>
           <a:solidFill>
-            <a:srgbClr val="F2EBFD"/>
+            <a:srgbClr val="1B2A44"/>
           </a:solidFill>
           <a:ln/>
+          <a:effectLst>
+            <a:outerShdw sx="100000" sy="100000" kx="0" ky="0" algn="bl" rotWithShape="0" blurRad="228600" dist="95250" dir="5400000">
+              <a:srgbClr val="050c1a">
+                <a:alpha val="25000"/>
+              </a:srgbClr>
+            </a:outerShdw>
+          </a:effectLst>
         </p:spPr>
         <p:txBody>
           <a:bodyPr wrap="square" rtlCol="0" anchor="ctr"/>
@@ -7652,8 +7680,8 @@
         </p:nvSpPr>
         <p:spPr>
           <a:xfrm>
-            <a:off x="4933950" y="1612553"/>
-            <a:ext cx="3400425" cy="266700"/>
+            <a:off x="4953000" y="1649611"/>
+            <a:ext cx="3380994" cy="266700"/>
           </a:xfrm>
           <a:prstGeom prst="rect">
             <a:avLst/>
@@ -7671,7 +7699,7 @@
             <a:r>
               <a:rPr lang="en-US" sz="1800" b="1" dirty="0">
                 <a:solidFill>
-                  <a:srgbClr val="40695B"/>
+                  <a:srgbClr val="38BDF8"/>
                 </a:solidFill>
                 <a:latin typeface="Trebuchet MS" pitchFamily="34" charset="0"/>
                 <a:ea typeface="Trebuchet MS" pitchFamily="34" charset="-122"/>
@@ -7691,8 +7719,8 @@
         </p:nvSpPr>
         <p:spPr>
           <a:xfrm>
-            <a:off x="4933950" y="2012603"/>
-            <a:ext cx="3333750" cy="2308622"/>
+            <a:off x="4953000" y="2068711"/>
+            <a:ext cx="3314700" cy="2445544"/>
           </a:xfrm>
           <a:prstGeom prst="rect">
             <a:avLst/>
@@ -7701,12 +7729,12 @@
           <a:ln/>
         </p:spPr>
         <p:txBody>
-          <a:bodyPr wrap="square" lIns="123825" tIns="0" rIns="0" bIns="0" rtlCol="0" anchor="t"/>
-          <a:lstStyle/>
-          <a:p>
-            <a:pPr algn="l" marL="123825" indent="-123825">
-              <a:lnSpc>
-                <a:spcPts val="2048"/>
+          <a:bodyPr wrap="square" lIns="133350" tIns="0" rIns="0" bIns="0" rtlCol="0" anchor="t"/>
+          <a:lstStyle/>
+          <a:p>
+            <a:pPr algn="l" marL="133350" indent="-133350">
+              <a:lnSpc>
+                <a:spcPts val="2126"/>
               </a:lnSpc>
               <a:buSzPct val="100000"/>
               <a:buChar char="•"/>
@@ -7714,7 +7742,7 @@
             <a:r>
               <a:rPr lang="en-US" sz="1575" dirty="0">
                 <a:solidFill>
-                  <a:srgbClr val="182D3C"/>
+                  <a:srgbClr val="E2E8F0"/>
                 </a:solidFill>
                 <a:latin typeface="Trebuchet MS" pitchFamily="34" charset="0"/>
                 <a:ea typeface="Trebuchet MS" pitchFamily="34" charset="-122"/>
@@ -7725,9 +7753,9 @@
             <a:endParaRPr lang="en-US" sz="1575" dirty="0"/>
           </a:p>
           <a:p>
-            <a:pPr algn="l" marL="123825" indent="-123825">
-              <a:lnSpc>
-                <a:spcPts val="2048"/>
+            <a:pPr algn="l" marL="133350" indent="-133350">
+              <a:lnSpc>
+                <a:spcPts val="2126"/>
               </a:lnSpc>
               <a:buSzPct val="100000"/>
               <a:buChar char="•"/>
@@ -7735,7 +7763,7 @@
             <a:r>
               <a:rPr lang="en-US" sz="1575" dirty="0">
                 <a:solidFill>
-                  <a:srgbClr val="182D3C"/>
+                  <a:srgbClr val="E2E8F0"/>
                 </a:solidFill>
                 <a:latin typeface="Trebuchet MS" pitchFamily="34" charset="0"/>
                 <a:ea typeface="Trebuchet MS" pitchFamily="34" charset="-122"/>
@@ -7746,9 +7774,9 @@
             <a:endParaRPr lang="en-US" sz="1575" dirty="0"/>
           </a:p>
           <a:p>
-            <a:pPr algn="l" marL="123825" indent="-123825">
-              <a:lnSpc>
-                <a:spcPts val="2048"/>
+            <a:pPr algn="l" marL="133350" indent="-133350">
+              <a:lnSpc>
+                <a:spcPts val="2126"/>
               </a:lnSpc>
               <a:buSzPct val="100000"/>
               <a:buChar char="•"/>
@@ -7756,7 +7784,7 @@
             <a:r>
               <a:rPr lang="en-US" sz="1575" dirty="0">
                 <a:solidFill>
-                  <a:srgbClr val="182D3C"/>
+                  <a:srgbClr val="E2E8F0"/>
                 </a:solidFill>
                 <a:latin typeface="Trebuchet MS" pitchFamily="34" charset="0"/>
                 <a:ea typeface="Trebuchet MS" pitchFamily="34" charset="-122"/>
@@ -7767,9 +7795,9 @@
             <a:endParaRPr lang="en-US" sz="1575" dirty="0"/>
           </a:p>
           <a:p>
-            <a:pPr algn="l" marL="123825" indent="-123825">
-              <a:lnSpc>
-                <a:spcPts val="2048"/>
+            <a:pPr algn="l" marL="133350" indent="-133350">
+              <a:lnSpc>
+                <a:spcPts val="2126"/>
               </a:lnSpc>
               <a:buSzPct val="100000"/>
               <a:buChar char="•"/>
@@ -7777,7 +7805,7 @@
             <a:r>
               <a:rPr lang="en-US" sz="1575" dirty="0">
                 <a:solidFill>
-                  <a:srgbClr val="182D3C"/>
+                  <a:srgbClr val="E2E8F0"/>
                 </a:solidFill>
                 <a:latin typeface="Trebuchet MS" pitchFamily="34" charset="0"/>
                 <a:ea typeface="Trebuchet MS" pitchFamily="34" charset="-122"/>
@@ -7803,7 +7831,7 @@
     <p:bg>
       <p:bgPr>
         <a:solidFill>
-          <a:srgbClr val="FCFCFC"/>
+          <a:srgbClr val="0F172A"/>
         </a:solidFill>
       </p:bgPr>
     </p:bg>
@@ -7829,8 +7857,8 @@
         </p:nvSpPr>
         <p:spPr>
           <a:xfrm>
-            <a:off x="685800" y="533400"/>
-            <a:ext cx="7927848" cy="231428"/>
+            <a:off x="647700" y="457200"/>
+            <a:ext cx="8005572" cy="239911"/>
           </a:xfrm>
           <a:prstGeom prst="rect">
             <a:avLst/>
@@ -7844,14 +7872,14 @@
           <a:p>
             <a:pPr algn="l" indent="0" marL="0">
               <a:lnSpc>
-                <a:spcPts val="1823"/>
+                <a:spcPts val="1890"/>
               </a:lnSpc>
               <a:buNone/>
             </a:pPr>
             <a:r>
               <a:rPr lang="en-US" sz="1350" dirty="0">
                 <a:solidFill>
-                  <a:srgbClr val="4A5A68"/>
+                  <a:srgbClr val="F97316"/>
                 </a:solidFill>
                 <a:latin typeface="Trebuchet MS" pitchFamily="34" charset="0"/>
                 <a:ea typeface="Trebuchet MS" pitchFamily="34" charset="-122"/>
@@ -7871,8 +7899,8 @@
         </p:nvSpPr>
         <p:spPr>
           <a:xfrm>
-            <a:off x="685800" y="821978"/>
-            <a:ext cx="7927848" cy="371475"/>
+            <a:off x="647700" y="773311"/>
+            <a:ext cx="8005572" cy="400050"/>
           </a:xfrm>
           <a:prstGeom prst="rect">
             <a:avLst/>
@@ -7888,9 +7916,9 @@
               <a:buNone/>
             </a:pPr>
             <a:r>
-              <a:rPr lang="en-US" sz="2550" b="1" dirty="0">
-                <a:solidFill>
-                  <a:srgbClr val="B165FB"/>
+              <a:rPr lang="en-US" sz="2700" b="1" dirty="0">
+                <a:solidFill>
+                  <a:srgbClr val="38BDF8"/>
                 </a:solidFill>
                 <a:latin typeface="Trebuchet MS" pitchFamily="34" charset="0"/>
                 <a:ea typeface="Trebuchet MS" pitchFamily="34" charset="-122"/>
@@ -7898,7 +7926,7 @@
               </a:rPr>
               <a:t>Working With Agents</a:t>
             </a:r>
-            <a:endParaRPr lang="en-US" sz="2550" dirty="0"/>
+            <a:endParaRPr lang="en-US" sz="2700" dirty="0"/>
           </a:p>
         </p:txBody>
       </p:sp>
@@ -7910,8 +7938,8 @@
         </p:nvSpPr>
         <p:spPr>
           <a:xfrm>
-            <a:off x="685800" y="1364903"/>
-            <a:ext cx="7772400" cy="1375172"/>
+            <a:off x="647700" y="1344811"/>
+            <a:ext cx="7848600" cy="1473994"/>
           </a:xfrm>
           <a:prstGeom prst="rect">
             <a:avLst/>
@@ -7920,12 +7948,12 @@
           <a:ln/>
         </p:spPr>
         <p:txBody>
-          <a:bodyPr wrap="square" lIns="123825" tIns="0" rIns="0" bIns="0" rtlCol="0" anchor="t"/>
-          <a:lstStyle/>
-          <a:p>
-            <a:pPr algn="l" marL="123825" indent="-123825">
-              <a:lnSpc>
-                <a:spcPts val="2145"/>
+          <a:bodyPr wrap="square" lIns="133350" tIns="0" rIns="0" bIns="0" rtlCol="0" anchor="t"/>
+          <a:lstStyle/>
+          <a:p>
+            <a:pPr algn="l" marL="133350" indent="-133350">
+              <a:lnSpc>
+                <a:spcPts val="2228"/>
               </a:lnSpc>
               <a:buSzPct val="100000"/>
               <a:buChar char="•"/>
@@ -7933,7 +7961,7 @@
             <a:r>
               <a:rPr lang="en-US" sz="1650" dirty="0">
                 <a:solidFill>
-                  <a:srgbClr val="182D3C"/>
+                  <a:srgbClr val="E2E8F0"/>
                 </a:solidFill>
                 <a:latin typeface="Trebuchet MS" pitchFamily="34" charset="0"/>
                 <a:ea typeface="Trebuchet MS" pitchFamily="34" charset="-122"/>
@@ -7944,9 +7972,9 @@
             <a:endParaRPr lang="en-US" sz="1650" dirty="0"/>
           </a:p>
           <a:p>
-            <a:pPr algn="l" marL="123825" indent="-123825">
-              <a:lnSpc>
-                <a:spcPts val="2145"/>
+            <a:pPr algn="l" marL="133350" indent="-133350">
+              <a:lnSpc>
+                <a:spcPts val="2228"/>
               </a:lnSpc>
               <a:buSzPct val="100000"/>
               <a:buChar char="•"/>
@@ -7954,7 +7982,7 @@
             <a:r>
               <a:rPr lang="en-US" sz="1650" dirty="0">
                 <a:solidFill>
-                  <a:srgbClr val="182D3C"/>
+                  <a:srgbClr val="E2E8F0"/>
                 </a:solidFill>
                 <a:latin typeface="Trebuchet MS" pitchFamily="34" charset="0"/>
                 <a:ea typeface="Trebuchet MS" pitchFamily="34" charset="-122"/>
@@ -7965,9 +7993,9 @@
             <a:endParaRPr lang="en-US" sz="1650" dirty="0"/>
           </a:p>
           <a:p>
-            <a:pPr algn="l" marL="123825" indent="-123825">
-              <a:lnSpc>
-                <a:spcPts val="2145"/>
+            <a:pPr algn="l" marL="133350" indent="-133350">
+              <a:lnSpc>
+                <a:spcPts val="2228"/>
               </a:lnSpc>
               <a:buSzPct val="100000"/>
               <a:buChar char="•"/>
@@ -7975,7 +8003,7 @@
             <a:r>
               <a:rPr lang="en-US" sz="1650" dirty="0">
                 <a:solidFill>
-                  <a:srgbClr val="182D3C"/>
+                  <a:srgbClr val="E2E8F0"/>
                 </a:solidFill>
                 <a:latin typeface="Trebuchet MS" pitchFamily="34" charset="0"/>
                 <a:ea typeface="Trebuchet MS" pitchFamily="34" charset="-122"/>
@@ -7986,9 +8014,9 @@
             <a:endParaRPr lang="en-US" sz="1650" dirty="0"/>
           </a:p>
           <a:p>
-            <a:pPr algn="l" marL="123825" indent="-123825">
-              <a:lnSpc>
-                <a:spcPts val="2145"/>
+            <a:pPr algn="l" marL="133350" indent="-133350">
+              <a:lnSpc>
+                <a:spcPts val="2228"/>
               </a:lnSpc>
               <a:buSzPct val="100000"/>
               <a:buChar char="•"/>
@@ -7996,7 +8024,7 @@
             <a:r>
               <a:rPr lang="en-US" sz="1650" dirty="0">
                 <a:solidFill>
-                  <a:srgbClr val="182D3C"/>
+                  <a:srgbClr val="E2E8F0"/>
                 </a:solidFill>
                 <a:latin typeface="Trebuchet MS" pitchFamily="34" charset="0"/>
                 <a:ea typeface="Trebuchet MS" pitchFamily="34" charset="-122"/>

</xml_diff>

<commit_message>
chore(commit): add instructions for generating structured commit messages
Co-authored-by: terragon-labs[bot] <terragon-labs[bot]@users.noreply.github.com>
</commit_message>
<xml_diff>
--- a/slides-new/Agentic-AI-Agent-Talk.pptx
+++ b/slides-new/Agentic-AI-Agent-Talk.pptx
@@ -2664,7 +2664,7 @@
         <p:spPr>
           <a:xfrm>
             <a:off x="647700" y="457200"/>
-            <a:ext cx="8005572" cy="239911"/>
+            <a:ext cx="8005572" cy="248543"/>
           </a:xfrm>
           <a:prstGeom prst="rect">
             <a:avLst/>
@@ -2678,7 +2678,7 @@
           <a:p>
             <a:pPr algn="l" indent="0" marL="0">
               <a:lnSpc>
-                <a:spcPts val="1890"/>
+                <a:spcPts val="1958"/>
               </a:lnSpc>
               <a:buNone/>
             </a:pPr>
@@ -2705,7 +2705,7 @@
         </p:nvSpPr>
         <p:spPr>
           <a:xfrm>
-            <a:off x="647700" y="773311"/>
+            <a:off x="647700" y="781943"/>
             <a:ext cx="8005572" cy="1028700"/>
           </a:xfrm>
           <a:prstGeom prst="rect">
@@ -2744,8 +2744,8 @@
         </p:nvSpPr>
         <p:spPr>
           <a:xfrm>
-            <a:off x="647700" y="1878211"/>
-            <a:ext cx="8005572" cy="266700"/>
+            <a:off x="647700" y="1886843"/>
+            <a:ext cx="8005572" cy="303758"/>
           </a:xfrm>
           <a:prstGeom prst="rect">
             <a:avLst/>
@@ -2759,12 +2759,12 @@
           <a:p>
             <a:pPr algn="l" indent="0" marL="0">
               <a:lnSpc>
-                <a:spcPts val="2100"/>
+                <a:spcPts val="2392"/>
               </a:lnSpc>
               <a:buNone/>
             </a:pPr>
             <a:r>
-              <a:rPr lang="en-US" sz="1500" dirty="0">
+              <a:rPr lang="en-US" sz="1650" dirty="0">
                 <a:solidFill>
                   <a:srgbClr val="94A3B8"/>
                 </a:solidFill>
@@ -2774,7 +2774,7 @@
               </a:rPr>
               <a:t>From Prompt to Pipeline</a:t>
             </a:r>
-            <a:endParaRPr lang="en-US" sz="1500" dirty="0"/>
+            <a:endParaRPr lang="en-US" sz="1650" dirty="0"/>
           </a:p>
         </p:txBody>
       </p:sp>
@@ -2786,8 +2786,8 @@
         </p:nvSpPr>
         <p:spPr>
           <a:xfrm>
-            <a:off x="647700" y="2316361"/>
-            <a:ext cx="7848600" cy="2343150"/>
+            <a:off x="647700" y="2323951"/>
+            <a:ext cx="7848600" cy="2316361"/>
           </a:xfrm>
           <a:prstGeom prst="rect">
             <a:avLst/>
@@ -2796,16 +2796,16 @@
           <a:ln/>
         </p:spPr>
         <p:txBody>
-          <a:bodyPr wrap="square" lIns="133350" tIns="0" rIns="0" bIns="0" rtlCol="0" anchor="t"/>
+          <a:bodyPr wrap="square" lIns="152400" tIns="0" rIns="0" bIns="0" rtlCol="0" anchor="t"/>
           <a:lstStyle/>
           <a:p>
             <a:pPr algn="l" indent="0" marL="0">
               <a:lnSpc>
-                <a:spcPts val="2228"/>
+                <a:spcPts val="2520"/>
               </a:lnSpc>
               <a:buNone/>
             </a:pPr>
-            <a:endParaRPr lang="en-US" sz="1650" dirty="0"/>
+            <a:endParaRPr lang="en-US" sz="1800" dirty="0"/>
           </a:p>
         </p:txBody>
       </p:sp>
@@ -2817,8 +2817,8 @@
         </p:nvSpPr>
         <p:spPr>
           <a:xfrm>
-            <a:off x="1162050" y="2449711"/>
-            <a:ext cx="7286625" cy="247650"/>
+            <a:off x="1200150" y="2438251"/>
+            <a:ext cx="7247763" cy="293340"/>
           </a:xfrm>
           <a:prstGeom prst="rect">
             <a:avLst/>
@@ -2832,12 +2832,12 @@
           <a:p>
             <a:pPr algn="l" indent="0" marL="0">
               <a:lnSpc>
-                <a:spcPts val="1950"/>
+                <a:spcPts val="2310"/>
               </a:lnSpc>
               <a:buNone/>
             </a:pPr>
             <a:r>
-              <a:rPr lang="en-US" sz="1500" dirty="0">
+              <a:rPr lang="en-US" sz="1650" dirty="0">
                 <a:solidFill>
                   <a:srgbClr val="E2E8F0"/>
                 </a:solidFill>
@@ -2847,7 +2847,7 @@
               </a:rPr>
               <a:t>Shane Lindsay</a:t>
             </a:r>
-            <a:endParaRPr lang="en-US" sz="1500" dirty="0"/>
+            <a:endParaRPr lang="en-US" sz="1650" dirty="0"/>
           </a:p>
         </p:txBody>
       </p:sp>
@@ -2859,8 +2859,8 @@
         </p:nvSpPr>
         <p:spPr>
           <a:xfrm>
-            <a:off x="1162050" y="3059311"/>
-            <a:ext cx="7286625" cy="247650"/>
+            <a:off x="1200150" y="3036391"/>
+            <a:ext cx="7247763" cy="293340"/>
           </a:xfrm>
           <a:prstGeom prst="rect">
             <a:avLst/>
@@ -2874,12 +2874,12 @@
           <a:p>
             <a:pPr algn="l" indent="0" marL="0">
               <a:lnSpc>
-                <a:spcPts val="1950"/>
+                <a:spcPts val="2310"/>
               </a:lnSpc>
               <a:buNone/>
             </a:pPr>
             <a:r>
-              <a:rPr lang="en-US" sz="1500" dirty="0">
+              <a:rPr lang="en-US" sz="1650" dirty="0">
                 <a:solidFill>
                   <a:srgbClr val="E2E8F0"/>
                 </a:solidFill>
@@ -2889,7 +2889,7 @@
               </a:rPr>
               <a:t>s.lindsay@hull.ac.uk</a:t>
             </a:r>
-            <a:endParaRPr lang="en-US" sz="1500" dirty="0"/>
+            <a:endParaRPr lang="en-US" sz="1650" dirty="0"/>
           </a:p>
         </p:txBody>
       </p:sp>
@@ -2901,8 +2901,8 @@
         </p:nvSpPr>
         <p:spPr>
           <a:xfrm>
-            <a:off x="1162050" y="3668911"/>
-            <a:ext cx="7286625" cy="247650"/>
+            <a:off x="1200150" y="3634532"/>
+            <a:ext cx="7247763" cy="293340"/>
           </a:xfrm>
           <a:prstGeom prst="rect">
             <a:avLst/>
@@ -2916,12 +2916,12 @@
           <a:p>
             <a:pPr algn="l" indent="0" marL="0">
               <a:lnSpc>
-                <a:spcPts val="1950"/>
+                <a:spcPts val="2310"/>
               </a:lnSpc>
               <a:buNone/>
             </a:pPr>
             <a:r>
-              <a:rPr lang="en-US" sz="1500" dirty="0">
+              <a:rPr lang="en-US" sz="1650" dirty="0">
                 <a:solidFill>
                   <a:srgbClr val="E2E8F0"/>
                 </a:solidFill>
@@ -2931,7 +2931,7 @@
               </a:rPr>
               <a:t>University of Hull</a:t>
             </a:r>
-            <a:endParaRPr lang="en-US" sz="1500" dirty="0"/>
+            <a:endParaRPr lang="en-US" sz="1650" dirty="0"/>
           </a:p>
         </p:txBody>
       </p:sp>
@@ -2943,8 +2943,8 @@
         </p:nvSpPr>
         <p:spPr>
           <a:xfrm>
-            <a:off x="1162050" y="4278511"/>
-            <a:ext cx="7286625" cy="247650"/>
+            <a:off x="1200150" y="4232672"/>
+            <a:ext cx="7247763" cy="293340"/>
           </a:xfrm>
           <a:prstGeom prst="rect">
             <a:avLst/>
@@ -2958,12 +2958,12 @@
           <a:p>
             <a:pPr algn="l" indent="0" marL="0">
               <a:lnSpc>
-                <a:spcPts val="1950"/>
+                <a:spcPts val="2310"/>
               </a:lnSpc>
               <a:buNone/>
             </a:pPr>
             <a:r>
-              <a:rPr lang="en-US" sz="1500" dirty="0">
+              <a:rPr lang="en-US" sz="1650" dirty="0">
                 <a:solidFill>
                   <a:srgbClr val="E2E8F0"/>
                 </a:solidFill>
@@ -2973,7 +2973,7 @@
               </a:rPr>
               <a:t>github.com/shanelindsay/agentic-r</a:t>
             </a:r>
-            <a:endParaRPr lang="en-US" sz="1500" dirty="0"/>
+            <a:endParaRPr lang="en-US" sz="1650" dirty="0"/>
           </a:p>
         </p:txBody>
       </p:sp>
@@ -3018,7 +3018,7 @@
         <p:spPr>
           <a:xfrm>
             <a:off x="647700" y="457200"/>
-            <a:ext cx="8005572" cy="239911"/>
+            <a:ext cx="8005572" cy="248543"/>
           </a:xfrm>
           <a:prstGeom prst="rect">
             <a:avLst/>
@@ -3032,7 +3032,7 @@
           <a:p>
             <a:pPr algn="l" indent="0" marL="0">
               <a:lnSpc>
-                <a:spcPts val="1890"/>
+                <a:spcPts val="1958"/>
               </a:lnSpc>
               <a:buNone/>
             </a:pPr>
@@ -3059,7 +3059,7 @@
         </p:nvSpPr>
         <p:spPr>
           <a:xfrm>
-            <a:off x="647700" y="773311"/>
+            <a:off x="647700" y="781943"/>
             <a:ext cx="8005572" cy="400050"/>
           </a:xfrm>
           <a:prstGeom prst="rect">
@@ -3098,8 +3098,8 @@
         </p:nvSpPr>
         <p:spPr>
           <a:xfrm>
-            <a:off x="647700" y="1344811"/>
-            <a:ext cx="7848600" cy="1871067"/>
+            <a:off x="647700" y="1315343"/>
+            <a:ext cx="7848600" cy="2133302"/>
           </a:xfrm>
           <a:prstGeom prst="rect">
             <a:avLst/>
@@ -3108,18 +3108,18 @@
           <a:ln/>
         </p:spPr>
         <p:txBody>
-          <a:bodyPr wrap="square" lIns="133350" tIns="0" rIns="0" bIns="0" rtlCol="0" anchor="t"/>
-          <a:lstStyle/>
-          <a:p>
-            <a:pPr algn="l" marL="133350" indent="-133350">
-              <a:lnSpc>
-                <a:spcPts val="2228"/>
+          <a:bodyPr wrap="square" lIns="152400" tIns="0" rIns="0" bIns="0" rtlCol="0" anchor="t"/>
+          <a:lstStyle/>
+          <a:p>
+            <a:pPr algn="l" marL="152400" indent="-152400">
+              <a:lnSpc>
+                <a:spcPts val="2520"/>
               </a:lnSpc>
               <a:buSzPct val="100000"/>
               <a:buChar char="•"/>
             </a:pPr>
             <a:r>
-              <a:rPr lang="en-US" sz="1650" dirty="0">
+              <a:rPr lang="en-US" sz="1800" dirty="0">
                 <a:solidFill>
                   <a:srgbClr val="E2E8F0"/>
                 </a:solidFill>
@@ -3129,18 +3129,18 @@
               </a:rPr>
               <a:t>Enable peers to verify findings and build on your work</a:t>
             </a:r>
-            <a:endParaRPr lang="en-US" sz="1650" dirty="0"/>
-          </a:p>
-          <a:p>
-            <a:pPr algn="l" marL="133350" indent="-133350">
-              <a:lnSpc>
-                <a:spcPts val="2228"/>
+            <a:endParaRPr lang="en-US" sz="1800" dirty="0"/>
+          </a:p>
+          <a:p>
+            <a:pPr algn="l" marL="152400" indent="-152400">
+              <a:lnSpc>
+                <a:spcPts val="2520"/>
               </a:lnSpc>
               <a:buSzPct val="100000"/>
               <a:buChar char="•"/>
             </a:pPr>
             <a:r>
-              <a:rPr lang="en-US" sz="1650" dirty="0">
+              <a:rPr lang="en-US" sz="1800" dirty="0">
                 <a:solidFill>
                   <a:srgbClr val="E2E8F0"/>
                 </a:solidFill>
@@ -3150,18 +3150,18 @@
               </a:rPr>
               <a:t>Increase transparency, reduce hidden biases</a:t>
             </a:r>
-            <a:endParaRPr lang="en-US" sz="1650" dirty="0"/>
-          </a:p>
-          <a:p>
-            <a:pPr algn="l" marL="133350" indent="-133350">
-              <a:lnSpc>
-                <a:spcPts val="2228"/>
+            <a:endParaRPr lang="en-US" sz="1800" dirty="0"/>
+          </a:p>
+          <a:p>
+            <a:pPr algn="l" marL="152400" indent="-152400">
+              <a:lnSpc>
+                <a:spcPts val="2520"/>
               </a:lnSpc>
               <a:buSzPct val="100000"/>
               <a:buChar char="•"/>
             </a:pPr>
             <a:r>
-              <a:rPr lang="en-US" sz="1650" dirty="0">
+              <a:rPr lang="en-US" sz="1800" dirty="0">
                 <a:solidFill>
                   <a:srgbClr val="E2E8F0"/>
                 </a:solidFill>
@@ -3171,18 +3171,18 @@
               </a:rPr>
               <a:t>Spot errors earlier via shared, reviewable workflows</a:t>
             </a:r>
-            <a:endParaRPr lang="en-US" sz="1650" dirty="0"/>
-          </a:p>
-          <a:p>
-            <a:pPr algn="l" marL="133350" indent="-133350">
-              <a:lnSpc>
-                <a:spcPts val="2228"/>
+            <a:endParaRPr lang="en-US" sz="1800" dirty="0"/>
+          </a:p>
+          <a:p>
+            <a:pPr algn="l" marL="152400" indent="-152400">
+              <a:lnSpc>
+                <a:spcPts val="2520"/>
               </a:lnSpc>
               <a:buSzPct val="100000"/>
               <a:buChar char="•"/>
             </a:pPr>
             <a:r>
-              <a:rPr lang="en-US" sz="1650" dirty="0">
+              <a:rPr lang="en-US" sz="1800" dirty="0">
                 <a:solidFill>
                   <a:srgbClr val="E2E8F0"/>
                 </a:solidFill>
@@ -3192,18 +3192,18 @@
               </a:rPr>
               <a:t>Preserve institutional knowledge beyond any one researcher</a:t>
             </a:r>
-            <a:endParaRPr lang="en-US" sz="1650" dirty="0"/>
-          </a:p>
-          <a:p>
-            <a:pPr algn="l" marL="133350" indent="-133350">
-              <a:lnSpc>
-                <a:spcPts val="2228"/>
+            <a:endParaRPr lang="en-US" sz="1800" dirty="0"/>
+          </a:p>
+          <a:p>
+            <a:pPr algn="l" marL="152400" indent="-152400">
+              <a:lnSpc>
+                <a:spcPts val="2520"/>
               </a:lnSpc>
               <a:buSzPct val="100000"/>
               <a:buChar char="•"/>
             </a:pPr>
             <a:r>
-              <a:rPr lang="en-US" sz="1650" dirty="0">
+              <a:rPr lang="en-US" sz="1800" dirty="0">
                 <a:solidFill>
                   <a:srgbClr val="E2E8F0"/>
                 </a:solidFill>
@@ -3213,7 +3213,7 @@
               </a:rPr>
               <a:t>Align with funder and journal expectations</a:t>
             </a:r>
-            <a:endParaRPr lang="en-US" sz="1650" dirty="0"/>
+            <a:endParaRPr lang="en-US" sz="1800" dirty="0"/>
           </a:p>
         </p:txBody>
       </p:sp>
@@ -3258,7 +3258,7 @@
         <p:spPr>
           <a:xfrm>
             <a:off x="647700" y="457200"/>
-            <a:ext cx="8005572" cy="239911"/>
+            <a:ext cx="8005572" cy="248543"/>
           </a:xfrm>
           <a:prstGeom prst="rect">
             <a:avLst/>
@@ -3272,7 +3272,7 @@
           <a:p>
             <a:pPr algn="l" indent="0" marL="0">
               <a:lnSpc>
-                <a:spcPts val="1890"/>
+                <a:spcPts val="1958"/>
               </a:lnSpc>
               <a:buNone/>
             </a:pPr>
@@ -3299,7 +3299,7 @@
         </p:nvSpPr>
         <p:spPr>
           <a:xfrm>
-            <a:off x="647700" y="773311"/>
+            <a:off x="647700" y="781943"/>
             <a:ext cx="8005572" cy="400050"/>
           </a:xfrm>
           <a:prstGeom prst="rect">
@@ -3338,8 +3338,8 @@
         </p:nvSpPr>
         <p:spPr>
           <a:xfrm>
-            <a:off x="647700" y="1344811"/>
-            <a:ext cx="7848600" cy="1076920"/>
+            <a:off x="647700" y="1315343"/>
+            <a:ext cx="7848600" cy="1546622"/>
           </a:xfrm>
           <a:prstGeom prst="rect">
             <a:avLst/>
@@ -3348,18 +3348,18 @@
           <a:ln/>
         </p:spPr>
         <p:txBody>
-          <a:bodyPr wrap="square" lIns="133350" tIns="0" rIns="0" bIns="0" rtlCol="0" anchor="t"/>
-          <a:lstStyle/>
-          <a:p>
-            <a:pPr algn="l" marL="133350" indent="-133350">
-              <a:lnSpc>
-                <a:spcPts val="2228"/>
+          <a:bodyPr wrap="square" lIns="152400" tIns="0" rIns="0" bIns="0" rtlCol="0" anchor="t"/>
+          <a:lstStyle/>
+          <a:p>
+            <a:pPr algn="l" marL="152400" indent="-152400">
+              <a:lnSpc>
+                <a:spcPts val="2520"/>
               </a:lnSpc>
               <a:buSzPct val="100000"/>
               <a:buChar char="•"/>
             </a:pPr>
             <a:r>
-              <a:rPr lang="en-US" sz="1650" dirty="0">
+              <a:rPr lang="en-US" sz="1800" dirty="0">
                 <a:solidFill>
                   <a:srgbClr val="E2E8F0"/>
                 </a:solidFill>
@@ -3369,18 +3369,18 @@
               </a:rPr>
               <a:t>Pipelines document the journey: plan -&gt; execute -&gt; review -&gt; share -&gt; rerun</a:t>
             </a:r>
-            <a:endParaRPr lang="en-US" sz="1650" dirty="0"/>
-          </a:p>
-          <a:p>
-            <a:pPr algn="l" marL="133350" indent="-133350">
-              <a:lnSpc>
-                <a:spcPts val="2228"/>
+            <a:endParaRPr lang="en-US" sz="1800" dirty="0"/>
+          </a:p>
+          <a:p>
+            <a:pPr algn="l" marL="152400" indent="-152400">
+              <a:lnSpc>
+                <a:spcPts val="2520"/>
               </a:lnSpc>
               <a:buSzPct val="100000"/>
               <a:buChar char="•"/>
             </a:pPr>
             <a:r>
-              <a:rPr lang="en-US" sz="1650" dirty="0">
+              <a:rPr lang="en-US" sz="1800" dirty="0">
                 <a:solidFill>
                   <a:srgbClr val="E2E8F0"/>
                 </a:solidFill>
@@ -3390,18 +3390,18 @@
               </a:rPr>
               <a:t>Deterministic outputs mean agents can refresh manuscripts safely</a:t>
             </a:r>
-            <a:endParaRPr lang="en-US" sz="1650" dirty="0"/>
-          </a:p>
-          <a:p>
-            <a:pPr algn="l" marL="133350" indent="-133350">
-              <a:lnSpc>
-                <a:spcPts val="2228"/>
+            <a:endParaRPr lang="en-US" sz="1800" dirty="0"/>
+          </a:p>
+          <a:p>
+            <a:pPr algn="l" marL="152400" indent="-152400">
+              <a:lnSpc>
+                <a:spcPts val="2520"/>
               </a:lnSpc>
               <a:buSzPct val="100000"/>
               <a:buChar char="•"/>
             </a:pPr>
             <a:r>
-              <a:rPr lang="en-US" sz="1650" dirty="0">
+              <a:rPr lang="en-US" sz="1800" dirty="0">
                 <a:solidFill>
                   <a:srgbClr val="E2E8F0"/>
                 </a:solidFill>
@@ -3411,7 +3411,7 @@
               </a:rPr>
               <a:t>Text-based artefacts make diffing, auditing, and PR review trivial</a:t>
             </a:r>
-            <a:endParaRPr lang="en-US" sz="1650" dirty="0"/>
+            <a:endParaRPr lang="en-US" sz="1800" dirty="0"/>
           </a:p>
         </p:txBody>
       </p:sp>
@@ -3456,7 +3456,7 @@
         <p:spPr>
           <a:xfrm>
             <a:off x="647700" y="457200"/>
-            <a:ext cx="8005572" cy="239911"/>
+            <a:ext cx="8005572" cy="248543"/>
           </a:xfrm>
           <a:prstGeom prst="rect">
             <a:avLst/>
@@ -3470,7 +3470,7 @@
           <a:p>
             <a:pPr algn="l" indent="0" marL="0">
               <a:lnSpc>
-                <a:spcPts val="1890"/>
+                <a:spcPts val="1958"/>
               </a:lnSpc>
               <a:buNone/>
             </a:pPr>
@@ -3497,7 +3497,7 @@
         </p:nvSpPr>
         <p:spPr>
           <a:xfrm>
-            <a:off x="647700" y="773311"/>
+            <a:off x="647700" y="781943"/>
             <a:ext cx="8005572" cy="400050"/>
           </a:xfrm>
           <a:prstGeom prst="rect">
@@ -3536,8 +3536,8 @@
         </p:nvSpPr>
         <p:spPr>
           <a:xfrm>
-            <a:off x="647700" y="1344811"/>
-            <a:ext cx="7848600" cy="1359694"/>
+            <a:off x="647700" y="1315343"/>
+            <a:ext cx="7848600" cy="1546622"/>
           </a:xfrm>
           <a:prstGeom prst="rect">
             <a:avLst/>
@@ -3546,18 +3546,18 @@
           <a:ln/>
         </p:spPr>
         <p:txBody>
-          <a:bodyPr wrap="square" lIns="133350" tIns="0" rIns="0" bIns="0" rtlCol="0" anchor="t"/>
-          <a:lstStyle/>
-          <a:p>
-            <a:pPr algn="l" marL="133350" indent="-133350">
-              <a:lnSpc>
-                <a:spcPts val="2228"/>
+          <a:bodyPr wrap="square" lIns="152400" tIns="0" rIns="0" bIns="0" rtlCol="0" anchor="t"/>
+          <a:lstStyle/>
+          <a:p>
+            <a:pPr algn="l" marL="152400" indent="-152400">
+              <a:lnSpc>
+                <a:spcPts val="2520"/>
               </a:lnSpc>
               <a:buSzPct val="100000"/>
               <a:buChar char="•"/>
             </a:pPr>
             <a:r>
-              <a:rPr lang="en-US" sz="1650" b="1" dirty="0">
+              <a:rPr lang="en-US" sz="1800" b="1" dirty="0">
                 <a:solidFill>
                   <a:srgbClr val="E2E8F0"/>
                 </a:solidFill>
@@ -3569,12 +3569,12 @@
             </a:r>
             <a:pPr algn="l" indent="0" marL="0">
               <a:lnSpc>
-                <a:spcPts val="2228"/>
+                <a:spcPts val="2520"/>
               </a:lnSpc>
               <a:buNone/>
             </a:pPr>
             <a:r>
-              <a:rPr lang="en-US" sz="1650" dirty="0">
+              <a:rPr lang="en-US" sz="1800" dirty="0">
                 <a:solidFill>
                   <a:srgbClr val="E2E8F0"/>
                 </a:solidFill>
@@ -3584,18 +3584,18 @@
               </a:rPr>
               <a:t> fast to start, fragile, opaque when something breaks</a:t>
             </a:r>
-            <a:endParaRPr lang="en-US" sz="1650" dirty="0"/>
-          </a:p>
-          <a:p>
-            <a:pPr algn="l" marL="133350" indent="-133350">
-              <a:lnSpc>
-                <a:spcPts val="2228"/>
+            <a:endParaRPr lang="en-US" sz="1800" dirty="0"/>
+          </a:p>
+          <a:p>
+            <a:pPr algn="l" marL="152400" indent="-152400">
+              <a:lnSpc>
+                <a:spcPts val="2520"/>
               </a:lnSpc>
               <a:buSzPct val="100000"/>
               <a:buChar char="•"/>
             </a:pPr>
             <a:r>
-              <a:rPr lang="en-US" sz="1650" b="1" dirty="0">
+              <a:rPr lang="en-US" sz="1800" b="1" dirty="0">
                 <a:solidFill>
                   <a:srgbClr val="E2E8F0"/>
                 </a:solidFill>
@@ -3607,12 +3607,12 @@
             </a:r>
             <a:pPr algn="l" indent="0" marL="0">
               <a:lnSpc>
-                <a:spcPts val="2228"/>
+                <a:spcPts val="2520"/>
               </a:lnSpc>
               <a:buNone/>
             </a:pPr>
             <a:r>
-              <a:rPr lang="en-US" sz="1650" dirty="0">
+              <a:rPr lang="en-US" sz="1800" dirty="0">
                 <a:solidFill>
                   <a:srgbClr val="E2E8F0"/>
                 </a:solidFill>
@@ -3622,18 +3622,18 @@
               </a:rPr>
               <a:t> clearer modularity, easier to rerun sections</a:t>
             </a:r>
-            <a:endParaRPr lang="en-US" sz="1650" dirty="0"/>
-          </a:p>
-          <a:p>
-            <a:pPr algn="l" marL="133350" indent="-133350">
-              <a:lnSpc>
-                <a:spcPts val="2228"/>
+            <a:endParaRPr lang="en-US" sz="1800" dirty="0"/>
+          </a:p>
+          <a:p>
+            <a:pPr algn="l" marL="152400" indent="-152400">
+              <a:lnSpc>
+                <a:spcPts val="2520"/>
               </a:lnSpc>
               <a:buSzPct val="100000"/>
               <a:buChar char="•"/>
             </a:pPr>
             <a:r>
-              <a:rPr lang="en-US" sz="1650" b="1" dirty="0">
+              <a:rPr lang="en-US" sz="1800" b="1" dirty="0">
                 <a:solidFill>
                   <a:srgbClr val="E2E8F0"/>
                 </a:solidFill>
@@ -3645,12 +3645,12 @@
             </a:r>
             <a:pPr algn="l" indent="0" marL="0">
               <a:lnSpc>
-                <a:spcPts val="2228"/>
+                <a:spcPts val="2520"/>
               </a:lnSpc>
               <a:buNone/>
             </a:pPr>
             <a:r>
-              <a:rPr lang="en-US" sz="1650" dirty="0">
+              <a:rPr lang="en-US" sz="1800" dirty="0">
                 <a:solidFill>
                   <a:srgbClr val="E2E8F0"/>
                 </a:solidFill>
@@ -3660,7 +3660,7 @@
               </a:rPr>
               <a:t> explicit dependencies, deterministic outputs - press go to reach the manuscript</a:t>
             </a:r>
-            <a:endParaRPr lang="en-US" sz="1650" dirty="0"/>
+            <a:endParaRPr lang="en-US" sz="1800" dirty="0"/>
           </a:p>
         </p:txBody>
       </p:sp>
@@ -3705,7 +3705,7 @@
         <p:spPr>
           <a:xfrm>
             <a:off x="647700" y="457200"/>
-            <a:ext cx="8005572" cy="239911"/>
+            <a:ext cx="8005572" cy="248543"/>
           </a:xfrm>
           <a:prstGeom prst="rect">
             <a:avLst/>
@@ -3719,7 +3719,7 @@
           <a:p>
             <a:pPr algn="l" indent="0" marL="0">
               <a:lnSpc>
-                <a:spcPts val="1890"/>
+                <a:spcPts val="1958"/>
               </a:lnSpc>
               <a:buNone/>
             </a:pPr>
@@ -3746,7 +3746,7 @@
         </p:nvSpPr>
         <p:spPr>
           <a:xfrm>
-            <a:off x="647700" y="773311"/>
+            <a:off x="647700" y="781943"/>
             <a:ext cx="8005572" cy="400050"/>
           </a:xfrm>
           <a:prstGeom prst="rect">
@@ -3785,8 +3785,8 @@
         </p:nvSpPr>
         <p:spPr>
           <a:xfrm>
-            <a:off x="647700" y="1344811"/>
-            <a:ext cx="7848600" cy="1076920"/>
+            <a:off x="647700" y="1315343"/>
+            <a:ext cx="7848600" cy="1226641"/>
           </a:xfrm>
           <a:prstGeom prst="rect">
             <a:avLst/>
@@ -3795,18 +3795,18 @@
           <a:ln/>
         </p:spPr>
         <p:txBody>
-          <a:bodyPr wrap="square" lIns="133350" tIns="0" rIns="0" bIns="0" rtlCol="0" anchor="t"/>
-          <a:lstStyle/>
-          <a:p>
-            <a:pPr algn="l" marL="133350" indent="-133350">
-              <a:lnSpc>
-                <a:spcPts val="2228"/>
+          <a:bodyPr wrap="square" lIns="152400" tIns="0" rIns="0" bIns="0" rtlCol="0" anchor="t"/>
+          <a:lstStyle/>
+          <a:p>
+            <a:pPr algn="l" marL="152400" indent="-152400">
+              <a:lnSpc>
+                <a:spcPts val="2520"/>
               </a:lnSpc>
               <a:buSzPct val="100000"/>
               <a:buChar char="•"/>
             </a:pPr>
             <a:r>
-              <a:rPr lang="en-US" sz="1650" dirty="0">
+              <a:rPr lang="en-US" sz="1800" dirty="0">
                 <a:solidFill>
                   <a:srgbClr val="E2E8F0"/>
                 </a:solidFill>
@@ -3816,18 +3816,18 @@
               </a:rPr>
               <a:t>Containers give every run the same starting point</a:t>
             </a:r>
-            <a:endParaRPr lang="en-US" sz="1650" dirty="0"/>
-          </a:p>
-          <a:p>
-            <a:pPr algn="l" marL="133350" indent="-133350">
-              <a:lnSpc>
-                <a:spcPts val="2228"/>
+            <a:endParaRPr lang="en-US" sz="1800" dirty="0"/>
+          </a:p>
+          <a:p>
+            <a:pPr algn="l" marL="152400" indent="-152400">
+              <a:lnSpc>
+                <a:spcPts val="2520"/>
               </a:lnSpc>
               <a:buSzPct val="100000"/>
               <a:buChar char="•"/>
             </a:pPr>
             <a:r>
-              <a:rPr lang="en-US" sz="1650" dirty="0">
+              <a:rPr lang="en-US" sz="1800" dirty="0">
                 <a:solidFill>
                   <a:srgbClr val="E2E8F0"/>
                 </a:solidFill>
@@ -3837,18 +3837,18 @@
               </a:rPr>
               <a:t>Agents are stateless - containerised runs keep them grounded</a:t>
             </a:r>
-            <a:endParaRPr lang="en-US" sz="1650" dirty="0"/>
-          </a:p>
-          <a:p>
-            <a:pPr algn="l" marL="133350" indent="-133350">
-              <a:lnSpc>
-                <a:spcPts val="2228"/>
+            <a:endParaRPr lang="en-US" sz="1800" dirty="0"/>
+          </a:p>
+          <a:p>
+            <a:pPr algn="l" marL="152400" indent="-152400">
+              <a:lnSpc>
+                <a:spcPts val="2520"/>
               </a:lnSpc>
               <a:buSzPct val="100000"/>
               <a:buChar char="•"/>
             </a:pPr>
             <a:r>
-              <a:rPr lang="en-US" sz="1650" dirty="0">
+              <a:rPr lang="en-US" sz="1800" dirty="0">
                 <a:solidFill>
                   <a:srgbClr val="E2E8F0"/>
                 </a:solidFill>
@@ -3858,7 +3858,7 @@
               </a:rPr>
               <a:t>If a colleague can run the repo from docs, an agent can too</a:t>
             </a:r>
-            <a:endParaRPr lang="en-US" sz="1650" dirty="0"/>
+            <a:endParaRPr lang="en-US" sz="1800" dirty="0"/>
           </a:p>
         </p:txBody>
       </p:sp>
@@ -3903,7 +3903,7 @@
         <p:spPr>
           <a:xfrm>
             <a:off x="647700" y="457200"/>
-            <a:ext cx="8005572" cy="239911"/>
+            <a:ext cx="8005572" cy="248543"/>
           </a:xfrm>
           <a:prstGeom prst="rect">
             <a:avLst/>
@@ -3917,7 +3917,7 @@
           <a:p>
             <a:pPr algn="l" indent="0" marL="0">
               <a:lnSpc>
-                <a:spcPts val="1890"/>
+                <a:spcPts val="1958"/>
               </a:lnSpc>
               <a:buNone/>
             </a:pPr>
@@ -3944,7 +3944,7 @@
         </p:nvSpPr>
         <p:spPr>
           <a:xfrm>
-            <a:off x="647700" y="773311"/>
+            <a:off x="647700" y="781943"/>
             <a:ext cx="8005572" cy="400050"/>
           </a:xfrm>
           <a:prstGeom prst="rect">
@@ -3983,8 +3983,8 @@
         </p:nvSpPr>
         <p:spPr>
           <a:xfrm>
-            <a:off x="647700" y="1344811"/>
-            <a:ext cx="7848600" cy="1076920"/>
+            <a:off x="647700" y="1315343"/>
+            <a:ext cx="7848600" cy="1226641"/>
           </a:xfrm>
           <a:prstGeom prst="rect">
             <a:avLst/>
@@ -3993,18 +3993,18 @@
           <a:ln/>
         </p:spPr>
         <p:txBody>
-          <a:bodyPr wrap="square" lIns="133350" tIns="0" rIns="0" bIns="0" rtlCol="0" anchor="t"/>
-          <a:lstStyle/>
-          <a:p>
-            <a:pPr algn="l" marL="133350" indent="-133350">
-              <a:lnSpc>
-                <a:spcPts val="2228"/>
+          <a:bodyPr wrap="square" lIns="152400" tIns="0" rIns="0" bIns="0" rtlCol="0" anchor="t"/>
+          <a:lstStyle/>
+          <a:p>
+            <a:pPr algn="l" marL="152400" indent="-152400">
+              <a:lnSpc>
+                <a:spcPts val="2520"/>
               </a:lnSpc>
               <a:buSzPct val="100000"/>
               <a:buChar char="•"/>
             </a:pPr>
             <a:r>
-              <a:rPr lang="en-US" sz="1650" dirty="0">
+              <a:rPr lang="en-US" sz="1800" dirty="0">
                 <a:solidFill>
                   <a:srgbClr val="E2E8F0"/>
                 </a:solidFill>
@@ -4014,18 +4014,18 @@
               </a:rPr>
               <a:t>Version history protects work and surfaces diffs automatically</a:t>
             </a:r>
-            <a:endParaRPr lang="en-US" sz="1650" dirty="0"/>
-          </a:p>
-          <a:p>
-            <a:pPr algn="l" marL="133350" indent="-133350">
-              <a:lnSpc>
-                <a:spcPts val="2228"/>
+            <a:endParaRPr lang="en-US" sz="1800" dirty="0"/>
+          </a:p>
+          <a:p>
+            <a:pPr algn="l" marL="152400" indent="-152400">
+              <a:lnSpc>
+                <a:spcPts val="2520"/>
               </a:lnSpc>
               <a:buSzPct val="100000"/>
               <a:buChar char="•"/>
             </a:pPr>
             <a:r>
-              <a:rPr lang="en-US" sz="1650" dirty="0">
+              <a:rPr lang="en-US" sz="1800" dirty="0">
                 <a:solidFill>
                   <a:srgbClr val="E2E8F0"/>
                 </a:solidFill>
@@ -4035,18 +4035,18 @@
               </a:rPr>
               <a:t>Agents operate via CLI; humans can review in IDE or web</a:t>
             </a:r>
-            <a:endParaRPr lang="en-US" sz="1650" dirty="0"/>
-          </a:p>
-          <a:p>
-            <a:pPr algn="l" marL="133350" indent="-133350">
-              <a:lnSpc>
-                <a:spcPts val="2228"/>
+            <a:endParaRPr lang="en-US" sz="1800" dirty="0"/>
+          </a:p>
+          <a:p>
+            <a:pPr algn="l" marL="152400" indent="-152400">
+              <a:lnSpc>
+                <a:spcPts val="2520"/>
               </a:lnSpc>
               <a:buSzPct val="100000"/>
               <a:buChar char="•"/>
             </a:pPr>
             <a:r>
-              <a:rPr lang="en-US" sz="1650" dirty="0">
+              <a:rPr lang="en-US" sz="1800" dirty="0">
                 <a:solidFill>
                   <a:srgbClr val="E2E8F0"/>
                 </a:solidFill>
@@ -4056,7 +4056,7 @@
               </a:rPr>
               <a:t>Pull requests keep you in the approval loop</a:t>
             </a:r>
-            <a:endParaRPr lang="en-US" sz="1650" dirty="0"/>
+            <a:endParaRPr lang="en-US" sz="1800" dirty="0"/>
           </a:p>
         </p:txBody>
       </p:sp>
@@ -4101,7 +4101,7 @@
         <p:spPr>
           <a:xfrm>
             <a:off x="647700" y="457200"/>
-            <a:ext cx="8005572" cy="239911"/>
+            <a:ext cx="8005572" cy="248543"/>
           </a:xfrm>
           <a:prstGeom prst="rect">
             <a:avLst/>
@@ -4115,7 +4115,7 @@
           <a:p>
             <a:pPr algn="l" indent="0" marL="0">
               <a:lnSpc>
-                <a:spcPts val="1890"/>
+                <a:spcPts val="1958"/>
               </a:lnSpc>
               <a:buNone/>
             </a:pPr>
@@ -4142,7 +4142,7 @@
         </p:nvSpPr>
         <p:spPr>
           <a:xfrm>
-            <a:off x="647700" y="773311"/>
+            <a:off x="647700" y="781943"/>
             <a:ext cx="8005572" cy="400050"/>
           </a:xfrm>
           <a:prstGeom prst="rect">
@@ -4181,8 +4181,8 @@
         </p:nvSpPr>
         <p:spPr>
           <a:xfrm>
-            <a:off x="647700" y="1344811"/>
-            <a:ext cx="7848600" cy="1473994"/>
+            <a:off x="647700" y="1315343"/>
+            <a:ext cx="7848600" cy="1679972"/>
           </a:xfrm>
           <a:prstGeom prst="rect">
             <a:avLst/>
@@ -4191,18 +4191,18 @@
           <a:ln/>
         </p:spPr>
         <p:txBody>
-          <a:bodyPr wrap="square" lIns="133350" tIns="0" rIns="0" bIns="0" rtlCol="0" anchor="t"/>
-          <a:lstStyle/>
-          <a:p>
-            <a:pPr algn="l" marL="133350" indent="-133350">
-              <a:lnSpc>
-                <a:spcPts val="2228"/>
+          <a:bodyPr wrap="square" lIns="152400" tIns="0" rIns="0" bIns="0" rtlCol="0" anchor="t"/>
+          <a:lstStyle/>
+          <a:p>
+            <a:pPr algn="l" marL="152400" indent="-152400">
+              <a:lnSpc>
+                <a:spcPts val="2520"/>
               </a:lnSpc>
               <a:buSzPct val="100000"/>
               <a:buChar char="•"/>
             </a:pPr>
             <a:r>
-              <a:rPr lang="en-US" sz="1650" b="1" dirty="0">
+              <a:rPr lang="en-US" sz="1800" b="1" dirty="0">
                 <a:solidFill>
                   <a:srgbClr val="38BDF8"/>
                 </a:solidFill>
@@ -4214,12 +4214,12 @@
             </a:r>
             <a:pPr algn="l" indent="0" marL="0">
               <a:lnSpc>
-                <a:spcPts val="2228"/>
+                <a:spcPts val="2520"/>
               </a:lnSpc>
               <a:buNone/>
             </a:pPr>
             <a:r>
-              <a:rPr lang="en-US" sz="1650" dirty="0">
+              <a:rPr lang="en-US" sz="1800" dirty="0">
                 <a:solidFill>
                   <a:srgbClr val="E2E8F0"/>
                 </a:solidFill>
@@ -4229,18 +4229,18 @@
               </a:rPr>
               <a:t> is the handbook for humans and agents</a:t>
             </a:r>
-            <a:endParaRPr lang="en-US" sz="1650" dirty="0"/>
-          </a:p>
-          <a:p>
-            <a:pPr algn="l" marL="133350" indent="-133350">
-              <a:lnSpc>
-                <a:spcPts val="2228"/>
+            <a:endParaRPr lang="en-US" sz="1800" dirty="0"/>
+          </a:p>
+          <a:p>
+            <a:pPr algn="l" marL="152400" indent="-152400">
+              <a:lnSpc>
+                <a:spcPts val="2520"/>
               </a:lnSpc>
               <a:buSzPct val="100000"/>
               <a:buChar char="•"/>
             </a:pPr>
             <a:r>
-              <a:rPr lang="en-US" sz="1650" b="1" dirty="0">
+              <a:rPr lang="en-US" sz="1800" b="1" dirty="0">
                 <a:solidFill>
                   <a:srgbClr val="38BDF8"/>
                 </a:solidFill>
@@ -4252,12 +4252,12 @@
             </a:r>
             <a:pPr algn="l" indent="0" marL="0">
               <a:lnSpc>
-                <a:spcPts val="2228"/>
+                <a:spcPts val="2520"/>
               </a:lnSpc>
               <a:buNone/>
             </a:pPr>
             <a:r>
-              <a:rPr lang="en-US" sz="1650" dirty="0">
+              <a:rPr lang="en-US" sz="1800" dirty="0">
                 <a:solidFill>
                   <a:srgbClr val="E2E8F0"/>
                 </a:solidFill>
@@ -4267,18 +4267,18 @@
               </a:rPr>
               <a:t> wraps R sessions with micromamba</a:t>
             </a:r>
-            <a:endParaRPr lang="en-US" sz="1650" dirty="0"/>
-          </a:p>
-          <a:p>
-            <a:pPr algn="l" marL="133350" indent="-133350">
-              <a:lnSpc>
-                <a:spcPts val="2228"/>
+            <a:endParaRPr lang="en-US" sz="1800" dirty="0"/>
+          </a:p>
+          <a:p>
+            <a:pPr algn="l" marL="152400" indent="-152400">
+              <a:lnSpc>
+                <a:spcPts val="2520"/>
               </a:lnSpc>
               <a:buSzPct val="100000"/>
               <a:buChar char="•"/>
             </a:pPr>
             <a:r>
-              <a:rPr lang="en-US" sz="1650" b="1" dirty="0">
+              <a:rPr lang="en-US" sz="1800" b="1" dirty="0">
                 <a:solidFill>
                   <a:srgbClr val="38BDF8"/>
                 </a:solidFill>
@@ -4290,12 +4290,12 @@
             </a:r>
             <a:pPr algn="l" indent="0" marL="0">
               <a:lnSpc>
-                <a:spcPts val="2228"/>
+                <a:spcPts val="2520"/>
               </a:lnSpc>
               <a:buNone/>
             </a:pPr>
             <a:r>
-              <a:rPr lang="en-US" sz="1650" dirty="0">
+              <a:rPr lang="en-US" sz="1800" dirty="0">
                 <a:solidFill>
                   <a:srgbClr val="E2E8F0"/>
                 </a:solidFill>
@@ -4305,18 +4305,18 @@
               </a:rPr>
               <a:t> pins R version and packages</a:t>
             </a:r>
-            <a:endParaRPr lang="en-US" sz="1650" dirty="0"/>
-          </a:p>
-          <a:p>
-            <a:pPr algn="l" marL="133350" indent="-133350">
-              <a:lnSpc>
-                <a:spcPts val="2228"/>
+            <a:endParaRPr lang="en-US" sz="1800" dirty="0"/>
+          </a:p>
+          <a:p>
+            <a:pPr algn="l" marL="152400" indent="-152400">
+              <a:lnSpc>
+                <a:spcPts val="2520"/>
               </a:lnSpc>
               <a:buSzPct val="100000"/>
               <a:buChar char="•"/>
             </a:pPr>
             <a:r>
-              <a:rPr lang="en-US" sz="1650" b="1" dirty="0">
+              <a:rPr lang="en-US" sz="1800" b="1" dirty="0">
                 <a:solidFill>
                   <a:srgbClr val="38BDF8"/>
                 </a:solidFill>
@@ -4328,12 +4328,12 @@
             </a:r>
             <a:pPr algn="l" indent="0" marL="0">
               <a:lnSpc>
-                <a:spcPts val="2228"/>
+                <a:spcPts val="2520"/>
               </a:lnSpc>
               <a:buNone/>
             </a:pPr>
             <a:r>
-              <a:rPr lang="en-US" sz="1650" dirty="0">
+              <a:rPr lang="en-US" sz="1800" dirty="0">
                 <a:solidFill>
                   <a:srgbClr val="E2E8F0"/>
                 </a:solidFill>
@@ -4343,7 +4343,7 @@
               </a:rPr>
               <a:t> sequences scripts for deterministic builds</a:t>
             </a:r>
-            <a:endParaRPr lang="en-US" sz="1650" dirty="0"/>
+            <a:endParaRPr lang="en-US" sz="1800" dirty="0"/>
           </a:p>
         </p:txBody>
       </p:sp>
@@ -4388,7 +4388,7 @@
         <p:spPr>
           <a:xfrm>
             <a:off x="647700" y="457200"/>
-            <a:ext cx="8005572" cy="239911"/>
+            <a:ext cx="8005572" cy="248543"/>
           </a:xfrm>
           <a:prstGeom prst="rect">
             <a:avLst/>
@@ -4402,7 +4402,7 @@
           <a:p>
             <a:pPr algn="l" indent="0" marL="0">
               <a:lnSpc>
-                <a:spcPts val="1890"/>
+                <a:spcPts val="1958"/>
               </a:lnSpc>
               <a:buNone/>
             </a:pPr>
@@ -4429,7 +4429,7 @@
         </p:nvSpPr>
         <p:spPr>
           <a:xfrm>
-            <a:off x="647700" y="773311"/>
+            <a:off x="647700" y="781943"/>
             <a:ext cx="8005572" cy="400050"/>
           </a:xfrm>
           <a:prstGeom prst="rect">
@@ -4468,8 +4468,8 @@
         </p:nvSpPr>
         <p:spPr>
           <a:xfrm>
-            <a:off x="647700" y="1344811"/>
-            <a:ext cx="7848600" cy="1473994"/>
+            <a:off x="647700" y="1315343"/>
+            <a:ext cx="7848600" cy="1679972"/>
           </a:xfrm>
           <a:prstGeom prst="rect">
             <a:avLst/>
@@ -4478,18 +4478,18 @@
           <a:ln/>
         </p:spPr>
         <p:txBody>
-          <a:bodyPr wrap="square" lIns="133350" tIns="0" rIns="0" bIns="0" rtlCol="0" anchor="t"/>
-          <a:lstStyle/>
-          <a:p>
-            <a:pPr algn="l" marL="133350" indent="-133350">
-              <a:lnSpc>
-                <a:spcPts val="2228"/>
+          <a:bodyPr wrap="square" lIns="152400" tIns="0" rIns="0" bIns="0" rtlCol="0" anchor="t"/>
+          <a:lstStyle/>
+          <a:p>
+            <a:pPr algn="l" marL="152400" indent="-152400">
+              <a:lnSpc>
+                <a:spcPts val="2520"/>
               </a:lnSpc>
               <a:buSzPct val="100000"/>
               <a:buChar char="•"/>
             </a:pPr>
             <a:r>
-              <a:rPr lang="en-US" sz="1650" dirty="0">
+              <a:rPr lang="en-US" sz="1800" dirty="0">
                 <a:solidFill>
                   <a:srgbClr val="E2E8F0"/>
                 </a:solidFill>
@@ -4501,12 +4501,12 @@
             </a:r>
             <a:pPr algn="l" indent="0" marL="0">
               <a:lnSpc>
-                <a:spcPts val="2228"/>
+                <a:spcPts val="2520"/>
               </a:lnSpc>
               <a:buNone/>
             </a:pPr>
             <a:r>
-              <a:rPr lang="en-US" sz="1650" b="1" dirty="0">
+              <a:rPr lang="en-US" sz="1800" b="1" dirty="0">
                 <a:solidFill>
                   <a:srgbClr val="38BDF8"/>
                 </a:solidFill>
@@ -4518,12 +4518,12 @@
             </a:r>
             <a:pPr algn="l" indent="0" marL="0">
               <a:lnSpc>
-                <a:spcPts val="2228"/>
+                <a:spcPts val="2520"/>
               </a:lnSpc>
               <a:buNone/>
             </a:pPr>
             <a:r>
-              <a:rPr lang="en-US" sz="1650" dirty="0">
+              <a:rPr lang="en-US" sz="1800" dirty="0">
                 <a:solidFill>
                   <a:srgbClr val="E2E8F0"/>
                 </a:solidFill>
@@ -4535,12 +4535,12 @@
             </a:r>
             <a:pPr algn="l" indent="0" marL="0">
               <a:lnSpc>
-                <a:spcPts val="2228"/>
+                <a:spcPts val="2520"/>
               </a:lnSpc>
               <a:buNone/>
             </a:pPr>
             <a:r>
-              <a:rPr lang="en-US" sz="1650" b="1" dirty="0">
+              <a:rPr lang="en-US" sz="1800" b="1" dirty="0">
                 <a:solidFill>
                   <a:srgbClr val="38BDF8"/>
                 </a:solidFill>
@@ -4550,18 +4550,18 @@
               </a:rPr>
               <a:t>02_model.R</a:t>
             </a:r>
-            <a:endParaRPr lang="en-US" sz="1650" dirty="0"/>
-          </a:p>
-          <a:p>
-            <a:pPr algn="l" marL="133350" indent="-133350">
-              <a:lnSpc>
-                <a:spcPts val="2228"/>
+            <a:endParaRPr lang="en-US" sz="1800" dirty="0"/>
+          </a:p>
+          <a:p>
+            <a:pPr algn="l" marL="152400" indent="-152400">
+              <a:lnSpc>
+                <a:spcPts val="2520"/>
               </a:lnSpc>
               <a:buSzPct val="100000"/>
               <a:buChar char="•"/>
             </a:pPr>
             <a:r>
-              <a:rPr lang="en-US" sz="1650" dirty="0">
+              <a:rPr lang="en-US" sz="1800" dirty="0">
                 <a:solidFill>
                   <a:srgbClr val="E2E8F0"/>
                 </a:solidFill>
@@ -4573,12 +4573,12 @@
             </a:r>
             <a:pPr algn="l" indent="0" marL="0">
               <a:lnSpc>
-                <a:spcPts val="2228"/>
+                <a:spcPts val="2520"/>
               </a:lnSpc>
               <a:buNone/>
             </a:pPr>
             <a:r>
-              <a:rPr lang="en-US" sz="1650" b="1" dirty="0">
+              <a:rPr lang="en-US" sz="1800" b="1" dirty="0">
                 <a:solidFill>
                   <a:srgbClr val="38BDF8"/>
                 </a:solidFill>
@@ -4588,18 +4588,18 @@
               </a:rPr>
               <a:t>raw -&gt; processed -&gt; results/metrics.yml</a:t>
             </a:r>
-            <a:endParaRPr lang="en-US" sz="1650" dirty="0"/>
-          </a:p>
-          <a:p>
-            <a:pPr algn="l" marL="133350" indent="-133350">
-              <a:lnSpc>
-                <a:spcPts val="2228"/>
+            <a:endParaRPr lang="en-US" sz="1800" dirty="0"/>
+          </a:p>
+          <a:p>
+            <a:pPr algn="l" marL="152400" indent="-152400">
+              <a:lnSpc>
+                <a:spcPts val="2520"/>
               </a:lnSpc>
               <a:buSzPct val="100000"/>
               <a:buChar char="•"/>
             </a:pPr>
             <a:r>
-              <a:rPr lang="en-US" sz="1650" dirty="0">
+              <a:rPr lang="en-US" sz="1800" dirty="0">
                 <a:solidFill>
                   <a:srgbClr val="E2E8F0"/>
                 </a:solidFill>
@@ -4609,18 +4609,18 @@
               </a:rPr>
               <a:t>Quarto report reads results for publication-ready prose</a:t>
             </a:r>
-            <a:endParaRPr lang="en-US" sz="1650" dirty="0"/>
-          </a:p>
-          <a:p>
-            <a:pPr algn="l" marL="133350" indent="-133350">
-              <a:lnSpc>
-                <a:spcPts val="2228"/>
+            <a:endParaRPr lang="en-US" sz="1800" dirty="0"/>
+          </a:p>
+          <a:p>
+            <a:pPr algn="l" marL="152400" indent="-152400">
+              <a:lnSpc>
+                <a:spcPts val="2520"/>
               </a:lnSpc>
               <a:buSzPct val="100000"/>
               <a:buChar char="•"/>
             </a:pPr>
             <a:r>
-              <a:rPr lang="en-US" sz="1650" dirty="0">
+              <a:rPr lang="en-US" sz="1800" dirty="0">
                 <a:solidFill>
                   <a:srgbClr val="E2E8F0"/>
                 </a:solidFill>
@@ -4630,7 +4630,7 @@
               </a:rPr>
               <a:t>Agents run everything via the environment wrapper</a:t>
             </a:r>
-            <a:endParaRPr lang="en-US" sz="1650" dirty="0"/>
+            <a:endParaRPr lang="en-US" sz="1800" dirty="0"/>
           </a:p>
         </p:txBody>
       </p:sp>
@@ -4675,7 +4675,7 @@
         <p:spPr>
           <a:xfrm>
             <a:off x="647700" y="457200"/>
-            <a:ext cx="8005572" cy="239911"/>
+            <a:ext cx="8005572" cy="248543"/>
           </a:xfrm>
           <a:prstGeom prst="rect">
             <a:avLst/>
@@ -4689,7 +4689,7 @@
           <a:p>
             <a:pPr algn="l" indent="0" marL="0">
               <a:lnSpc>
-                <a:spcPts val="1890"/>
+                <a:spcPts val="1958"/>
               </a:lnSpc>
               <a:buNone/>
             </a:pPr>
@@ -4716,7 +4716,7 @@
         </p:nvSpPr>
         <p:spPr>
           <a:xfrm>
-            <a:off x="647700" y="773311"/>
+            <a:off x="647700" y="781943"/>
             <a:ext cx="8005572" cy="400050"/>
           </a:xfrm>
           <a:prstGeom prst="rect">
@@ -4755,8 +4755,8 @@
         </p:nvSpPr>
         <p:spPr>
           <a:xfrm>
-            <a:off x="647700" y="1344811"/>
-            <a:ext cx="7848600" cy="962620"/>
+            <a:off x="647700" y="1315343"/>
+            <a:ext cx="7848600" cy="1413272"/>
           </a:xfrm>
           <a:prstGeom prst="rect">
             <a:avLst/>
@@ -4765,18 +4765,18 @@
           <a:ln/>
         </p:spPr>
         <p:txBody>
-          <a:bodyPr wrap="square" lIns="133350" tIns="0" rIns="0" bIns="0" rtlCol="0" anchor="t"/>
-          <a:lstStyle/>
-          <a:p>
-            <a:pPr algn="l" marL="133350" indent="-133350">
-              <a:lnSpc>
-                <a:spcPts val="2228"/>
+          <a:bodyPr wrap="square" lIns="152400" tIns="0" rIns="0" bIns="0" rtlCol="0" anchor="t"/>
+          <a:lstStyle/>
+          <a:p>
+            <a:pPr algn="l" marL="152400" indent="-152400">
+              <a:lnSpc>
+                <a:spcPts val="2520"/>
               </a:lnSpc>
               <a:buSzPct val="100000"/>
               <a:buChar char="•"/>
             </a:pPr>
             <a:r>
-              <a:rPr lang="en-US" sz="1650" dirty="0">
+              <a:rPr lang="en-US" sz="1800" dirty="0">
                 <a:solidFill>
                   <a:srgbClr val="E2E8F0"/>
                 </a:solidFill>
@@ -4788,12 +4788,12 @@
             </a:r>
             <a:pPr algn="l" indent="0" marL="0">
               <a:lnSpc>
-                <a:spcPts val="2228"/>
+                <a:spcPts val="2520"/>
               </a:lnSpc>
               <a:buNone/>
             </a:pPr>
             <a:r>
-              <a:rPr lang="en-US" sz="1650" i="1" dirty="0">
+              <a:rPr lang="en-US" sz="1800" i="1" dirty="0">
                 <a:solidFill>
                   <a:srgbClr val="E2E8F0"/>
                 </a:solidFill>
@@ -4805,12 +4805,12 @@
             </a:r>
             <a:pPr algn="l" indent="0" marL="0">
               <a:lnSpc>
-                <a:spcPts val="2228"/>
+                <a:spcPts val="2520"/>
               </a:lnSpc>
               <a:buNone/>
             </a:pPr>
             <a:r>
-              <a:rPr lang="en-US" sz="1650" dirty="0">
+              <a:rPr lang="en-US" sz="1800" dirty="0">
                 <a:solidFill>
                   <a:srgbClr val="E2E8F0"/>
                 </a:solidFill>
@@ -4820,18 +4820,18 @@
               </a:rPr>
               <a:t>.</a:t>
             </a:r>
-            <a:endParaRPr lang="en-US" sz="1650" dirty="0"/>
-          </a:p>
-          <a:p>
-            <a:pPr algn="l" marL="133350" indent="-133350">
-              <a:lnSpc>
-                <a:spcPts val="2228"/>
+            <a:endParaRPr lang="en-US" sz="1800" dirty="0"/>
+          </a:p>
+          <a:p>
+            <a:pPr algn="l" marL="152400" indent="-152400">
+              <a:lnSpc>
+                <a:spcPts val="2520"/>
               </a:lnSpc>
               <a:buSzPct val="100000"/>
               <a:buChar char="•"/>
             </a:pPr>
             <a:r>
-              <a:rPr lang="en-US" sz="1650" dirty="0">
+              <a:rPr lang="en-US" sz="1800" dirty="0">
                 <a:solidFill>
                   <a:srgbClr val="E2E8F0"/>
                 </a:solidFill>
@@ -4843,12 +4843,12 @@
             </a:r>
             <a:pPr algn="l" indent="0" marL="0">
               <a:lnSpc>
-                <a:spcPts val="2228"/>
+                <a:spcPts val="2520"/>
               </a:lnSpc>
               <a:buNone/>
             </a:pPr>
             <a:r>
-              <a:rPr lang="en-US" sz="1650" i="1" dirty="0">
+              <a:rPr lang="en-US" sz="1800" i="1" dirty="0">
                 <a:solidFill>
                   <a:srgbClr val="E2E8F0"/>
                 </a:solidFill>
@@ -4860,12 +4860,12 @@
             </a:r>
             <a:pPr algn="l" indent="0" marL="0">
               <a:lnSpc>
-                <a:spcPts val="2228"/>
+                <a:spcPts val="2520"/>
               </a:lnSpc>
               <a:buNone/>
             </a:pPr>
             <a:r>
-              <a:rPr lang="en-US" sz="1650" dirty="0">
+              <a:rPr lang="en-US" sz="1800" dirty="0">
                 <a:solidFill>
                   <a:srgbClr val="E2E8F0"/>
                 </a:solidFill>
@@ -4875,7 +4875,7 @@
               </a:rPr>
               <a:t>.</a:t>
             </a:r>
-            <a:endParaRPr lang="en-US" sz="1650" dirty="0"/>
+            <a:endParaRPr lang="en-US" sz="1800" dirty="0"/>
           </a:p>
         </p:txBody>
       </p:sp>
@@ -4887,12 +4887,12 @@
         </p:nvSpPr>
         <p:spPr>
           <a:xfrm>
-            <a:off x="647700" y="2478881"/>
-            <a:ext cx="7848600" cy="674340"/>
+            <a:off x="647700" y="2861965"/>
+            <a:ext cx="7848600" cy="1043880"/>
           </a:xfrm>
           <a:prstGeom prst="roundRect">
             <a:avLst>
-              <a:gd name="adj" fmla="val 25425"/>
+              <a:gd name="adj" fmla="val 16424"/>
             </a:avLst>
           </a:prstGeom>
           <a:solidFill>
@@ -4926,8 +4926,8 @@
         </p:nvSpPr>
         <p:spPr>
           <a:xfrm>
-            <a:off x="876300" y="2669381"/>
-            <a:ext cx="7539228" cy="293340"/>
+            <a:off x="876300" y="3052465"/>
+            <a:ext cx="7539228" cy="662880"/>
           </a:xfrm>
           <a:prstGeom prst="rect">
             <a:avLst/>
@@ -4941,12 +4941,12 @@
           <a:p>
             <a:pPr algn="l" indent="0" marL="0">
               <a:lnSpc>
-                <a:spcPts val="2310"/>
+                <a:spcPts val="2610"/>
               </a:lnSpc>
               <a:buNone/>
             </a:pPr>
             <a:r>
-              <a:rPr lang="en-US" sz="1650" dirty="0">
+              <a:rPr lang="en-US" sz="1800" dirty="0">
                 <a:solidFill>
                   <a:srgbClr val="E2E8F0"/>
                 </a:solidFill>
@@ -4958,12 +4958,12 @@
             </a:r>
             <a:pPr algn="l" indent="0" marL="0">
               <a:lnSpc>
-                <a:spcPts val="2310"/>
+                <a:spcPts val="2610"/>
               </a:lnSpc>
               <a:buNone/>
             </a:pPr>
             <a:r>
-              <a:rPr lang="en-US" sz="1650" b="1" dirty="0">
+              <a:rPr lang="en-US" sz="1800" b="1" dirty="0">
                 <a:solidFill>
                   <a:srgbClr val="38BDF8"/>
                 </a:solidFill>
@@ -4975,12 +4975,12 @@
             </a:r>
             <a:pPr algn="l" indent="0" marL="0">
               <a:lnSpc>
-                <a:spcPts val="2310"/>
+                <a:spcPts val="2610"/>
               </a:lnSpc>
               <a:buNone/>
             </a:pPr>
             <a:r>
-              <a:rPr lang="en-US" sz="1650" dirty="0">
+              <a:rPr lang="en-US" sz="1800" dirty="0">
                 <a:solidFill>
                   <a:srgbClr val="E2E8F0"/>
                 </a:solidFill>
@@ -4990,7 +4990,7 @@
               </a:rPr>
               <a:t>.</a:t>
             </a:r>
-            <a:endParaRPr lang="en-US" sz="1650" dirty="0"/>
+            <a:endParaRPr lang="en-US" sz="1800" dirty="0"/>
           </a:p>
         </p:txBody>
       </p:sp>
@@ -5035,7 +5035,7 @@
         <p:spPr>
           <a:xfrm>
             <a:off x="647700" y="457200"/>
-            <a:ext cx="8005572" cy="239911"/>
+            <a:ext cx="8005572" cy="248543"/>
           </a:xfrm>
           <a:prstGeom prst="rect">
             <a:avLst/>
@@ -5049,7 +5049,7 @@
           <a:p>
             <a:pPr algn="l" indent="0" marL="0">
               <a:lnSpc>
-                <a:spcPts val="1890"/>
+                <a:spcPts val="1958"/>
               </a:lnSpc>
               <a:buNone/>
             </a:pPr>
@@ -5076,7 +5076,7 @@
         </p:nvSpPr>
         <p:spPr>
           <a:xfrm>
-            <a:off x="647700" y="773311"/>
+            <a:off x="647700" y="781943"/>
             <a:ext cx="8005572" cy="400050"/>
           </a:xfrm>
           <a:prstGeom prst="rect">
@@ -5115,8 +5115,8 @@
         </p:nvSpPr>
         <p:spPr>
           <a:xfrm>
-            <a:off x="647700" y="1344811"/>
-            <a:ext cx="7848600" cy="1473994"/>
+            <a:off x="647700" y="1315343"/>
+            <a:ext cx="7848600" cy="1679972"/>
           </a:xfrm>
           <a:prstGeom prst="rect">
             <a:avLst/>
@@ -5125,18 +5125,18 @@
           <a:ln/>
         </p:spPr>
         <p:txBody>
-          <a:bodyPr wrap="square" lIns="133350" tIns="0" rIns="0" bIns="0" rtlCol="0" anchor="t"/>
-          <a:lstStyle/>
-          <a:p>
-            <a:pPr algn="l" marL="133350" indent="-133350">
-              <a:lnSpc>
-                <a:spcPts val="2228"/>
+          <a:bodyPr wrap="square" lIns="152400" tIns="0" rIns="0" bIns="0" rtlCol="0" anchor="t"/>
+          <a:lstStyle/>
+          <a:p>
+            <a:pPr algn="l" marL="152400" indent="-152400">
+              <a:lnSpc>
+                <a:spcPts val="2520"/>
               </a:lnSpc>
               <a:buSzPct val="100000"/>
               <a:buChar char="•"/>
             </a:pPr>
             <a:r>
-              <a:rPr lang="en-US" sz="1650" dirty="0">
+              <a:rPr lang="en-US" sz="1800" dirty="0">
                 <a:solidFill>
                   <a:srgbClr val="E2E8F0"/>
                 </a:solidFill>
@@ -5146,18 +5146,18 @@
               </a:rPr>
               <a:t>Prompt: add a predictor and rerun the report</a:t>
             </a:r>
-            <a:endParaRPr lang="en-US" sz="1650" dirty="0"/>
-          </a:p>
-          <a:p>
-            <a:pPr algn="l" marL="133350" indent="-133350">
-              <a:lnSpc>
-                <a:spcPts val="2228"/>
+            <a:endParaRPr lang="en-US" sz="1800" dirty="0"/>
+          </a:p>
+          <a:p>
+            <a:pPr algn="l" marL="152400" indent="-152400">
+              <a:lnSpc>
+                <a:spcPts val="2520"/>
               </a:lnSpc>
               <a:buSzPct val="100000"/>
               <a:buChar char="•"/>
             </a:pPr>
             <a:r>
-              <a:rPr lang="en-US" sz="1650" dirty="0">
+              <a:rPr lang="en-US" sz="1800" dirty="0">
                 <a:solidFill>
                   <a:srgbClr val="E2E8F0"/>
                 </a:solidFill>
@@ -5167,18 +5167,18 @@
               </a:rPr>
               <a:t>Agent invokes wrapper scripts and Makefile targets</a:t>
             </a:r>
-            <a:endParaRPr lang="en-US" sz="1650" dirty="0"/>
-          </a:p>
-          <a:p>
-            <a:pPr algn="l" marL="133350" indent="-133350">
-              <a:lnSpc>
-                <a:spcPts val="2228"/>
+            <a:endParaRPr lang="en-US" sz="1800" dirty="0"/>
+          </a:p>
+          <a:p>
+            <a:pPr algn="l" marL="152400" indent="-152400">
+              <a:lnSpc>
+                <a:spcPts val="2520"/>
               </a:lnSpc>
               <a:buSzPct val="100000"/>
               <a:buChar char="•"/>
             </a:pPr>
             <a:r>
-              <a:rPr lang="en-US" sz="1650" dirty="0">
+              <a:rPr lang="en-US" sz="1800" dirty="0">
                 <a:solidFill>
                   <a:srgbClr val="E2E8F0"/>
                 </a:solidFill>
@@ -5188,18 +5188,18 @@
               </a:rPr>
               <a:t>Pipeline regenerates outputs and report in minutes</a:t>
             </a:r>
-            <a:endParaRPr lang="en-US" sz="1650" dirty="0"/>
-          </a:p>
-          <a:p>
-            <a:pPr algn="l" marL="133350" indent="-133350">
-              <a:lnSpc>
-                <a:spcPts val="2228"/>
+            <a:endParaRPr lang="en-US" sz="1800" dirty="0"/>
+          </a:p>
+          <a:p>
+            <a:pPr algn="l" marL="152400" indent="-152400">
+              <a:lnSpc>
+                <a:spcPts val="2520"/>
               </a:lnSpc>
               <a:buSzPct val="100000"/>
               <a:buChar char="•"/>
             </a:pPr>
             <a:r>
-              <a:rPr lang="en-US" sz="1650" dirty="0">
+              <a:rPr lang="en-US" sz="1800" dirty="0">
                 <a:solidFill>
                   <a:srgbClr val="E2E8F0"/>
                 </a:solidFill>
@@ -5209,7 +5209,7 @@
               </a:rPr>
               <a:t>Diff showcases exactly what changed</a:t>
             </a:r>
-            <a:endParaRPr lang="en-US" sz="1650" dirty="0"/>
+            <a:endParaRPr lang="en-US" sz="1800" dirty="0"/>
           </a:p>
         </p:txBody>
       </p:sp>
@@ -5254,7 +5254,7 @@
         <p:spPr>
           <a:xfrm>
             <a:off x="647700" y="457200"/>
-            <a:ext cx="8005572" cy="239911"/>
+            <a:ext cx="8005572" cy="248543"/>
           </a:xfrm>
           <a:prstGeom prst="rect">
             <a:avLst/>
@@ -5268,7 +5268,7 @@
           <a:p>
             <a:pPr algn="l" indent="0" marL="0">
               <a:lnSpc>
-                <a:spcPts val="1890"/>
+                <a:spcPts val="1958"/>
               </a:lnSpc>
               <a:buNone/>
             </a:pPr>
@@ -5295,7 +5295,7 @@
         </p:nvSpPr>
         <p:spPr>
           <a:xfrm>
-            <a:off x="647700" y="773311"/>
+            <a:off x="647700" y="781943"/>
             <a:ext cx="8005572" cy="400050"/>
           </a:xfrm>
           <a:prstGeom prst="rect">
@@ -5334,8 +5334,8 @@
         </p:nvSpPr>
         <p:spPr>
           <a:xfrm>
-            <a:off x="647700" y="1344811"/>
-            <a:ext cx="7848600" cy="1076920"/>
+            <a:off x="647700" y="1315343"/>
+            <a:ext cx="7848600" cy="1226641"/>
           </a:xfrm>
           <a:prstGeom prst="rect">
             <a:avLst/>
@@ -5344,18 +5344,18 @@
           <a:ln/>
         </p:spPr>
         <p:txBody>
-          <a:bodyPr wrap="square" lIns="133350" tIns="0" rIns="0" bIns="0" rtlCol="0" anchor="t"/>
-          <a:lstStyle/>
-          <a:p>
-            <a:pPr algn="l" marL="133350" indent="-133350">
-              <a:lnSpc>
-                <a:spcPts val="2228"/>
+          <a:bodyPr wrap="square" lIns="152400" tIns="0" rIns="0" bIns="0" rtlCol="0" anchor="t"/>
+          <a:lstStyle/>
+          <a:p>
+            <a:pPr algn="l" marL="152400" indent="-152400">
+              <a:lnSpc>
+                <a:spcPts val="2520"/>
               </a:lnSpc>
               <a:buSzPct val="100000"/>
               <a:buChar char="•"/>
             </a:pPr>
             <a:r>
-              <a:rPr lang="en-US" sz="1650" dirty="0">
+              <a:rPr lang="en-US" sz="1800" dirty="0">
                 <a:solidFill>
                   <a:srgbClr val="E2E8F0"/>
                 </a:solidFill>
@@ -5365,18 +5365,18 @@
               </a:rPr>
               <a:t>A second agent reads the diff and writes a review</a:t>
             </a:r>
-            <a:endParaRPr lang="en-US" sz="1650" dirty="0"/>
-          </a:p>
-          <a:p>
-            <a:pPr algn="l" marL="133350" indent="-133350">
-              <a:lnSpc>
-                <a:spcPts val="2228"/>
+            <a:endParaRPr lang="en-US" sz="1800" dirty="0"/>
+          </a:p>
+          <a:p>
+            <a:pPr algn="l" marL="152400" indent="-152400">
+              <a:lnSpc>
+                <a:spcPts val="2520"/>
               </a:lnSpc>
               <a:buSzPct val="100000"/>
               <a:buChar char="•"/>
             </a:pPr>
             <a:r>
-              <a:rPr lang="en-US" sz="1650" dirty="0">
+              <a:rPr lang="en-US" sz="1800" dirty="0">
                 <a:solidFill>
                   <a:srgbClr val="E2E8F0"/>
                 </a:solidFill>
@@ -5386,18 +5386,18 @@
               </a:rPr>
               <a:t>Human reviews the agent's comments and approves or requests changes</a:t>
             </a:r>
-            <a:endParaRPr lang="en-US" sz="1650" dirty="0"/>
-          </a:p>
-          <a:p>
-            <a:pPr algn="l" marL="133350" indent="-133350">
-              <a:lnSpc>
-                <a:spcPts val="2228"/>
+            <a:endParaRPr lang="en-US" sz="1800" dirty="0"/>
+          </a:p>
+          <a:p>
+            <a:pPr algn="l" marL="152400" indent="-152400">
+              <a:lnSpc>
+                <a:spcPts val="2520"/>
               </a:lnSpc>
               <a:buSzPct val="100000"/>
               <a:buChar char="•"/>
             </a:pPr>
             <a:r>
-              <a:rPr lang="en-US" sz="1650" dirty="0">
+              <a:rPr lang="en-US" sz="1800" dirty="0">
                 <a:solidFill>
                   <a:srgbClr val="E2E8F0"/>
                 </a:solidFill>
@@ -5407,7 +5407,7 @@
               </a:rPr>
               <a:t>Iterative loop maintains velocity and oversight</a:t>
             </a:r>
-            <a:endParaRPr lang="en-US" sz="1650" dirty="0"/>
+            <a:endParaRPr lang="en-US" sz="1800" dirty="0"/>
           </a:p>
         </p:txBody>
       </p:sp>
@@ -5452,7 +5452,7 @@
         <p:spPr>
           <a:xfrm>
             <a:off x="647700" y="457200"/>
-            <a:ext cx="8005572" cy="239911"/>
+            <a:ext cx="8005572" cy="248543"/>
           </a:xfrm>
           <a:prstGeom prst="rect">
             <a:avLst/>
@@ -5466,7 +5466,7 @@
           <a:p>
             <a:pPr algn="l" indent="0" marL="0">
               <a:lnSpc>
-                <a:spcPts val="1890"/>
+                <a:spcPts val="1958"/>
               </a:lnSpc>
               <a:buNone/>
             </a:pPr>
@@ -5493,7 +5493,7 @@
         </p:nvSpPr>
         <p:spPr>
           <a:xfrm>
-            <a:off x="647700" y="773311"/>
+            <a:off x="647700" y="781943"/>
             <a:ext cx="8005572" cy="400050"/>
           </a:xfrm>
           <a:prstGeom prst="rect">
@@ -5532,8 +5532,8 @@
         </p:nvSpPr>
         <p:spPr>
           <a:xfrm>
-            <a:off x="647700" y="1344811"/>
-            <a:ext cx="7848600" cy="1473994"/>
+            <a:off x="647700" y="1315343"/>
+            <a:ext cx="7848600" cy="1679972"/>
           </a:xfrm>
           <a:prstGeom prst="rect">
             <a:avLst/>
@@ -5542,18 +5542,18 @@
           <a:ln/>
         </p:spPr>
         <p:txBody>
-          <a:bodyPr wrap="square" lIns="133350" tIns="0" rIns="0" bIns="0" rtlCol="0" anchor="t"/>
-          <a:lstStyle/>
-          <a:p>
-            <a:pPr algn="l" marL="133350" indent="-133350">
-              <a:lnSpc>
-                <a:spcPts val="2228"/>
+          <a:bodyPr wrap="square" lIns="152400" tIns="0" rIns="0" bIns="0" rtlCol="0" anchor="t"/>
+          <a:lstStyle/>
+          <a:p>
+            <a:pPr algn="l" marL="152400" indent="-152400">
+              <a:lnSpc>
+                <a:spcPts val="2520"/>
               </a:lnSpc>
               <a:buSzPct val="100000"/>
               <a:buChar char="•"/>
             </a:pPr>
             <a:r>
-              <a:rPr lang="en-US" sz="1650" dirty="0">
+              <a:rPr lang="en-US" sz="1800" dirty="0">
                 <a:solidFill>
                   <a:srgbClr val="E2E8F0"/>
                 </a:solidFill>
@@ -5563,18 +5563,18 @@
               </a:rPr>
               <a:t>Why agentic AI matters right now</a:t>
             </a:r>
-            <a:endParaRPr lang="en-US" sz="1650" dirty="0"/>
-          </a:p>
-          <a:p>
-            <a:pPr algn="l" marL="133350" indent="-133350">
-              <a:lnSpc>
-                <a:spcPts val="2228"/>
+            <a:endParaRPr lang="en-US" sz="1800" dirty="0"/>
+          </a:p>
+          <a:p>
+            <a:pPr algn="l" marL="152400" indent="-152400">
+              <a:lnSpc>
+                <a:spcPts val="2520"/>
               </a:lnSpc>
               <a:buSzPct val="100000"/>
               <a:buChar char="•"/>
             </a:pPr>
             <a:r>
-              <a:rPr lang="en-US" sz="1650" dirty="0">
+              <a:rPr lang="en-US" sz="1800" dirty="0">
                 <a:solidFill>
                   <a:srgbClr val="E2E8F0"/>
                 </a:solidFill>
@@ -5584,18 +5584,18 @@
               </a:rPr>
               <a:t>Defining agents and their toolkit</a:t>
             </a:r>
-            <a:endParaRPr lang="en-US" sz="1650" dirty="0"/>
-          </a:p>
-          <a:p>
-            <a:pPr algn="l" marL="133350" indent="-133350">
-              <a:lnSpc>
-                <a:spcPts val="2228"/>
+            <a:endParaRPr lang="en-US" sz="1800" dirty="0"/>
+          </a:p>
+          <a:p>
+            <a:pPr algn="l" marL="152400" indent="-152400">
+              <a:lnSpc>
+                <a:spcPts val="2520"/>
               </a:lnSpc>
               <a:buSzPct val="100000"/>
               <a:buChar char="•"/>
             </a:pPr>
             <a:r>
-              <a:rPr lang="en-US" sz="1650" dirty="0">
+              <a:rPr lang="en-US" sz="1800" dirty="0">
                 <a:solidFill>
                   <a:srgbClr val="E2E8F0"/>
                 </a:solidFill>
@@ -5605,18 +5605,18 @@
               </a:rPr>
               <a:t>Demo: reproducible research with agents</a:t>
             </a:r>
-            <a:endParaRPr lang="en-US" sz="1650" dirty="0"/>
-          </a:p>
-          <a:p>
-            <a:pPr algn="l" marL="133350" indent="-133350">
-              <a:lnSpc>
-                <a:spcPts val="2228"/>
+            <a:endParaRPr lang="en-US" sz="1800" dirty="0"/>
+          </a:p>
+          <a:p>
+            <a:pPr algn="l" marL="152400" indent="-152400">
+              <a:lnSpc>
+                <a:spcPts val="2520"/>
               </a:lnSpc>
               <a:buSzPct val="100000"/>
               <a:buChar char="•"/>
             </a:pPr>
             <a:r>
-              <a:rPr lang="en-US" sz="1650" dirty="0">
+              <a:rPr lang="en-US" sz="1800" dirty="0">
                 <a:solidFill>
                   <a:srgbClr val="E2E8F0"/>
                 </a:solidFill>
@@ -5626,7 +5626,7 @@
               </a:rPr>
               <a:t>Patterns and practices you can reuse</a:t>
             </a:r>
-            <a:endParaRPr lang="en-US" sz="1650" dirty="0"/>
+            <a:endParaRPr lang="en-US" sz="1800" dirty="0"/>
           </a:p>
         </p:txBody>
       </p:sp>
@@ -5671,7 +5671,7 @@
         <p:spPr>
           <a:xfrm>
             <a:off x="647700" y="457200"/>
-            <a:ext cx="8005572" cy="239911"/>
+            <a:ext cx="8005572" cy="248543"/>
           </a:xfrm>
           <a:prstGeom prst="rect">
             <a:avLst/>
@@ -5685,7 +5685,7 @@
           <a:p>
             <a:pPr algn="l" indent="0" marL="0">
               <a:lnSpc>
-                <a:spcPts val="1890"/>
+                <a:spcPts val="1958"/>
               </a:lnSpc>
               <a:buNone/>
             </a:pPr>
@@ -5712,7 +5712,7 @@
         </p:nvSpPr>
         <p:spPr>
           <a:xfrm>
-            <a:off x="647700" y="773311"/>
+            <a:off x="647700" y="781943"/>
             <a:ext cx="8005572" cy="400050"/>
           </a:xfrm>
           <a:prstGeom prst="rect">
@@ -5751,8 +5751,8 @@
         </p:nvSpPr>
         <p:spPr>
           <a:xfrm>
-            <a:off x="647700" y="1344811"/>
-            <a:ext cx="7848600" cy="1473994"/>
+            <a:off x="647700" y="1315343"/>
+            <a:ext cx="7848600" cy="1679972"/>
           </a:xfrm>
           <a:prstGeom prst="rect">
             <a:avLst/>
@@ -5761,18 +5761,18 @@
           <a:ln/>
         </p:spPr>
         <p:txBody>
-          <a:bodyPr wrap="square" lIns="133350" tIns="0" rIns="0" bIns="0" rtlCol="0" anchor="t"/>
-          <a:lstStyle/>
-          <a:p>
-            <a:pPr algn="l" marL="133350" indent="-133350">
-              <a:lnSpc>
-                <a:spcPts val="2228"/>
+          <a:bodyPr wrap="square" lIns="152400" tIns="0" rIns="0" bIns="0" rtlCol="0" anchor="t"/>
+          <a:lstStyle/>
+          <a:p>
+            <a:pPr algn="l" marL="152400" indent="-152400">
+              <a:lnSpc>
+                <a:spcPts val="2520"/>
               </a:lnSpc>
               <a:buSzPct val="100000"/>
               <a:buChar char="•"/>
             </a:pPr>
             <a:r>
-              <a:rPr lang="en-US" sz="1650" b="1" dirty="0">
+              <a:rPr lang="en-US" sz="1800" b="1" dirty="0">
                 <a:solidFill>
                   <a:srgbClr val="E2E8F0"/>
                 </a:solidFill>
@@ -5784,12 +5784,12 @@
             </a:r>
             <a:pPr algn="l" indent="0" marL="0">
               <a:lnSpc>
-                <a:spcPts val="2228"/>
+                <a:spcPts val="2520"/>
               </a:lnSpc>
               <a:buNone/>
             </a:pPr>
             <a:r>
-              <a:rPr lang="en-US" sz="1650" dirty="0">
+              <a:rPr lang="en-US" sz="1800" dirty="0">
                 <a:solidFill>
                   <a:srgbClr val="E2E8F0"/>
                 </a:solidFill>
@@ -5799,18 +5799,18 @@
               </a:rPr>
               <a:t> proposes and implements code changes</a:t>
             </a:r>
-            <a:endParaRPr lang="en-US" sz="1650" dirty="0"/>
-          </a:p>
-          <a:p>
-            <a:pPr algn="l" marL="133350" indent="-133350">
-              <a:lnSpc>
-                <a:spcPts val="2228"/>
+            <a:endParaRPr lang="en-US" sz="1800" dirty="0"/>
+          </a:p>
+          <a:p>
+            <a:pPr algn="l" marL="152400" indent="-152400">
+              <a:lnSpc>
+                <a:spcPts val="2520"/>
               </a:lnSpc>
               <a:buSzPct val="100000"/>
               <a:buChar char="•"/>
             </a:pPr>
             <a:r>
-              <a:rPr lang="en-US" sz="1650" b="1" dirty="0">
+              <a:rPr lang="en-US" sz="1800" b="1" dirty="0">
                 <a:solidFill>
                   <a:srgbClr val="E2E8F0"/>
                 </a:solidFill>
@@ -5822,12 +5822,12 @@
             </a:r>
             <a:pPr algn="l" indent="0" marL="0">
               <a:lnSpc>
-                <a:spcPts val="2228"/>
+                <a:spcPts val="2520"/>
               </a:lnSpc>
               <a:buNone/>
             </a:pPr>
             <a:r>
-              <a:rPr lang="en-US" sz="1650" dirty="0">
+              <a:rPr lang="en-US" sz="1800" dirty="0">
                 <a:solidFill>
                   <a:srgbClr val="E2E8F0"/>
                 </a:solidFill>
@@ -5837,18 +5837,18 @@
               </a:rPr>
               <a:t> audits diffs, reruns tests, validates outputs</a:t>
             </a:r>
-            <a:endParaRPr lang="en-US" sz="1650" dirty="0"/>
-          </a:p>
-          <a:p>
-            <a:pPr algn="l" marL="133350" indent="-133350">
-              <a:lnSpc>
-                <a:spcPts val="2228"/>
+            <a:endParaRPr lang="en-US" sz="1800" dirty="0"/>
+          </a:p>
+          <a:p>
+            <a:pPr algn="l" marL="152400" indent="-152400">
+              <a:lnSpc>
+                <a:spcPts val="2520"/>
               </a:lnSpc>
               <a:buSzPct val="100000"/>
               <a:buChar char="•"/>
             </a:pPr>
             <a:r>
-              <a:rPr lang="en-US" sz="1650" b="1" dirty="0">
+              <a:rPr lang="en-US" sz="1800" b="1" dirty="0">
                 <a:solidFill>
                   <a:srgbClr val="E2E8F0"/>
                 </a:solidFill>
@@ -5860,12 +5860,12 @@
             </a:r>
             <a:pPr algn="l" indent="0" marL="0">
               <a:lnSpc>
-                <a:spcPts val="2228"/>
+                <a:spcPts val="2520"/>
               </a:lnSpc>
               <a:buNone/>
             </a:pPr>
             <a:r>
-              <a:rPr lang="en-US" sz="1650" dirty="0">
+              <a:rPr lang="en-US" sz="1800" dirty="0">
                 <a:solidFill>
                   <a:srgbClr val="E2E8F0"/>
                 </a:solidFill>
@@ -5875,18 +5875,18 @@
               </a:rPr>
               <a:t> recommends diagnostics or tests when needed</a:t>
             </a:r>
-            <a:endParaRPr lang="en-US" sz="1650" dirty="0"/>
-          </a:p>
-          <a:p>
-            <a:pPr algn="l" marL="133350" indent="-133350">
-              <a:lnSpc>
-                <a:spcPts val="2228"/>
+            <a:endParaRPr lang="en-US" sz="1800" dirty="0"/>
+          </a:p>
+          <a:p>
+            <a:pPr algn="l" marL="152400" indent="-152400">
+              <a:lnSpc>
+                <a:spcPts val="2520"/>
               </a:lnSpc>
               <a:buSzPct val="100000"/>
               <a:buChar char="•"/>
             </a:pPr>
             <a:r>
-              <a:rPr lang="en-US" sz="1650" b="1" dirty="0">
+              <a:rPr lang="en-US" sz="1800" b="1" dirty="0">
                 <a:solidFill>
                   <a:srgbClr val="E2E8F0"/>
                 </a:solidFill>
@@ -5898,12 +5898,12 @@
             </a:r>
             <a:pPr algn="l" indent="0" marL="0">
               <a:lnSpc>
-                <a:spcPts val="2228"/>
+                <a:spcPts val="2520"/>
               </a:lnSpc>
               <a:buNone/>
             </a:pPr>
             <a:r>
-              <a:rPr lang="en-US" sz="1650" dirty="0">
+              <a:rPr lang="en-US" sz="1800" dirty="0">
                 <a:solidFill>
                   <a:srgbClr val="E2E8F0"/>
                 </a:solidFill>
@@ -5913,7 +5913,7 @@
               </a:rPr>
               <a:t> remains final approver and ethical backstop</a:t>
             </a:r>
-            <a:endParaRPr lang="en-US" sz="1650" dirty="0"/>
+            <a:endParaRPr lang="en-US" sz="1800" dirty="0"/>
           </a:p>
         </p:txBody>
       </p:sp>
@@ -5958,7 +5958,7 @@
         <p:spPr>
           <a:xfrm>
             <a:off x="647700" y="457200"/>
-            <a:ext cx="8005572" cy="239911"/>
+            <a:ext cx="8005572" cy="248543"/>
           </a:xfrm>
           <a:prstGeom prst="rect">
             <a:avLst/>
@@ -5972,7 +5972,7 @@
           <a:p>
             <a:pPr algn="l" indent="0" marL="0">
               <a:lnSpc>
-                <a:spcPts val="1890"/>
+                <a:spcPts val="1958"/>
               </a:lnSpc>
               <a:buNone/>
             </a:pPr>
@@ -5999,7 +5999,7 @@
         </p:nvSpPr>
         <p:spPr>
           <a:xfrm>
-            <a:off x="647700" y="773311"/>
+            <a:off x="647700" y="781943"/>
             <a:ext cx="8005572" cy="400050"/>
           </a:xfrm>
           <a:prstGeom prst="rect">
@@ -6038,8 +6038,8 @@
         </p:nvSpPr>
         <p:spPr>
           <a:xfrm>
-            <a:off x="647700" y="1344811"/>
-            <a:ext cx="7848600" cy="1076920"/>
+            <a:off x="647700" y="1315343"/>
+            <a:ext cx="7848600" cy="1226641"/>
           </a:xfrm>
           <a:prstGeom prst="rect">
             <a:avLst/>
@@ -6048,18 +6048,18 @@
           <a:ln/>
         </p:spPr>
         <p:txBody>
-          <a:bodyPr wrap="square" lIns="133350" tIns="0" rIns="0" bIns="0" rtlCol="0" anchor="t"/>
-          <a:lstStyle/>
-          <a:p>
-            <a:pPr algn="l" marL="133350" indent="-133350">
-              <a:lnSpc>
-                <a:spcPts val="2228"/>
+          <a:bodyPr wrap="square" lIns="152400" tIns="0" rIns="0" bIns="0" rtlCol="0" anchor="t"/>
+          <a:lstStyle/>
+          <a:p>
+            <a:pPr algn="l" marL="152400" indent="-152400">
+              <a:lnSpc>
+                <a:spcPts val="2520"/>
               </a:lnSpc>
               <a:buSzPct val="100000"/>
               <a:buChar char="•"/>
             </a:pPr>
             <a:r>
-              <a:rPr lang="en-US" sz="1650" dirty="0">
+              <a:rPr lang="en-US" sz="1800" dirty="0">
                 <a:solidFill>
                   <a:srgbClr val="E2E8F0"/>
                 </a:solidFill>
@@ -6069,18 +6069,18 @@
               </a:rPr>
               <a:t>Pick one pipeline stage - cleaning, modelling, or reporting - and script it</a:t>
             </a:r>
-            <a:endParaRPr lang="en-US" sz="1650" dirty="0"/>
-          </a:p>
-          <a:p>
-            <a:pPr algn="l" marL="133350" indent="-133350">
-              <a:lnSpc>
-                <a:spcPts val="2228"/>
+            <a:endParaRPr lang="en-US" sz="1800" dirty="0"/>
+          </a:p>
+          <a:p>
+            <a:pPr algn="l" marL="152400" indent="-152400">
+              <a:lnSpc>
+                <a:spcPts val="2520"/>
               </a:lnSpc>
               <a:buSzPct val="100000"/>
               <a:buChar char="•"/>
             </a:pPr>
             <a:r>
-              <a:rPr lang="en-US" sz="1650" dirty="0">
+              <a:rPr lang="en-US" sz="1800" dirty="0">
                 <a:solidFill>
                   <a:srgbClr val="E2E8F0"/>
                 </a:solidFill>
@@ -6090,18 +6090,18 @@
               </a:rPr>
               <a:t>Keep tasks atomic so agents (and collaborators) can slot in</a:t>
             </a:r>
-            <a:endParaRPr lang="en-US" sz="1650" dirty="0"/>
-          </a:p>
-          <a:p>
-            <a:pPr algn="l" marL="133350" indent="-133350">
-              <a:lnSpc>
-                <a:spcPts val="2228"/>
+            <a:endParaRPr lang="en-US" sz="1800" dirty="0"/>
+          </a:p>
+          <a:p>
+            <a:pPr algn="l" marL="152400" indent="-152400">
+              <a:lnSpc>
+                <a:spcPts val="2520"/>
               </a:lnSpc>
               <a:buSzPct val="100000"/>
               <a:buChar char="•"/>
             </a:pPr>
             <a:r>
-              <a:rPr lang="en-US" sz="1650" dirty="0">
+              <a:rPr lang="en-US" sz="1800" dirty="0">
                 <a:solidFill>
                   <a:srgbClr val="E2E8F0"/>
                 </a:solidFill>
@@ -6111,7 +6111,7 @@
               </a:rPr>
               <a:t>Track outputs in version control for transparent reviews</a:t>
             </a:r>
-            <a:endParaRPr lang="en-US" sz="1650" dirty="0"/>
+            <a:endParaRPr lang="en-US" sz="1800" dirty="0"/>
           </a:p>
         </p:txBody>
       </p:sp>
@@ -6156,7 +6156,7 @@
         <p:spPr>
           <a:xfrm>
             <a:off x="647700" y="457200"/>
-            <a:ext cx="8005572" cy="239911"/>
+            <a:ext cx="8005572" cy="248543"/>
           </a:xfrm>
           <a:prstGeom prst="rect">
             <a:avLst/>
@@ -6170,7 +6170,7 @@
           <a:p>
             <a:pPr algn="l" indent="0" marL="0">
               <a:lnSpc>
-                <a:spcPts val="1890"/>
+                <a:spcPts val="1958"/>
               </a:lnSpc>
               <a:buNone/>
             </a:pPr>
@@ -6197,7 +6197,7 @@
         </p:nvSpPr>
         <p:spPr>
           <a:xfrm>
-            <a:off x="647700" y="773311"/>
+            <a:off x="647700" y="781943"/>
             <a:ext cx="8005572" cy="400050"/>
           </a:xfrm>
           <a:prstGeom prst="rect">
@@ -6236,8 +6236,8 @@
         </p:nvSpPr>
         <p:spPr>
           <a:xfrm>
-            <a:off x="647700" y="1344811"/>
-            <a:ext cx="7848600" cy="1076920"/>
+            <a:off x="647700" y="1315343"/>
+            <a:ext cx="7848600" cy="1226641"/>
           </a:xfrm>
           <a:prstGeom prst="rect">
             <a:avLst/>
@@ -6246,18 +6246,18 @@
           <a:ln/>
         </p:spPr>
         <p:txBody>
-          <a:bodyPr wrap="square" lIns="133350" tIns="0" rIns="0" bIns="0" rtlCol="0" anchor="t"/>
-          <a:lstStyle/>
-          <a:p>
-            <a:pPr algn="l" marL="133350" indent="-133350">
-              <a:lnSpc>
-                <a:spcPts val="2228"/>
+          <a:bodyPr wrap="square" lIns="152400" tIns="0" rIns="0" bIns="0" rtlCol="0" anchor="t"/>
+          <a:lstStyle/>
+          <a:p>
+            <a:pPr algn="l" marL="152400" indent="-152400">
+              <a:lnSpc>
+                <a:spcPts val="2520"/>
               </a:lnSpc>
               <a:buSzPct val="100000"/>
               <a:buChar char="•"/>
             </a:pPr>
             <a:r>
-              <a:rPr lang="en-US" sz="1650" dirty="0">
+              <a:rPr lang="en-US" sz="1800" dirty="0">
                 <a:solidFill>
                   <a:srgbClr val="E2E8F0"/>
                 </a:solidFill>
@@ -6267,18 +6267,18 @@
               </a:rPr>
               <a:t>Familiarity with LLM chatbots such as ChatGPT</a:t>
             </a:r>
-            <a:endParaRPr lang="en-US" sz="1650" dirty="0"/>
-          </a:p>
-          <a:p>
-            <a:pPr algn="l" marL="133350" indent="-133350">
-              <a:lnSpc>
-                <a:spcPts val="2228"/>
+            <a:endParaRPr lang="en-US" sz="1800" dirty="0"/>
+          </a:p>
+          <a:p>
+            <a:pPr algn="l" marL="152400" indent="-152400">
+              <a:lnSpc>
+                <a:spcPts val="2520"/>
               </a:lnSpc>
               <a:buSzPct val="100000"/>
               <a:buChar char="•"/>
             </a:pPr>
             <a:r>
-              <a:rPr lang="en-US" sz="1650" dirty="0">
+              <a:rPr lang="en-US" sz="1800" dirty="0">
                 <a:solidFill>
                   <a:srgbClr val="E2E8F0"/>
                 </a:solidFill>
@@ -6288,18 +6288,18 @@
               </a:rPr>
               <a:t>Comfortable with R (ideas apply to Python and beyond)</a:t>
             </a:r>
-            <a:endParaRPr lang="en-US" sz="1650" dirty="0"/>
-          </a:p>
-          <a:p>
-            <a:pPr algn="l" marL="133350" indent="-133350">
-              <a:lnSpc>
-                <a:spcPts val="2228"/>
+            <a:endParaRPr lang="en-US" sz="1800" dirty="0"/>
+          </a:p>
+          <a:p>
+            <a:pPr algn="l" marL="152400" indent="-152400">
+              <a:lnSpc>
+                <a:spcPts val="2520"/>
               </a:lnSpc>
               <a:buSzPct val="100000"/>
               <a:buChar char="•"/>
             </a:pPr>
             <a:r>
-              <a:rPr lang="en-US" sz="1650" dirty="0">
+              <a:rPr lang="en-US" sz="1800" dirty="0">
                 <a:solidFill>
                   <a:srgbClr val="E2E8F0"/>
                 </a:solidFill>
@@ -6311,12 +6311,12 @@
             </a:r>
             <a:pPr algn="l" indent="0" marL="0">
               <a:lnSpc>
-                <a:spcPts val="2228"/>
+                <a:spcPts val="2520"/>
               </a:lnSpc>
               <a:buNone/>
             </a:pPr>
             <a:r>
-              <a:rPr lang="en-US" sz="1650" b="1" dirty="0">
+              <a:rPr lang="en-US" sz="1800" b="1" dirty="0">
                 <a:solidFill>
                   <a:srgbClr val="38BDF8"/>
                 </a:solidFill>
@@ -6328,12 +6328,12 @@
             </a:r>
             <a:pPr algn="l" indent="0" marL="0">
               <a:lnSpc>
-                <a:spcPts val="2228"/>
+                <a:spcPts val="2520"/>
               </a:lnSpc>
               <a:buNone/>
             </a:pPr>
             <a:r>
-              <a:rPr lang="en-US" sz="1650" dirty="0">
+              <a:rPr lang="en-US" sz="1800" dirty="0">
                 <a:solidFill>
                   <a:srgbClr val="E2E8F0"/>
                 </a:solidFill>
@@ -6343,7 +6343,7 @@
               </a:rPr>
               <a:t> - discovering what lies ahead</a:t>
             </a:r>
-            <a:endParaRPr lang="en-US" sz="1650" dirty="0"/>
+            <a:endParaRPr lang="en-US" sz="1800" dirty="0"/>
           </a:p>
         </p:txBody>
       </p:sp>
@@ -6388,7 +6388,7 @@
         <p:spPr>
           <a:xfrm>
             <a:off x="647700" y="457200"/>
-            <a:ext cx="8005572" cy="239911"/>
+            <a:ext cx="8005572" cy="248543"/>
           </a:xfrm>
           <a:prstGeom prst="rect">
             <a:avLst/>
@@ -6402,7 +6402,7 @@
           <a:p>
             <a:pPr algn="l" indent="0" marL="0">
               <a:lnSpc>
-                <a:spcPts val="1890"/>
+                <a:spcPts val="1958"/>
               </a:lnSpc>
               <a:buNone/>
             </a:pPr>
@@ -6429,7 +6429,7 @@
         </p:nvSpPr>
         <p:spPr>
           <a:xfrm>
-            <a:off x="647700" y="773311"/>
+            <a:off x="647700" y="781943"/>
             <a:ext cx="8005572" cy="400050"/>
           </a:xfrm>
           <a:prstGeom prst="rect">
@@ -6468,8 +6468,8 @@
         </p:nvSpPr>
         <p:spPr>
           <a:xfrm>
-            <a:off x="647700" y="1344811"/>
-            <a:ext cx="7848600" cy="1473994"/>
+            <a:off x="647700" y="1315343"/>
+            <a:ext cx="7848600" cy="1679972"/>
           </a:xfrm>
           <a:prstGeom prst="rect">
             <a:avLst/>
@@ -6478,18 +6478,18 @@
           <a:ln/>
         </p:spPr>
         <p:txBody>
-          <a:bodyPr wrap="square" lIns="133350" tIns="0" rIns="0" bIns="0" rtlCol="0" anchor="t"/>
-          <a:lstStyle/>
-          <a:p>
-            <a:pPr algn="l" marL="133350" indent="-133350">
-              <a:lnSpc>
-                <a:spcPts val="2228"/>
+          <a:bodyPr wrap="square" lIns="152400" tIns="0" rIns="0" bIns="0" rtlCol="0" anchor="t"/>
+          <a:lstStyle/>
+          <a:p>
+            <a:pPr algn="l" marL="152400" indent="-152400">
+              <a:lnSpc>
+                <a:spcPts val="2520"/>
               </a:lnSpc>
               <a:buSzPct val="100000"/>
               <a:buChar char="•"/>
             </a:pPr>
             <a:r>
-              <a:rPr lang="en-US" sz="1650" dirty="0">
+              <a:rPr lang="en-US" sz="1800" dirty="0">
                 <a:solidFill>
                   <a:srgbClr val="E2E8F0"/>
                 </a:solidFill>
@@ -6499,18 +6499,18 @@
               </a:rPr>
               <a:t>Latest LLMs handle multi-step, tool-rich workflows</a:t>
             </a:r>
-            <a:endParaRPr lang="en-US" sz="1650" dirty="0"/>
-          </a:p>
-          <a:p>
-            <a:pPr algn="l" marL="133350" indent="-133350">
-              <a:lnSpc>
-                <a:spcPts val="2228"/>
+            <a:endParaRPr lang="en-US" sz="1800" dirty="0"/>
+          </a:p>
+          <a:p>
+            <a:pPr algn="l" marL="152400" indent="-152400">
+              <a:lnSpc>
+                <a:spcPts val="2520"/>
               </a:lnSpc>
               <a:buSzPct val="100000"/>
               <a:buChar char="•"/>
             </a:pPr>
             <a:r>
-              <a:rPr lang="en-US" sz="1650" dirty="0">
+              <a:rPr lang="en-US" sz="1800" dirty="0">
                 <a:solidFill>
                   <a:srgbClr val="E2E8F0"/>
                 </a:solidFill>
@@ -6520,18 +6520,18 @@
               </a:rPr>
               <a:t>Usage costs now fit student and lab budgets</a:t>
             </a:r>
-            <a:endParaRPr lang="en-US" sz="1650" dirty="0"/>
-          </a:p>
-          <a:p>
-            <a:pPr algn="l" marL="133350" indent="-133350">
-              <a:lnSpc>
-                <a:spcPts val="2228"/>
+            <a:endParaRPr lang="en-US" sz="1800" dirty="0"/>
+          </a:p>
+          <a:p>
+            <a:pPr algn="l" marL="152400" indent="-152400">
+              <a:lnSpc>
+                <a:spcPts val="2520"/>
               </a:lnSpc>
               <a:buSzPct val="100000"/>
               <a:buChar char="•"/>
             </a:pPr>
             <a:r>
-              <a:rPr lang="en-US" sz="1650" dirty="0">
+              <a:rPr lang="en-US" sz="1800" dirty="0">
                 <a:solidFill>
                   <a:srgbClr val="E2E8F0"/>
                 </a:solidFill>
@@ -6541,18 +6541,18 @@
               </a:rPr>
               <a:t>Interfaces are accessible beyond specialist teams</a:t>
             </a:r>
-            <a:endParaRPr lang="en-US" sz="1650" dirty="0"/>
-          </a:p>
-          <a:p>
-            <a:pPr algn="l" marL="133350" indent="-133350">
-              <a:lnSpc>
-                <a:spcPts val="2228"/>
+            <a:endParaRPr lang="en-US" sz="1800" dirty="0"/>
+          </a:p>
+          <a:p>
+            <a:pPr algn="l" marL="152400" indent="-152400">
+              <a:lnSpc>
+                <a:spcPts val="2520"/>
               </a:lnSpc>
               <a:buSzPct val="100000"/>
               <a:buChar char="•"/>
             </a:pPr>
             <a:r>
-              <a:rPr lang="en-US" sz="1650" dirty="0">
+              <a:rPr lang="en-US" sz="1800" dirty="0">
                 <a:solidFill>
                   <a:srgbClr val="E2E8F0"/>
                 </a:solidFill>
@@ -6562,7 +6562,7 @@
               </a:rPr>
               <a:t>Agents already boost everyday research output</a:t>
             </a:r>
-            <a:endParaRPr lang="en-US" sz="1650" dirty="0"/>
+            <a:endParaRPr lang="en-US" sz="1800" dirty="0"/>
           </a:p>
         </p:txBody>
       </p:sp>
@@ -6574,12 +6574,12 @@
         </p:nvSpPr>
         <p:spPr>
           <a:xfrm>
-            <a:off x="647700" y="2990255"/>
-            <a:ext cx="7848600" cy="982861"/>
+            <a:off x="647700" y="3128665"/>
+            <a:ext cx="7848600" cy="1060847"/>
           </a:xfrm>
           <a:prstGeom prst="roundRect">
             <a:avLst>
-              <a:gd name="adj" fmla="val 15506"/>
+              <a:gd name="adj" fmla="val 14366"/>
             </a:avLst>
           </a:prstGeom>
           <a:solidFill>
@@ -6613,8 +6613,8 @@
         </p:nvSpPr>
         <p:spPr>
           <a:xfrm>
-            <a:off x="676275" y="2990255"/>
-            <a:ext cx="0" cy="982861"/>
+            <a:off x="676275" y="3128665"/>
+            <a:ext cx="0" cy="1060847"/>
           </a:xfrm>
           <a:prstGeom prst="line">
             <a:avLst/>
@@ -6636,8 +6636,8 @@
         </p:nvSpPr>
         <p:spPr>
           <a:xfrm>
-            <a:off x="933450" y="3161705"/>
-            <a:ext cx="7480935" cy="639961"/>
+            <a:off x="933450" y="3300115"/>
+            <a:ext cx="7480935" cy="717947"/>
           </a:xfrm>
           <a:prstGeom prst="rect">
             <a:avLst/>
@@ -6651,12 +6651,12 @@
           <a:p>
             <a:pPr algn="l" indent="0" marL="0">
               <a:lnSpc>
-                <a:spcPts val="2520"/>
+                <a:spcPts val="2828"/>
               </a:lnSpc>
               <a:buNone/>
             </a:pPr>
             <a:r>
-              <a:rPr lang="en-US" sz="1800" b="1" dirty="0">
+              <a:rPr lang="en-US" sz="1950" b="1" dirty="0">
                 <a:solidFill>
                   <a:srgbClr val="F97316"/>
                 </a:solidFill>
@@ -6666,7 +6666,7 @@
               </a:rPr>
               <a:t>Provocation: By the end of 2025 nobody needs to code or launch SPSS ever again.</a:t>
             </a:r>
-            <a:endParaRPr lang="en-US" sz="1800" dirty="0"/>
+            <a:endParaRPr lang="en-US" sz="1950" dirty="0"/>
           </a:p>
         </p:txBody>
       </p:sp>
@@ -6711,7 +6711,7 @@
         <p:spPr>
           <a:xfrm>
             <a:off x="647700" y="457200"/>
-            <a:ext cx="8005572" cy="239911"/>
+            <a:ext cx="8005572" cy="248543"/>
           </a:xfrm>
           <a:prstGeom prst="rect">
             <a:avLst/>
@@ -6725,7 +6725,7 @@
           <a:p>
             <a:pPr algn="l" indent="0" marL="0">
               <a:lnSpc>
-                <a:spcPts val="1890"/>
+                <a:spcPts val="1958"/>
               </a:lnSpc>
               <a:buNone/>
             </a:pPr>
@@ -6752,7 +6752,7 @@
         </p:nvSpPr>
         <p:spPr>
           <a:xfrm>
-            <a:off x="647700" y="773311"/>
+            <a:off x="647700" y="781943"/>
             <a:ext cx="8005572" cy="400050"/>
           </a:xfrm>
           <a:prstGeom prst="rect">
@@ -6791,8 +6791,8 @@
         </p:nvSpPr>
         <p:spPr>
           <a:xfrm>
-            <a:off x="647700" y="1344811"/>
-            <a:ext cx="7848600" cy="1473994"/>
+            <a:off x="647700" y="1315343"/>
+            <a:ext cx="7848600" cy="1679972"/>
           </a:xfrm>
           <a:prstGeom prst="rect">
             <a:avLst/>
@@ -6801,18 +6801,18 @@
           <a:ln/>
         </p:spPr>
         <p:txBody>
-          <a:bodyPr wrap="square" lIns="133350" tIns="0" rIns="0" bIns="0" rtlCol="0" anchor="t"/>
-          <a:lstStyle/>
-          <a:p>
-            <a:pPr algn="l" marL="133350" indent="-133350">
-              <a:lnSpc>
-                <a:spcPts val="2228"/>
+          <a:bodyPr wrap="square" lIns="152400" tIns="0" rIns="0" bIns="0" rtlCol="0" anchor="t"/>
+          <a:lstStyle/>
+          <a:p>
+            <a:pPr algn="l" marL="152400" indent="-152400">
+              <a:lnSpc>
+                <a:spcPts val="2520"/>
               </a:lnSpc>
               <a:buSzPct val="100000"/>
               <a:buChar char="•"/>
             </a:pPr>
             <a:r>
-              <a:rPr lang="en-US" sz="1650" dirty="0">
+              <a:rPr lang="en-US" sz="1800" dirty="0">
                 <a:solidFill>
                   <a:srgbClr val="E2E8F0"/>
                 </a:solidFill>
@@ -6822,18 +6822,18 @@
               </a:rPr>
               <a:t>A general-purpose LLM embedded in your computing environment</a:t>
             </a:r>
-            <a:endParaRPr lang="en-US" sz="1650" dirty="0"/>
-          </a:p>
-          <a:p>
-            <a:pPr algn="l" marL="133350" indent="-133350">
-              <a:lnSpc>
-                <a:spcPts val="2228"/>
+            <a:endParaRPr lang="en-US" sz="1800" dirty="0"/>
+          </a:p>
+          <a:p>
+            <a:pPr algn="l" marL="152400" indent="-152400">
+              <a:lnSpc>
+                <a:spcPts val="2520"/>
               </a:lnSpc>
               <a:buSzPct val="100000"/>
               <a:buChar char="•"/>
             </a:pPr>
             <a:r>
-              <a:rPr lang="en-US" sz="1650" dirty="0">
+              <a:rPr lang="en-US" sz="1800" dirty="0">
                 <a:solidFill>
                   <a:srgbClr val="E2E8F0"/>
                 </a:solidFill>
@@ -6843,18 +6843,18 @@
               </a:rPr>
               <a:t>Reads and writes files, runs bash or PowerShell, calls APIs</a:t>
             </a:r>
-            <a:endParaRPr lang="en-US" sz="1650" dirty="0"/>
-          </a:p>
-          <a:p>
-            <a:pPr algn="l" marL="133350" indent="-133350">
-              <a:lnSpc>
-                <a:spcPts val="2228"/>
+            <a:endParaRPr lang="en-US" sz="1800" dirty="0"/>
+          </a:p>
+          <a:p>
+            <a:pPr algn="l" marL="152400" indent="-152400">
+              <a:lnSpc>
+                <a:spcPts val="2520"/>
               </a:lnSpc>
               <a:buSzPct val="100000"/>
               <a:buChar char="•"/>
             </a:pPr>
             <a:r>
-              <a:rPr lang="en-US" sz="1650" dirty="0">
+              <a:rPr lang="en-US" sz="1800" dirty="0">
                 <a:solidFill>
                   <a:srgbClr val="E2E8F0"/>
                 </a:solidFill>
@@ -6864,18 +6864,18 @@
               </a:rPr>
               <a:t>Operates autonomously in scoped windows (approx. 20 minutes)</a:t>
             </a:r>
-            <a:endParaRPr lang="en-US" sz="1650" dirty="0"/>
-          </a:p>
-          <a:p>
-            <a:pPr algn="l" marL="133350" indent="-133350">
-              <a:lnSpc>
-                <a:spcPts val="2228"/>
+            <a:endParaRPr lang="en-US" sz="1800" dirty="0"/>
+          </a:p>
+          <a:p>
+            <a:pPr algn="l" marL="152400" indent="-152400">
+              <a:lnSpc>
+                <a:spcPts val="2520"/>
               </a:lnSpc>
               <a:buSzPct val="100000"/>
               <a:buChar char="•"/>
             </a:pPr>
             <a:r>
-              <a:rPr lang="en-US" sz="1650" dirty="0">
+              <a:rPr lang="en-US" sz="1800" dirty="0">
                 <a:solidFill>
                   <a:srgbClr val="E2E8F0"/>
                 </a:solidFill>
@@ -6885,7 +6885,7 @@
               </a:rPr>
               <a:t>Searches, codes, executes, documents - linked into full research loops</a:t>
             </a:r>
-            <a:endParaRPr lang="en-US" sz="1650" dirty="0"/>
+            <a:endParaRPr lang="en-US" sz="1800" dirty="0"/>
           </a:p>
         </p:txBody>
       </p:sp>
@@ -6930,7 +6930,7 @@
         <p:spPr>
           <a:xfrm>
             <a:off x="647700" y="457200"/>
-            <a:ext cx="8005572" cy="239911"/>
+            <a:ext cx="8005572" cy="248543"/>
           </a:xfrm>
           <a:prstGeom prst="rect">
             <a:avLst/>
@@ -6944,7 +6944,7 @@
           <a:p>
             <a:pPr algn="l" indent="0" marL="0">
               <a:lnSpc>
-                <a:spcPts val="1890"/>
+                <a:spcPts val="1958"/>
               </a:lnSpc>
               <a:buNone/>
             </a:pPr>
@@ -6971,7 +6971,7 @@
         </p:nvSpPr>
         <p:spPr>
           <a:xfrm>
-            <a:off x="647700" y="773311"/>
+            <a:off x="647700" y="781943"/>
             <a:ext cx="8005572" cy="400050"/>
           </a:xfrm>
           <a:prstGeom prst="rect">
@@ -7010,8 +7010,8 @@
         </p:nvSpPr>
         <p:spPr>
           <a:xfrm>
-            <a:off x="647700" y="1344811"/>
-            <a:ext cx="7848600" cy="1473994"/>
+            <a:off x="647700" y="1315343"/>
+            <a:ext cx="7848600" cy="1679972"/>
           </a:xfrm>
           <a:prstGeom prst="rect">
             <a:avLst/>
@@ -7020,18 +7020,18 @@
           <a:ln/>
         </p:spPr>
         <p:txBody>
-          <a:bodyPr wrap="square" lIns="133350" tIns="0" rIns="0" bIns="0" rtlCol="0" anchor="t"/>
-          <a:lstStyle/>
-          <a:p>
-            <a:pPr algn="l" marL="133350" indent="-133350">
-              <a:lnSpc>
-                <a:spcPts val="2228"/>
+          <a:bodyPr wrap="square" lIns="152400" tIns="0" rIns="0" bIns="0" rtlCol="0" anchor="t"/>
+          <a:lstStyle/>
+          <a:p>
+            <a:pPr algn="l" marL="152400" indent="-152400">
+              <a:lnSpc>
+                <a:spcPts val="2520"/>
               </a:lnSpc>
               <a:buSzPct val="100000"/>
               <a:buChar char="•"/>
             </a:pPr>
             <a:r>
-              <a:rPr lang="en-US" sz="1650" dirty="0">
+              <a:rPr lang="en-US" sz="1800" dirty="0">
                 <a:solidFill>
                   <a:srgbClr val="E2E8F0"/>
                 </a:solidFill>
@@ -7041,18 +7041,18 @@
               </a:rPr>
               <a:t>One dial: fast and rough versus slow and precise runs</a:t>
             </a:r>
-            <a:endParaRPr lang="en-US" sz="1650" dirty="0"/>
-          </a:p>
-          <a:p>
-            <a:pPr algn="l" marL="133350" indent="-133350">
-              <a:lnSpc>
-                <a:spcPts val="2228"/>
+            <a:endParaRPr lang="en-US" sz="1800" dirty="0"/>
+          </a:p>
+          <a:p>
+            <a:pPr algn="l" marL="152400" indent="-152400">
+              <a:lnSpc>
+                <a:spcPts val="2520"/>
               </a:lnSpc>
               <a:buSzPct val="100000"/>
               <a:buChar char="•"/>
             </a:pPr>
             <a:r>
-              <a:rPr lang="en-US" sz="1650" dirty="0">
+              <a:rPr lang="en-US" sz="1800" dirty="0">
                 <a:solidFill>
                   <a:srgbClr val="E2E8F0"/>
                 </a:solidFill>
@@ -7062,18 +7062,18 @@
               </a:rPr>
               <a:t>Heavy daily use approx. $200 per month</a:t>
             </a:r>
-            <a:endParaRPr lang="en-US" sz="1650" dirty="0"/>
-          </a:p>
-          <a:p>
-            <a:pPr algn="l" marL="133350" indent="-133350">
-              <a:lnSpc>
-                <a:spcPts val="2228"/>
+            <a:endParaRPr lang="en-US" sz="1800" dirty="0"/>
+          </a:p>
+          <a:p>
+            <a:pPr algn="l" marL="152400" indent="-152400">
+              <a:lnSpc>
+                <a:spcPts val="2520"/>
               </a:lnSpc>
               <a:buSzPct val="100000"/>
               <a:buChar char="•"/>
             </a:pPr>
             <a:r>
-              <a:rPr lang="en-US" sz="1650" dirty="0">
+              <a:rPr lang="en-US" sz="1800" dirty="0">
                 <a:solidFill>
                   <a:srgbClr val="E2E8F0"/>
                 </a:solidFill>
@@ -7083,18 +7083,18 @@
               </a:rPr>
               <a:t>Moderate schedules approx. $100 per month</a:t>
             </a:r>
-            <a:endParaRPr lang="en-US" sz="1650" dirty="0"/>
-          </a:p>
-          <a:p>
-            <a:pPr algn="l" marL="133350" indent="-133350">
-              <a:lnSpc>
-                <a:spcPts val="2228"/>
+            <a:endParaRPr lang="en-US" sz="1800" dirty="0"/>
+          </a:p>
+          <a:p>
+            <a:pPr algn="l" marL="152400" indent="-152400">
+              <a:lnSpc>
+                <a:spcPts val="2520"/>
               </a:lnSpc>
               <a:buSzPct val="100000"/>
               <a:buChar char="•"/>
             </a:pPr>
             <a:r>
-              <a:rPr lang="en-US" sz="1650" dirty="0">
+              <a:rPr lang="en-US" sz="1800" dirty="0">
                 <a:solidFill>
                   <a:srgbClr val="E2E8F0"/>
                 </a:solidFill>
@@ -7104,7 +7104,7 @@
               </a:rPr>
               <a:t>Light exploration approx. $20 per month, plus free starter tiers</a:t>
             </a:r>
-            <a:endParaRPr lang="en-US" sz="1650" dirty="0"/>
+            <a:endParaRPr lang="en-US" sz="1800" dirty="0"/>
           </a:p>
         </p:txBody>
       </p:sp>
@@ -7149,7 +7149,7 @@
         <p:spPr>
           <a:xfrm>
             <a:off x="647700" y="457200"/>
-            <a:ext cx="8005572" cy="239911"/>
+            <a:ext cx="8005572" cy="248543"/>
           </a:xfrm>
           <a:prstGeom prst="rect">
             <a:avLst/>
@@ -7163,7 +7163,7 @@
           <a:p>
             <a:pPr algn="l" indent="0" marL="0">
               <a:lnSpc>
-                <a:spcPts val="1890"/>
+                <a:spcPts val="1958"/>
               </a:lnSpc>
               <a:buNone/>
             </a:pPr>
@@ -7190,7 +7190,7 @@
         </p:nvSpPr>
         <p:spPr>
           <a:xfrm>
-            <a:off x="647700" y="773311"/>
+            <a:off x="647700" y="781943"/>
             <a:ext cx="8005572" cy="400050"/>
           </a:xfrm>
           <a:prstGeom prst="rect">
@@ -7229,8 +7229,8 @@
         </p:nvSpPr>
         <p:spPr>
           <a:xfrm>
-            <a:off x="647700" y="1344811"/>
-            <a:ext cx="7848600" cy="1359694"/>
+            <a:off x="647700" y="1315343"/>
+            <a:ext cx="7848600" cy="1866602"/>
           </a:xfrm>
           <a:prstGeom prst="rect">
             <a:avLst/>
@@ -7239,18 +7239,18 @@
           <a:ln/>
         </p:spPr>
         <p:txBody>
-          <a:bodyPr wrap="square" lIns="133350" tIns="0" rIns="0" bIns="0" rtlCol="0" anchor="t"/>
-          <a:lstStyle/>
-          <a:p>
-            <a:pPr algn="l" marL="133350" indent="-133350">
-              <a:lnSpc>
-                <a:spcPts val="2228"/>
+          <a:bodyPr wrap="square" lIns="152400" tIns="0" rIns="0" bIns="0" rtlCol="0" anchor="t"/>
+          <a:lstStyle/>
+          <a:p>
+            <a:pPr algn="l" marL="152400" indent="-152400">
+              <a:lnSpc>
+                <a:spcPts val="2520"/>
               </a:lnSpc>
               <a:buSzPct val="100000"/>
               <a:buChar char="•"/>
             </a:pPr>
             <a:r>
-              <a:rPr lang="en-US" sz="1650" b="1" dirty="0">
+              <a:rPr lang="en-US" sz="1800" b="1" dirty="0">
                 <a:solidFill>
                   <a:srgbClr val="E2E8F0"/>
                 </a:solidFill>
@@ -7262,12 +7262,12 @@
             </a:r>
             <a:pPr algn="l" indent="0" marL="0">
               <a:lnSpc>
-                <a:spcPts val="2228"/>
+                <a:spcPts val="2520"/>
               </a:lnSpc>
               <a:buNone/>
             </a:pPr>
             <a:r>
-              <a:rPr lang="en-US" sz="1650" dirty="0">
+              <a:rPr lang="en-US" sz="1800" dirty="0">
                 <a:solidFill>
                   <a:srgbClr val="E2E8F0"/>
                 </a:solidFill>
@@ -7277,18 +7277,18 @@
               </a:rPr>
               <a:t> Codex (OpenAI), Claude Code (Anthropic), Gemini (Google), Cursor, Copilot</a:t>
             </a:r>
-            <a:endParaRPr lang="en-US" sz="1650" dirty="0"/>
-          </a:p>
-          <a:p>
-            <a:pPr algn="l" marL="133350" indent="-133350">
-              <a:lnSpc>
-                <a:spcPts val="2228"/>
+            <a:endParaRPr lang="en-US" sz="1800" dirty="0"/>
+          </a:p>
+          <a:p>
+            <a:pPr algn="l" marL="152400" indent="-152400">
+              <a:lnSpc>
+                <a:spcPts val="2520"/>
               </a:lnSpc>
               <a:buSzPct val="100000"/>
               <a:buChar char="•"/>
             </a:pPr>
             <a:r>
-              <a:rPr lang="en-US" sz="1650" b="1" dirty="0">
+              <a:rPr lang="en-US" sz="1800" b="1" dirty="0">
                 <a:solidFill>
                   <a:srgbClr val="E2E8F0"/>
                 </a:solidFill>
@@ -7300,12 +7300,12 @@
             </a:r>
             <a:pPr algn="l" indent="0" marL="0">
               <a:lnSpc>
-                <a:spcPts val="2228"/>
+                <a:spcPts val="2520"/>
               </a:lnSpc>
               <a:buNone/>
             </a:pPr>
             <a:r>
-              <a:rPr lang="en-US" sz="1650" dirty="0">
+              <a:rPr lang="en-US" sz="1800" dirty="0">
                 <a:solidFill>
                   <a:srgbClr val="E2E8F0"/>
                 </a:solidFill>
@@ -7315,18 +7315,18 @@
               </a:rPr>
               <a:t> Kimi K2, Qwen 3, GLM 4.5</a:t>
             </a:r>
-            <a:endParaRPr lang="en-US" sz="1650" dirty="0"/>
-          </a:p>
-          <a:p>
-            <a:pPr algn="l" marL="133350" indent="-133350">
-              <a:lnSpc>
-                <a:spcPts val="2228"/>
+            <a:endParaRPr lang="en-US" sz="1800" dirty="0"/>
+          </a:p>
+          <a:p>
+            <a:pPr algn="l" marL="152400" indent="-152400">
+              <a:lnSpc>
+                <a:spcPts val="2520"/>
               </a:lnSpc>
               <a:buSzPct val="100000"/>
               <a:buChar char="•"/>
             </a:pPr>
             <a:r>
-              <a:rPr lang="en-US" sz="1650" b="1" dirty="0">
+              <a:rPr lang="en-US" sz="1800" b="1" dirty="0">
                 <a:solidFill>
                   <a:srgbClr val="E2E8F0"/>
                 </a:solidFill>
@@ -7338,12 +7338,12 @@
             </a:r>
             <a:pPr algn="l" indent="0" marL="0">
               <a:lnSpc>
-                <a:spcPts val="2228"/>
+                <a:spcPts val="2520"/>
               </a:lnSpc>
               <a:buNone/>
             </a:pPr>
             <a:r>
-              <a:rPr lang="en-US" sz="1650" dirty="0">
+              <a:rPr lang="en-US" sz="1800" dirty="0">
                 <a:solidFill>
                   <a:srgbClr val="E2E8F0"/>
                 </a:solidFill>
@@ -7353,7 +7353,7 @@
               </a:rPr>
               <a:t> Codex leads for capability, Claude Code 4.5 close, GLM or K2 offer best value</a:t>
             </a:r>
-            <a:endParaRPr lang="en-US" sz="1650" dirty="0"/>
+            <a:endParaRPr lang="en-US" sz="1800" dirty="0"/>
           </a:p>
         </p:txBody>
       </p:sp>
@@ -7398,7 +7398,7 @@
         <p:spPr>
           <a:xfrm>
             <a:off x="647700" y="457200"/>
-            <a:ext cx="8005572" cy="239911"/>
+            <a:ext cx="8005572" cy="248543"/>
           </a:xfrm>
           <a:prstGeom prst="rect">
             <a:avLst/>
@@ -7412,7 +7412,7 @@
           <a:p>
             <a:pPr algn="l" indent="0" marL="0">
               <a:lnSpc>
-                <a:spcPts val="1890"/>
+                <a:spcPts val="1958"/>
               </a:lnSpc>
               <a:buNone/>
             </a:pPr>
@@ -7439,7 +7439,7 @@
         </p:nvSpPr>
         <p:spPr>
           <a:xfrm>
-            <a:off x="647700" y="773311"/>
+            <a:off x="647700" y="781943"/>
             <a:ext cx="8005572" cy="400050"/>
           </a:xfrm>
           <a:prstGeom prst="rect">
@@ -7478,12 +7478,12 @@
         </p:nvSpPr>
         <p:spPr>
           <a:xfrm>
-            <a:off x="647700" y="1440061"/>
-            <a:ext cx="3771900" cy="3283744"/>
+            <a:off x="647700" y="1391543"/>
+            <a:ext cx="3790950" cy="3462338"/>
           </a:xfrm>
           <a:prstGeom prst="roundRect">
             <a:avLst>
-              <a:gd name="adj" fmla="val 5221"/>
+              <a:gd name="adj" fmla="val 4952"/>
             </a:avLst>
           </a:prstGeom>
           <a:solidFill>
@@ -7517,8 +7517,8 @@
         </p:nvSpPr>
         <p:spPr>
           <a:xfrm>
-            <a:off x="876300" y="1649611"/>
-            <a:ext cx="3380994" cy="266700"/>
+            <a:off x="857250" y="1562993"/>
+            <a:ext cx="3439287" cy="266700"/>
           </a:xfrm>
           <a:prstGeom prst="rect">
             <a:avLst/>
@@ -7556,8 +7556,8 @@
         </p:nvSpPr>
         <p:spPr>
           <a:xfrm>
-            <a:off x="876300" y="2068711"/>
-            <a:ext cx="3314700" cy="1810345"/>
+            <a:off x="857250" y="1943993"/>
+            <a:ext cx="3371850" cy="2030016"/>
           </a:xfrm>
           <a:prstGeom prst="rect">
             <a:avLst/>
@@ -7566,18 +7566,18 @@
           <a:ln/>
         </p:spPr>
         <p:txBody>
-          <a:bodyPr wrap="square" lIns="133350" tIns="0" rIns="0" bIns="0" rtlCol="0" anchor="t"/>
-          <a:lstStyle/>
-          <a:p>
-            <a:pPr algn="l" marL="133350" indent="-133350">
-              <a:lnSpc>
-                <a:spcPts val="2126"/>
+          <a:bodyPr wrap="square" lIns="152400" tIns="0" rIns="0" bIns="0" rtlCol="0" anchor="t"/>
+          <a:lstStyle/>
+          <a:p>
+            <a:pPr algn="l" marL="152400" indent="-152400">
+              <a:lnSpc>
+                <a:spcPts val="2415"/>
               </a:lnSpc>
               <a:buSzPct val="100000"/>
               <a:buChar char="•"/>
             </a:pPr>
             <a:r>
-              <a:rPr lang="en-US" sz="1575" dirty="0">
+              <a:rPr lang="en-US" sz="1725" dirty="0">
                 <a:solidFill>
                   <a:srgbClr val="E2E8F0"/>
                 </a:solidFill>
@@ -7587,18 +7587,18 @@
               </a:rPr>
               <a:t>Accelerate routine analysis and reporting</a:t>
             </a:r>
-            <a:endParaRPr lang="en-US" sz="1575" dirty="0"/>
-          </a:p>
-          <a:p>
-            <a:pPr algn="l" marL="133350" indent="-133350">
-              <a:lnSpc>
-                <a:spcPts val="2126"/>
+            <a:endParaRPr lang="en-US" sz="1725" dirty="0"/>
+          </a:p>
+          <a:p>
+            <a:pPr algn="l" marL="152400" indent="-152400">
+              <a:lnSpc>
+                <a:spcPts val="2415"/>
               </a:lnSpc>
               <a:buSzPct val="100000"/>
               <a:buChar char="•"/>
             </a:pPr>
             <a:r>
-              <a:rPr lang="en-US" sz="1575" dirty="0">
+              <a:rPr lang="en-US" sz="1725" dirty="0">
                 <a:solidFill>
                   <a:srgbClr val="E2E8F0"/>
                 </a:solidFill>
@@ -7608,18 +7608,18 @@
               </a:rPr>
               <a:t>Extend what individuals and small teams can deliver</a:t>
             </a:r>
-            <a:endParaRPr lang="en-US" sz="1575" dirty="0"/>
-          </a:p>
-          <a:p>
-            <a:pPr algn="l" marL="133350" indent="-133350">
-              <a:lnSpc>
-                <a:spcPts val="2126"/>
+            <a:endParaRPr lang="en-US" sz="1725" dirty="0"/>
+          </a:p>
+          <a:p>
+            <a:pPr algn="l" marL="152400" indent="-152400">
+              <a:lnSpc>
+                <a:spcPts val="2415"/>
               </a:lnSpc>
               <a:buSzPct val="100000"/>
               <a:buChar char="•"/>
             </a:pPr>
             <a:r>
-              <a:rPr lang="en-US" sz="1575" dirty="0">
+              <a:rPr lang="en-US" sz="1725" dirty="0">
                 <a:solidFill>
                   <a:srgbClr val="E2E8F0"/>
                 </a:solidFill>
@@ -7629,7 +7629,7 @@
               </a:rPr>
               <a:t>Lower activation energy for ambitious workflows</a:t>
             </a:r>
-            <a:endParaRPr lang="en-US" sz="1575" dirty="0"/>
+            <a:endParaRPr lang="en-US" sz="1725" dirty="0"/>
           </a:p>
         </p:txBody>
       </p:sp>
@@ -7641,12 +7641,12 @@
         </p:nvSpPr>
         <p:spPr>
           <a:xfrm>
-            <a:off x="4724400" y="1440061"/>
-            <a:ext cx="3771900" cy="3283744"/>
+            <a:off x="4705350" y="1391543"/>
+            <a:ext cx="3790950" cy="3462338"/>
           </a:xfrm>
           <a:prstGeom prst="roundRect">
             <a:avLst>
-              <a:gd name="adj" fmla="val 5221"/>
+              <a:gd name="adj" fmla="val 4952"/>
             </a:avLst>
           </a:prstGeom>
           <a:solidFill>
@@ -7680,8 +7680,8 @@
         </p:nvSpPr>
         <p:spPr>
           <a:xfrm>
-            <a:off x="4953000" y="1649611"/>
-            <a:ext cx="3380994" cy="266700"/>
+            <a:off x="4914900" y="1562993"/>
+            <a:ext cx="3439287" cy="266700"/>
           </a:xfrm>
           <a:prstGeom prst="rect">
             <a:avLst/>
@@ -7719,8 +7719,8 @@
         </p:nvSpPr>
         <p:spPr>
           <a:xfrm>
-            <a:off x="4953000" y="2068711"/>
-            <a:ext cx="3314700" cy="2445544"/>
+            <a:off x="4914900" y="1943993"/>
+            <a:ext cx="3371850" cy="2738438"/>
           </a:xfrm>
           <a:prstGeom prst="rect">
             <a:avLst/>
@@ -7729,18 +7729,18 @@
           <a:ln/>
         </p:spPr>
         <p:txBody>
-          <a:bodyPr wrap="square" lIns="133350" tIns="0" rIns="0" bIns="0" rtlCol="0" anchor="t"/>
-          <a:lstStyle/>
-          <a:p>
-            <a:pPr algn="l" marL="133350" indent="-133350">
-              <a:lnSpc>
-                <a:spcPts val="2126"/>
+          <a:bodyPr wrap="square" lIns="152400" tIns="0" rIns="0" bIns="0" rtlCol="0" anchor="t"/>
+          <a:lstStyle/>
+          <a:p>
+            <a:pPr algn="l" marL="152400" indent="-152400">
+              <a:lnSpc>
+                <a:spcPts val="2415"/>
               </a:lnSpc>
               <a:buSzPct val="100000"/>
               <a:buChar char="•"/>
             </a:pPr>
             <a:r>
-              <a:rPr lang="en-US" sz="1575" dirty="0">
+              <a:rPr lang="en-US" sz="1725" dirty="0">
                 <a:solidFill>
                   <a:srgbClr val="E2E8F0"/>
                 </a:solidFill>
@@ -7750,18 +7750,18 @@
               </a:rPr>
               <a:t>Hallucinations and silent errors still happen</a:t>
             </a:r>
-            <a:endParaRPr lang="en-US" sz="1575" dirty="0"/>
-          </a:p>
-          <a:p>
-            <a:pPr algn="l" marL="133350" indent="-133350">
-              <a:lnSpc>
-                <a:spcPts val="2126"/>
+            <a:endParaRPr lang="en-US" sz="1725" dirty="0"/>
+          </a:p>
+          <a:p>
+            <a:pPr algn="l" marL="152400" indent="-152400">
+              <a:lnSpc>
+                <a:spcPts val="2415"/>
               </a:lnSpc>
               <a:buSzPct val="100000"/>
               <a:buChar char="•"/>
             </a:pPr>
             <a:r>
-              <a:rPr lang="en-US" sz="1575" dirty="0">
+              <a:rPr lang="en-US" sz="1725" dirty="0">
                 <a:solidFill>
                   <a:srgbClr val="E2E8F0"/>
                 </a:solidFill>
@@ -7771,18 +7771,18 @@
               </a:rPr>
               <a:t>Risk of diffusing responsibility and losing oversight</a:t>
             </a:r>
-            <a:endParaRPr lang="en-US" sz="1575" dirty="0"/>
-          </a:p>
-          <a:p>
-            <a:pPr algn="l" marL="133350" indent="-133350">
-              <a:lnSpc>
-                <a:spcPts val="2126"/>
+            <a:endParaRPr lang="en-US" sz="1725" dirty="0"/>
+          </a:p>
+          <a:p>
+            <a:pPr algn="l" marL="152400" indent="-152400">
+              <a:lnSpc>
+                <a:spcPts val="2415"/>
               </a:lnSpc>
               <a:buSzPct val="100000"/>
               <a:buChar char="•"/>
             </a:pPr>
             <a:r>
-              <a:rPr lang="en-US" sz="1575" dirty="0">
+              <a:rPr lang="en-US" sz="1725" dirty="0">
                 <a:solidFill>
                   <a:srgbClr val="E2E8F0"/>
                 </a:solidFill>
@@ -7792,18 +7792,18 @@
               </a:rPr>
               <a:t>Skill atrophy when agents replace deliberate practice</a:t>
             </a:r>
-            <a:endParaRPr lang="en-US" sz="1575" dirty="0"/>
-          </a:p>
-          <a:p>
-            <a:pPr algn="l" marL="133350" indent="-133350">
-              <a:lnSpc>
-                <a:spcPts val="2126"/>
+            <a:endParaRPr lang="en-US" sz="1725" dirty="0"/>
+          </a:p>
+          <a:p>
+            <a:pPr algn="l" marL="152400" indent="-152400">
+              <a:lnSpc>
+                <a:spcPts val="2415"/>
               </a:lnSpc>
               <a:buSzPct val="100000"/>
               <a:buChar char="•"/>
             </a:pPr>
             <a:r>
-              <a:rPr lang="en-US" sz="1575" dirty="0">
+              <a:rPr lang="en-US" sz="1725" dirty="0">
                 <a:solidFill>
                   <a:srgbClr val="E2E8F0"/>
                 </a:solidFill>
@@ -7813,7 +7813,7 @@
               </a:rPr>
               <a:t>New operational complexity and tech debt</a:t>
             </a:r>
-            <a:endParaRPr lang="en-US" sz="1575" dirty="0"/>
+            <a:endParaRPr lang="en-US" sz="1725" dirty="0"/>
           </a:p>
         </p:txBody>
       </p:sp>
@@ -7858,7 +7858,7 @@
         <p:spPr>
           <a:xfrm>
             <a:off x="647700" y="457200"/>
-            <a:ext cx="8005572" cy="239911"/>
+            <a:ext cx="8005572" cy="248543"/>
           </a:xfrm>
           <a:prstGeom prst="rect">
             <a:avLst/>
@@ -7872,7 +7872,7 @@
           <a:p>
             <a:pPr algn="l" indent="0" marL="0">
               <a:lnSpc>
-                <a:spcPts val="1890"/>
+                <a:spcPts val="1958"/>
               </a:lnSpc>
               <a:buNone/>
             </a:pPr>
@@ -7899,7 +7899,7 @@
         </p:nvSpPr>
         <p:spPr>
           <a:xfrm>
-            <a:off x="647700" y="773311"/>
+            <a:off x="647700" y="781943"/>
             <a:ext cx="8005572" cy="400050"/>
           </a:xfrm>
           <a:prstGeom prst="rect">
@@ -7938,8 +7938,8 @@
         </p:nvSpPr>
         <p:spPr>
           <a:xfrm>
-            <a:off x="647700" y="1344811"/>
-            <a:ext cx="7848600" cy="1473994"/>
+            <a:off x="647700" y="1315343"/>
+            <a:ext cx="7848600" cy="1679972"/>
           </a:xfrm>
           <a:prstGeom prst="rect">
             <a:avLst/>
@@ -7948,18 +7948,18 @@
           <a:ln/>
         </p:spPr>
         <p:txBody>
-          <a:bodyPr wrap="square" lIns="133350" tIns="0" rIns="0" bIns="0" rtlCol="0" anchor="t"/>
-          <a:lstStyle/>
-          <a:p>
-            <a:pPr algn="l" marL="133350" indent="-133350">
-              <a:lnSpc>
-                <a:spcPts val="2228"/>
+          <a:bodyPr wrap="square" lIns="152400" tIns="0" rIns="0" bIns="0" rtlCol="0" anchor="t"/>
+          <a:lstStyle/>
+          <a:p>
+            <a:pPr algn="l" marL="152400" indent="-152400">
+              <a:lnSpc>
+                <a:spcPts val="2520"/>
               </a:lnSpc>
               <a:buSzPct val="100000"/>
               <a:buChar char="•"/>
             </a:pPr>
             <a:r>
-              <a:rPr lang="en-US" sz="1650" dirty="0">
+              <a:rPr lang="en-US" sz="1800" dirty="0">
                 <a:solidFill>
                   <a:srgbClr val="E2E8F0"/>
                 </a:solidFill>
@@ -7969,18 +7969,18 @@
               </a:rPr>
               <a:t>Treat agents like new lab members: eager, fast, occasionally wrong</a:t>
             </a:r>
-            <a:endParaRPr lang="en-US" sz="1650" dirty="0"/>
-          </a:p>
-          <a:p>
-            <a:pPr algn="l" marL="133350" indent="-133350">
-              <a:lnSpc>
-                <a:spcPts val="2228"/>
+            <a:endParaRPr lang="en-US" sz="1800" dirty="0"/>
+          </a:p>
+          <a:p>
+            <a:pPr algn="l" marL="152400" indent="-152400">
+              <a:lnSpc>
+                <a:spcPts val="2520"/>
               </a:lnSpc>
               <a:buSzPct val="100000"/>
               <a:buChar char="•"/>
             </a:pPr>
             <a:r>
-              <a:rPr lang="en-US" sz="1650" dirty="0">
+              <a:rPr lang="en-US" sz="1800" dirty="0">
                 <a:solidFill>
                   <a:srgbClr val="E2E8F0"/>
                 </a:solidFill>
@@ -7990,18 +7990,18 @@
               </a:rPr>
               <a:t>Structure projects so someone new can run them end to end</a:t>
             </a:r>
-            <a:endParaRPr lang="en-US" sz="1650" dirty="0"/>
-          </a:p>
-          <a:p>
-            <a:pPr algn="l" marL="133350" indent="-133350">
-              <a:lnSpc>
-                <a:spcPts val="2228"/>
+            <a:endParaRPr lang="en-US" sz="1800" dirty="0"/>
+          </a:p>
+          <a:p>
+            <a:pPr algn="l" marL="152400" indent="-152400">
+              <a:lnSpc>
+                <a:spcPts val="2520"/>
               </a:lnSpc>
               <a:buSzPct val="100000"/>
               <a:buChar char="•"/>
             </a:pPr>
             <a:r>
-              <a:rPr lang="en-US" sz="1650" dirty="0">
+              <a:rPr lang="en-US" sz="1800" dirty="0">
                 <a:solidFill>
                   <a:srgbClr val="E2E8F0"/>
                 </a:solidFill>
@@ -8011,18 +8011,18 @@
               </a:rPr>
               <a:t>Document guardrails: approvals, time limits, failure modes</a:t>
             </a:r>
-            <a:endParaRPr lang="en-US" sz="1650" dirty="0"/>
-          </a:p>
-          <a:p>
-            <a:pPr algn="l" marL="133350" indent="-133350">
-              <a:lnSpc>
-                <a:spcPts val="2228"/>
+            <a:endParaRPr lang="en-US" sz="1800" dirty="0"/>
+          </a:p>
+          <a:p>
+            <a:pPr algn="l" marL="152400" indent="-152400">
+              <a:lnSpc>
+                <a:spcPts val="2520"/>
               </a:lnSpc>
               <a:buSzPct val="100000"/>
               <a:buChar char="•"/>
             </a:pPr>
             <a:r>
-              <a:rPr lang="en-US" sz="1650" dirty="0">
+              <a:rPr lang="en-US" sz="1800" dirty="0">
                 <a:solidFill>
                   <a:srgbClr val="E2E8F0"/>
                 </a:solidFill>
@@ -8032,7 +8032,7 @@
               </a:rPr>
               <a:t>Invest in project hygiene - structure unlocks reliable automation</a:t>
             </a:r>
-            <a:endParaRPr lang="en-US" sz="1650" dirty="0"/>
+            <a:endParaRPr lang="en-US" sz="1800" dirty="0"/>
           </a:p>
         </p:txBody>
       </p:sp>

</xml_diff>